<commit_message>
finished presentation and updated paper
</commit_message>
<xml_diff>
--- a/conference-slides/presentation.pptx
+++ b/conference-slides/presentation.pptx
@@ -6,10 +6,10 @@
     <p:sldMasterId id="2147484837" r:id="rId5"/>
   </p:sldMasterIdLst>
   <p:notesMasterIdLst>
-    <p:notesMasterId r:id="rId32"/>
+    <p:notesMasterId r:id="rId39"/>
   </p:notesMasterIdLst>
   <p:handoutMasterIdLst>
-    <p:handoutMasterId r:id="rId33"/>
+    <p:handoutMasterId r:id="rId40"/>
   </p:handoutMasterIdLst>
   <p:sldIdLst>
     <p:sldId id="404" r:id="rId6"/>
@@ -27,17 +27,24 @@
     <p:sldId id="269" r:id="rId18"/>
     <p:sldId id="424" r:id="rId19"/>
     <p:sldId id="263" r:id="rId20"/>
-    <p:sldId id="261" r:id="rId21"/>
-    <p:sldId id="420" r:id="rId22"/>
-    <p:sldId id="268" r:id="rId23"/>
-    <p:sldId id="421" r:id="rId24"/>
-    <p:sldId id="265" r:id="rId25"/>
-    <p:sldId id="423" r:id="rId26"/>
-    <p:sldId id="264" r:id="rId27"/>
-    <p:sldId id="266" r:id="rId28"/>
-    <p:sldId id="267" r:id="rId29"/>
-    <p:sldId id="406" r:id="rId30"/>
-    <p:sldId id="405" r:id="rId31"/>
+    <p:sldId id="427" r:id="rId21"/>
+    <p:sldId id="426" r:id="rId22"/>
+    <p:sldId id="420" r:id="rId23"/>
+    <p:sldId id="268" r:id="rId24"/>
+    <p:sldId id="429" r:id="rId25"/>
+    <p:sldId id="421" r:id="rId26"/>
+    <p:sldId id="428" r:id="rId27"/>
+    <p:sldId id="431" r:id="rId28"/>
+    <p:sldId id="265" r:id="rId29"/>
+    <p:sldId id="432" r:id="rId30"/>
+    <p:sldId id="433" r:id="rId31"/>
+    <p:sldId id="423" r:id="rId32"/>
+    <p:sldId id="264" r:id="rId33"/>
+    <p:sldId id="430" r:id="rId34"/>
+    <p:sldId id="266" r:id="rId35"/>
+    <p:sldId id="267" r:id="rId36"/>
+    <p:sldId id="406" r:id="rId37"/>
+    <p:sldId id="405" r:id="rId38"/>
   </p:sldIdLst>
   <p:sldSz cx="9144000" cy="5143500" type="screen16x9"/>
   <p:notesSz cx="6858000" cy="9296400"/>
@@ -983,7 +990,18 @@
           <a:bodyPr/>
           <a:lstStyle/>
           <a:p>
-            <a:endParaRPr lang="en-US"/>
+            <a:r>
+              <a:rPr lang="en-US" dirty="0"/>
+              <a:t>Picture Credit: https://</a:t>
+            </a:r>
+            <a:r>
+              <a:rPr lang="en-US" dirty="0" err="1"/>
+              <a:t>www.bbc.com</a:t>
+            </a:r>
+            <a:r>
+              <a:rPr lang="en-US" dirty="0"/>
+              <a:t>/news/science-environment-63165607</a:t>
+            </a:r>
           </a:p>
         </p:txBody>
       </p:sp>
@@ -994,7 +1012,7 @@
             <a:spLocks noGrp="1"/>
           </p:cNvSpPr>
           <p:nvPr>
-            <p:ph type="sldNum" sz="quarter" idx="10"/>
+            <p:ph type="sldNum" sz="quarter" idx="5"/>
           </p:nvPr>
         </p:nvSpPr>
         <p:spPr/>
@@ -1010,7 +1028,206 @@
               <a:pPr>
                 <a:defRPr/>
               </a:pPr>
-              <a:t>25</a:t>
+              <a:t>2</a:t>
+            </a:fld>
+            <a:endParaRPr lang="en-US"/>
+          </a:p>
+        </p:txBody>
+      </p:sp>
+    </p:spTree>
+    <p:extLst>
+      <p:ext uri="{BB962C8B-B14F-4D97-AF65-F5344CB8AC3E}">
+        <p14:creationId xmlns:p14="http://schemas.microsoft.com/office/powerpoint/2010/main" val="896584800"/>
+      </p:ext>
+    </p:extLst>
+  </p:cSld>
+  <p:clrMapOvr>
+    <a:masterClrMapping/>
+  </p:clrMapOvr>
+</p:notes>
+</file>
+
+<file path=ppt/notesSlides/notesSlide2.xml><?xml version="1.0" encoding="utf-8"?>
+<p:notes xmlns:a="http://schemas.openxmlformats.org/drawingml/2006/main" xmlns:r="http://schemas.openxmlformats.org/officeDocument/2006/relationships" xmlns:p="http://schemas.openxmlformats.org/presentationml/2006/main">
+  <p:cSld>
+    <p:spTree>
+      <p:nvGrpSpPr>
+        <p:cNvPr id="1" name=""/>
+        <p:cNvGrpSpPr/>
+        <p:nvPr/>
+      </p:nvGrpSpPr>
+      <p:grpSpPr>
+        <a:xfrm>
+          <a:off x="0" y="0"/>
+          <a:ext cx="0" cy="0"/>
+          <a:chOff x="0" y="0"/>
+          <a:chExt cx="0" cy="0"/>
+        </a:xfrm>
+      </p:grpSpPr>
+      <p:sp>
+        <p:nvSpPr>
+          <p:cNvPr id="2" name="Slide Image Placeholder 1"/>
+          <p:cNvSpPr>
+            <a:spLocks noGrp="1" noRot="1" noChangeAspect="1"/>
+          </p:cNvSpPr>
+          <p:nvPr>
+            <p:ph type="sldImg"/>
+          </p:nvPr>
+        </p:nvSpPr>
+        <p:spPr/>
+      </p:sp>
+      <p:sp>
+        <p:nvSpPr>
+          <p:cNvPr id="3" name="Notes Placeholder 2"/>
+          <p:cNvSpPr>
+            <a:spLocks noGrp="1"/>
+          </p:cNvSpPr>
+          <p:nvPr>
+            <p:ph type="body" idx="1"/>
+          </p:nvPr>
+        </p:nvSpPr>
+        <p:spPr/>
+        <p:txBody>
+          <a:bodyPr/>
+          <a:lstStyle/>
+          <a:p>
+            <a:r>
+              <a:rPr lang="en-US" dirty="0"/>
+              <a:t>Picture Credit: https://</a:t>
+            </a:r>
+            <a:r>
+              <a:rPr lang="en-US" dirty="0" err="1"/>
+              <a:t>wernerantweiler.ca</a:t>
+            </a:r>
+            <a:r>
+              <a:rPr lang="en-US" dirty="0"/>
+              <a:t>/</a:t>
+            </a:r>
+            <a:r>
+              <a:rPr lang="en-US" dirty="0" err="1"/>
+              <a:t>blog.php?item</a:t>
+            </a:r>
+            <a:r>
+              <a:rPr lang="en-US" dirty="0"/>
+              <a:t>=2021-05-20</a:t>
+            </a:r>
+          </a:p>
+        </p:txBody>
+      </p:sp>
+      <p:sp>
+        <p:nvSpPr>
+          <p:cNvPr id="4" name="Slide Number Placeholder 3"/>
+          <p:cNvSpPr>
+            <a:spLocks noGrp="1"/>
+          </p:cNvSpPr>
+          <p:nvPr>
+            <p:ph type="sldNum" sz="quarter" idx="5"/>
+          </p:nvPr>
+        </p:nvSpPr>
+        <p:spPr/>
+        <p:txBody>
+          <a:bodyPr/>
+          <a:lstStyle/>
+          <a:p>
+            <a:pPr>
+              <a:defRPr/>
+            </a:pPr>
+            <a:fld id="{B7B05DEF-6DE7-4BF9-8DBB-FF904A788E50}" type="slidenum">
+              <a:rPr lang="en-US" smtClean="0"/>
+              <a:pPr>
+                <a:defRPr/>
+              </a:pPr>
+              <a:t>3</a:t>
+            </a:fld>
+            <a:endParaRPr lang="en-US"/>
+          </a:p>
+        </p:txBody>
+      </p:sp>
+    </p:spTree>
+    <p:extLst>
+      <p:ext uri="{BB962C8B-B14F-4D97-AF65-F5344CB8AC3E}">
+        <p14:creationId xmlns:p14="http://schemas.microsoft.com/office/powerpoint/2010/main" val="517813495"/>
+      </p:ext>
+    </p:extLst>
+  </p:cSld>
+  <p:clrMapOvr>
+    <a:masterClrMapping/>
+  </p:clrMapOvr>
+</p:notes>
+</file>
+
+<file path=ppt/notesSlides/notesSlide3.xml><?xml version="1.0" encoding="utf-8"?>
+<p:notes xmlns:a="http://schemas.openxmlformats.org/drawingml/2006/main" xmlns:r="http://schemas.openxmlformats.org/officeDocument/2006/relationships" xmlns:p="http://schemas.openxmlformats.org/presentationml/2006/main">
+  <p:cSld>
+    <p:spTree>
+      <p:nvGrpSpPr>
+        <p:cNvPr id="1" name=""/>
+        <p:cNvGrpSpPr/>
+        <p:nvPr/>
+      </p:nvGrpSpPr>
+      <p:grpSpPr>
+        <a:xfrm>
+          <a:off x="0" y="0"/>
+          <a:ext cx="0" cy="0"/>
+          <a:chOff x="0" y="0"/>
+          <a:chExt cx="0" cy="0"/>
+        </a:xfrm>
+      </p:grpSpPr>
+      <p:sp>
+        <p:nvSpPr>
+          <p:cNvPr id="2" name="Slide Image Placeholder 1"/>
+          <p:cNvSpPr>
+            <a:spLocks noGrp="1" noRot="1" noChangeAspect="1"/>
+          </p:cNvSpPr>
+          <p:nvPr>
+            <p:ph type="sldImg"/>
+          </p:nvPr>
+        </p:nvSpPr>
+        <p:spPr/>
+      </p:sp>
+      <p:sp>
+        <p:nvSpPr>
+          <p:cNvPr id="3" name="Notes Placeholder 2"/>
+          <p:cNvSpPr>
+            <a:spLocks noGrp="1"/>
+          </p:cNvSpPr>
+          <p:nvPr>
+            <p:ph type="body" idx="1"/>
+          </p:nvPr>
+        </p:nvSpPr>
+        <p:spPr/>
+        <p:txBody>
+          <a:bodyPr/>
+          <a:lstStyle/>
+          <a:p>
+            <a:endParaRPr lang="en-US"/>
+          </a:p>
+        </p:txBody>
+      </p:sp>
+      <p:sp>
+        <p:nvSpPr>
+          <p:cNvPr id="4" name="Slide Number Placeholder 3"/>
+          <p:cNvSpPr>
+            <a:spLocks noGrp="1"/>
+          </p:cNvSpPr>
+          <p:nvPr>
+            <p:ph type="sldNum" sz="quarter" idx="10"/>
+          </p:nvPr>
+        </p:nvSpPr>
+        <p:spPr/>
+        <p:txBody>
+          <a:bodyPr/>
+          <a:lstStyle/>
+          <a:p>
+            <a:pPr>
+              <a:defRPr/>
+            </a:pPr>
+            <a:fld id="{B7B05DEF-6DE7-4BF9-8DBB-FF904A788E50}" type="slidenum">
+              <a:rPr lang="en-US" smtClean="0"/>
+              <a:pPr>
+                <a:defRPr/>
+              </a:pPr>
+              <a:t>32</a:t>
             </a:fld>
             <a:endParaRPr lang="en-US"/>
           </a:p>
@@ -4445,7 +4662,7 @@
                 </a:solidFill>
                 <a:latin typeface="+mj-lt"/>
               </a:rPr>
-              <a:t>AIAA Aviation, June 13, 2023</a:t>
+              <a:t>AIAA Aviation, June 14, 2023</a:t>
             </a:r>
           </a:p>
           <a:p>
@@ -5611,13 +5828,7 @@
           </a:p>
           <a:p>
             <a:r>
-              <a:rPr lang="en-US" dirty="0">
-                <a:solidFill>
-                  <a:schemeClr val="bg1">
-                    <a:lumMod val="65000"/>
-                  </a:schemeClr>
-                </a:solidFill>
-              </a:rPr>
+              <a:rPr lang="en-US" dirty="0"/>
               <a:t>Propulsion Model</a:t>
             </a:r>
           </a:p>
@@ -5723,6 +5934,100 @@
             <p:ph type="title"/>
           </p:nvPr>
         </p:nvSpPr>
+        <p:spPr>
+          <a:xfrm>
+            <a:off x="228600" y="144198"/>
+            <a:ext cx="8686800" cy="514350"/>
+          </a:xfrm>
+        </p:spPr>
+        <p:txBody>
+          <a:bodyPr wrap="square" anchor="ctr">
+            <a:normAutofit/>
+          </a:bodyPr>
+          <a:lstStyle/>
+          <a:p>
+            <a:pPr>
+              <a:lnSpc>
+                <a:spcPct val="90000"/>
+              </a:lnSpc>
+            </a:pPr>
+            <a:r>
+              <a:rPr lang="en-US" dirty="0"/>
+              <a:t>Propulsion Model</a:t>
+            </a:r>
+          </a:p>
+        </p:txBody>
+      </p:sp>
+      <p:sp>
+        <p:nvSpPr>
+          <p:cNvPr id="12" name="Slide Number Placeholder 3">
+            <a:extLst>
+              <a:ext uri="{FF2B5EF4-FFF2-40B4-BE49-F238E27FC236}">
+                <a16:creationId xmlns:a16="http://schemas.microsoft.com/office/drawing/2014/main" id="{2B8C7E55-331D-68F7-86C8-CA9DA33C753D}"/>
+              </a:ext>
+            </a:extLst>
+          </p:cNvPr>
+          <p:cNvSpPr>
+            <a:spLocks noGrp="1"/>
+          </p:cNvSpPr>
+          <p:nvPr>
+            <p:ph type="sldNum" sz="quarter" idx="12"/>
+          </p:nvPr>
+        </p:nvSpPr>
+        <p:spPr>
+          <a:xfrm>
+            <a:off x="228600" y="4629150"/>
+            <a:ext cx="914400" cy="171450"/>
+          </a:xfrm>
+        </p:spPr>
+        <p:txBody>
+          <a:bodyPr>
+            <a:normAutofit/>
+          </a:bodyPr>
+          <a:lstStyle/>
+          <a:p>
+            <a:pPr>
+              <a:lnSpc>
+                <a:spcPct val="90000"/>
+              </a:lnSpc>
+              <a:spcAft>
+                <a:spcPts val="600"/>
+              </a:spcAft>
+              <a:defRPr/>
+            </a:pPr>
+            <a:fld id="{B586D440-F702-449A-AAC2-9ACFF17038B8}" type="slidenum">
+              <a:rPr lang="en-US" sz="500" smtClean="0"/>
+              <a:pPr>
+                <a:lnSpc>
+                  <a:spcPct val="90000"/>
+                </a:lnSpc>
+                <a:spcAft>
+                  <a:spcPts val="600"/>
+                </a:spcAft>
+                <a:defRPr/>
+              </a:pPr>
+              <a:t>15</a:t>
+            </a:fld>
+            <a:endParaRPr lang="en-US" sz="500"/>
+          </a:p>
+        </p:txBody>
+      </p:sp>
+      <p:sp>
+        <p:nvSpPr>
+          <p:cNvPr id="14" name="Content Placeholder 13">
+            <a:extLst>
+              <a:ext uri="{FF2B5EF4-FFF2-40B4-BE49-F238E27FC236}">
+                <a16:creationId xmlns:a16="http://schemas.microsoft.com/office/drawing/2014/main" id="{FDFE6A08-05EF-1472-5317-71F8EB9A16E5}"/>
+              </a:ext>
+            </a:extLst>
+          </p:cNvPr>
+          <p:cNvSpPr>
+            <a:spLocks noGrp="1"/>
+          </p:cNvSpPr>
+          <p:nvPr>
+            <p:ph idx="1"/>
+          </p:nvPr>
+        </p:nvSpPr>
         <p:spPr/>
         <p:txBody>
           <a:bodyPr/>
@@ -5730,38 +6035,46 @@
           <a:p>
             <a:r>
               <a:rPr lang="en-US" dirty="0"/>
-              <a:t>Engine Model</a:t>
+              <a:t>We use the NASA advanced technology N+3 Ultra-High Bypass (UHB) Ratio engine that could be available in the 2030—2040 timeframe</a:t>
             </a:r>
           </a:p>
         </p:txBody>
       </p:sp>
       <p:pic>
         <p:nvPicPr>
-          <p:cNvPr id="5" name="Content Placeholder 4">
+          <p:cNvPr id="16" name="Content Placeholder 5">
             <a:extLst>
               <a:ext uri="{FF2B5EF4-FFF2-40B4-BE49-F238E27FC236}">
-                <a16:creationId xmlns:a16="http://schemas.microsoft.com/office/drawing/2014/main" id="{0D24514A-70BE-BFF2-06C1-BA621963D18C}"/>
+                <a16:creationId xmlns:a16="http://schemas.microsoft.com/office/drawing/2014/main" id="{E0964C01-A2FA-7561-CAC8-B36AF4AA7026}"/>
               </a:ext>
             </a:extLst>
           </p:cNvPr>
           <p:cNvPicPr>
-            <a:picLocks noGrp="1" noChangeAspect="1"/>
+            <a:picLocks noChangeAspect="1"/>
           </p:cNvPicPr>
-          <p:nvPr>
-            <p:ph idx="1"/>
-          </p:nvPr>
+          <p:nvPr/>
         </p:nvPicPr>
         <p:blipFill>
-          <a:blip r:embed="rId2"/>
+          <a:blip r:embed="rId2">
+            <a:extLst>
+              <a:ext uri="{28A0092B-C50C-407E-A947-70E740481C1C}">
+                <a14:useLocalDpi xmlns:a14="http://schemas.microsoft.com/office/drawing/2010/main" val="0"/>
+              </a:ext>
+            </a:extLst>
+          </a:blip>
           <a:stretch>
             <a:fillRect/>
           </a:stretch>
         </p:blipFill>
         <p:spPr>
           <a:xfrm>
-            <a:off x="2438171" y="1369219"/>
-            <a:ext cx="4267658" cy="3263504"/>
+            <a:off x="2362200" y="2341870"/>
+            <a:ext cx="4419600" cy="2458730"/>
           </a:xfrm>
+          <a:prstGeom prst="rect">
+            <a:avLst/>
+          </a:prstGeom>
+          <a:noFill/>
         </p:spPr>
       </p:pic>
     </p:spTree>
@@ -5810,6 +6123,100 @@
             <p:ph type="title"/>
           </p:nvPr>
         </p:nvSpPr>
+        <p:spPr>
+          <a:xfrm>
+            <a:off x="228600" y="144198"/>
+            <a:ext cx="8686800" cy="514350"/>
+          </a:xfrm>
+        </p:spPr>
+        <p:txBody>
+          <a:bodyPr wrap="square" anchor="ctr">
+            <a:normAutofit/>
+          </a:bodyPr>
+          <a:lstStyle/>
+          <a:p>
+            <a:pPr>
+              <a:lnSpc>
+                <a:spcPct val="90000"/>
+              </a:lnSpc>
+            </a:pPr>
+            <a:r>
+              <a:rPr lang="en-US" dirty="0"/>
+              <a:t>Propulsion Model</a:t>
+            </a:r>
+          </a:p>
+        </p:txBody>
+      </p:sp>
+      <p:sp>
+        <p:nvSpPr>
+          <p:cNvPr id="12" name="Slide Number Placeholder 3">
+            <a:extLst>
+              <a:ext uri="{FF2B5EF4-FFF2-40B4-BE49-F238E27FC236}">
+                <a16:creationId xmlns:a16="http://schemas.microsoft.com/office/drawing/2014/main" id="{2B8C7E55-331D-68F7-86C8-CA9DA33C753D}"/>
+              </a:ext>
+            </a:extLst>
+          </p:cNvPr>
+          <p:cNvSpPr>
+            <a:spLocks noGrp="1"/>
+          </p:cNvSpPr>
+          <p:nvPr>
+            <p:ph type="sldNum" sz="quarter" idx="12"/>
+          </p:nvPr>
+        </p:nvSpPr>
+        <p:spPr>
+          <a:xfrm>
+            <a:off x="228600" y="4629150"/>
+            <a:ext cx="914400" cy="171450"/>
+          </a:xfrm>
+        </p:spPr>
+        <p:txBody>
+          <a:bodyPr>
+            <a:normAutofit/>
+          </a:bodyPr>
+          <a:lstStyle/>
+          <a:p>
+            <a:pPr>
+              <a:lnSpc>
+                <a:spcPct val="90000"/>
+              </a:lnSpc>
+              <a:spcAft>
+                <a:spcPts val="600"/>
+              </a:spcAft>
+              <a:defRPr/>
+            </a:pPr>
+            <a:fld id="{B586D440-F702-449A-AAC2-9ACFF17038B8}" type="slidenum">
+              <a:rPr lang="en-US" sz="500" smtClean="0"/>
+              <a:pPr>
+                <a:lnSpc>
+                  <a:spcPct val="90000"/>
+                </a:lnSpc>
+                <a:spcAft>
+                  <a:spcPts val="600"/>
+                </a:spcAft>
+                <a:defRPr/>
+              </a:pPr>
+              <a:t>16</a:t>
+            </a:fld>
+            <a:endParaRPr lang="en-US" sz="500" dirty="0"/>
+          </a:p>
+        </p:txBody>
+      </p:sp>
+      <p:sp>
+        <p:nvSpPr>
+          <p:cNvPr id="14" name="Content Placeholder 13">
+            <a:extLst>
+              <a:ext uri="{FF2B5EF4-FFF2-40B4-BE49-F238E27FC236}">
+                <a16:creationId xmlns:a16="http://schemas.microsoft.com/office/drawing/2014/main" id="{FDFE6A08-05EF-1472-5317-71F8EB9A16E5}"/>
+              </a:ext>
+            </a:extLst>
+          </p:cNvPr>
+          <p:cNvSpPr>
+            <a:spLocks noGrp="1"/>
+          </p:cNvSpPr>
+          <p:nvPr>
+            <p:ph idx="1"/>
+          </p:nvPr>
+        </p:nvSpPr>
         <p:spPr/>
         <p:txBody>
           <a:bodyPr/>
@@ -5817,44 +6224,67 @@
           <a:p>
             <a:r>
               <a:rPr lang="en-US" dirty="0"/>
-              <a:t>Modeling</a:t>
-            </a:r>
+              <a:t>We use a Multipoint implementation of the engine allows us to consider several operating conditions in the design</a:t>
+            </a:r>
+          </a:p>
+          <a:p>
+            <a:r>
+              <a:rPr lang="en-US" dirty="0"/>
+              <a:t>We can size the engine at the “design point” and the pass flow paths and map scalars to operate at other points</a:t>
+            </a:r>
+          </a:p>
+          <a:p>
+            <a:endParaRPr lang="en-US" dirty="0"/>
           </a:p>
         </p:txBody>
       </p:sp>
       <p:pic>
         <p:nvPicPr>
-          <p:cNvPr id="8" name="Content Placeholder 7">
+          <p:cNvPr id="15" name="Content Placeholder 6">
             <a:extLst>
               <a:ext uri="{FF2B5EF4-FFF2-40B4-BE49-F238E27FC236}">
-                <a16:creationId xmlns:a16="http://schemas.microsoft.com/office/drawing/2014/main" id="{70CBEF1E-850B-949A-C21C-D7812B5C617F}"/>
+                <a16:creationId xmlns:a16="http://schemas.microsoft.com/office/drawing/2014/main" id="{0C65E702-4FF0-9F01-CC02-D1D6B52593BF}"/>
               </a:ext>
             </a:extLst>
           </p:cNvPr>
           <p:cNvPicPr>
-            <a:picLocks noGrp="1" noChangeAspect="1"/>
+            <a:picLocks noChangeAspect="1"/>
           </p:cNvPicPr>
-          <p:nvPr>
-            <p:ph idx="1"/>
-          </p:nvPr>
+          <p:nvPr/>
         </p:nvPicPr>
         <p:blipFill>
-          <a:blip r:embed="rId2"/>
+          <a:blip r:embed="rId2">
+            <a:extLst>
+              <a:ext uri="{28A0092B-C50C-407E-A947-70E740481C1C}">
+                <a14:useLocalDpi xmlns:a14="http://schemas.microsoft.com/office/drawing/2010/main" val="0"/>
+              </a:ext>
+            </a:extLst>
+          </a:blip>
           <a:stretch>
             <a:fillRect/>
           </a:stretch>
         </p:blipFill>
-        <p:spPr>
+        <p:spPr bwMode="auto">
           <a:xfrm>
-            <a:off x="2014538" y="1376958"/>
-            <a:ext cx="5114925" cy="3248025"/>
+            <a:off x="2383013" y="2852117"/>
+            <a:ext cx="4377973" cy="1948483"/>
           </a:xfrm>
+          <a:prstGeom prst="rect">
+            <a:avLst/>
+          </a:prstGeom>
+          <a:noFill/>
+          <a:ln w="9525">
+            <a:noFill/>
+            <a:miter lim="800000"/>
+            <a:headEnd/>
+            <a:tailEnd/>
+          </a:ln>
         </p:spPr>
       </p:pic>
     </p:spTree>
     <p:extLst>
       <p:ext uri="{BB962C8B-B14F-4D97-AF65-F5344CB8AC3E}">
-        <p14:creationId xmlns:p14="http://schemas.microsoft.com/office/powerpoint/2010/main" val="4202154486"/>
+        <p14:creationId xmlns:p14="http://schemas.microsoft.com/office/powerpoint/2010/main" val="675329483"/>
       </p:ext>
     </p:extLst>
   </p:cSld>
@@ -5883,10 +6313,125 @@
       </p:grpSpPr>
       <p:sp>
         <p:nvSpPr>
+          <p:cNvPr id="10" name="Content Placeholder 1">
+            <a:extLst>
+              <a:ext uri="{FF2B5EF4-FFF2-40B4-BE49-F238E27FC236}">
+                <a16:creationId xmlns:a16="http://schemas.microsoft.com/office/drawing/2014/main" id="{4B4B7CCE-1AF4-FF59-0B84-B0F811DDB49E}"/>
+              </a:ext>
+            </a:extLst>
+          </p:cNvPr>
+          <p:cNvSpPr>
+            <a:spLocks noGrp="1"/>
+          </p:cNvSpPr>
+          <p:nvPr>
+            <p:ph sz="half" idx="1"/>
+          </p:nvPr>
+        </p:nvSpPr>
+        <p:spPr>
+          <a:xfrm>
+            <a:off x="228600" y="1123950"/>
+            <a:ext cx="3962400" cy="3371850"/>
+          </a:xfrm>
+        </p:spPr>
+        <p:txBody>
+          <a:bodyPr/>
+          <a:lstStyle/>
+          <a:p>
+            <a:r>
+              <a:rPr lang="en-US" dirty="0"/>
+              <a:t>The water recovery feedback loop was implemented in the N+3 engine</a:t>
+            </a:r>
+          </a:p>
+          <a:p>
+            <a:r>
+              <a:rPr lang="en-US" dirty="0"/>
+              <a:t>Inputs are thermodynamic variables, water fraction, and design targets and outputs are net thrust and fuel burn</a:t>
+            </a:r>
+          </a:p>
+        </p:txBody>
+      </p:sp>
+      <p:pic>
+        <p:nvPicPr>
+          <p:cNvPr id="5" name="Content Placeholder 4">
+            <a:extLst>
+              <a:ext uri="{FF2B5EF4-FFF2-40B4-BE49-F238E27FC236}">
+                <a16:creationId xmlns:a16="http://schemas.microsoft.com/office/drawing/2014/main" id="{0D24514A-70BE-BFF2-06C1-BA621963D18C}"/>
+              </a:ext>
+            </a:extLst>
+          </p:cNvPr>
+          <p:cNvPicPr>
+            <a:picLocks noGrp="1" noChangeAspect="1"/>
+          </p:cNvPicPr>
+          <p:nvPr>
+            <p:ph sz="half" idx="2"/>
+          </p:nvPr>
+        </p:nvPicPr>
+        <p:blipFill>
+          <a:blip r:embed="rId2"/>
+          <a:stretch>
+            <a:fillRect/>
+          </a:stretch>
+        </p:blipFill>
+        <p:spPr>
+          <a:xfrm>
+            <a:off x="4503463" y="1123950"/>
+            <a:ext cx="4404273" cy="3371850"/>
+          </a:xfrm>
+          <a:noFill/>
+        </p:spPr>
+      </p:pic>
+      <p:sp>
+        <p:nvSpPr>
+          <p:cNvPr id="12" name="Slide Number Placeholder 3">
+            <a:extLst>
+              <a:ext uri="{FF2B5EF4-FFF2-40B4-BE49-F238E27FC236}">
+                <a16:creationId xmlns:a16="http://schemas.microsoft.com/office/drawing/2014/main" id="{2B8C7E55-331D-68F7-86C8-CA9DA33C753D}"/>
+              </a:ext>
+            </a:extLst>
+          </p:cNvPr>
+          <p:cNvSpPr>
+            <a:spLocks noGrp="1"/>
+          </p:cNvSpPr>
+          <p:nvPr>
+            <p:ph type="sldNum" sz="quarter" idx="12"/>
+          </p:nvPr>
+        </p:nvSpPr>
+        <p:spPr>
+          <a:xfrm>
+            <a:off x="228600" y="4629150"/>
+            <a:ext cx="914400" cy="171450"/>
+          </a:xfrm>
+        </p:spPr>
+        <p:txBody>
+          <a:bodyPr/>
+          <a:lstStyle/>
+          <a:p>
+            <a:pPr>
+              <a:spcAft>
+                <a:spcPts val="600"/>
+              </a:spcAft>
+              <a:defRPr/>
+            </a:pPr>
+            <a:fld id="{B586D440-F702-449A-AAC2-9ACFF17038B8}" type="slidenum">
+              <a:rPr lang="en-US" smtClean="0"/>
+              <a:pPr>
+                <a:spcAft>
+                  <a:spcPts val="600"/>
+                </a:spcAft>
+                <a:defRPr/>
+              </a:pPr>
+              <a:t>17</a:t>
+            </a:fld>
+            <a:endParaRPr lang="en-US" dirty="0"/>
+          </a:p>
+        </p:txBody>
+      </p:sp>
+      <p:sp>
+        <p:nvSpPr>
           <p:cNvPr id="2" name="Title 1">
             <a:extLst>
               <a:ext uri="{FF2B5EF4-FFF2-40B4-BE49-F238E27FC236}">
-                <a16:creationId xmlns:a16="http://schemas.microsoft.com/office/drawing/2014/main" id="{7422FE3E-20BE-41BF-466A-8AC3BF3FE228}"/>
+                <a16:creationId xmlns:a16="http://schemas.microsoft.com/office/drawing/2014/main" id="{41F7A03C-8DB7-28BC-B626-34829A22A586}"/>
               </a:ext>
             </a:extLst>
           </p:cNvPr>
@@ -5897,141 +6442,34 @@
             <p:ph type="title"/>
           </p:nvPr>
         </p:nvSpPr>
-        <p:spPr/>
+        <p:spPr>
+          <a:xfrm>
+            <a:off x="228600" y="144198"/>
+            <a:ext cx="8686800" cy="514350"/>
+          </a:xfrm>
+        </p:spPr>
         <p:txBody>
-          <a:bodyPr/>
+          <a:bodyPr wrap="square" anchor="ctr">
+            <a:normAutofit/>
+          </a:bodyPr>
           <a:lstStyle/>
           <a:p>
+            <a:pPr>
+              <a:lnSpc>
+                <a:spcPct val="90000"/>
+              </a:lnSpc>
+            </a:pPr>
             <a:r>
               <a:rPr lang="en-US" dirty="0"/>
-              <a:t>Computational Tools</a:t>
-            </a:r>
-          </a:p>
-        </p:txBody>
-      </p:sp>
-      <p:sp>
-        <p:nvSpPr>
-          <p:cNvPr id="3" name="Content Placeholder 2">
-            <a:extLst>
-              <a:ext uri="{FF2B5EF4-FFF2-40B4-BE49-F238E27FC236}">
-                <a16:creationId xmlns:a16="http://schemas.microsoft.com/office/drawing/2014/main" id="{5C9D6E72-BB4A-D2B1-9811-E991FFC038F5}"/>
-              </a:ext>
-            </a:extLst>
-          </p:cNvPr>
-          <p:cNvSpPr>
-            <a:spLocks noGrp="1"/>
-          </p:cNvSpPr>
-          <p:nvPr>
-            <p:ph idx="1"/>
-          </p:nvPr>
-        </p:nvSpPr>
-        <p:spPr/>
-        <p:txBody>
-          <a:bodyPr/>
-          <a:lstStyle/>
-          <a:p>
-            <a:r>
-              <a:rPr lang="en-US" dirty="0">
-                <a:solidFill>
-                  <a:schemeClr val="bg1">
-                    <a:lumMod val="65000"/>
-                  </a:schemeClr>
-                </a:solidFill>
-              </a:rPr>
-              <a:t>Computational Tools</a:t>
-            </a:r>
-          </a:p>
-          <a:p>
-            <a:r>
-              <a:rPr lang="en-US" dirty="0">
-                <a:solidFill>
-                  <a:schemeClr val="bg1">
-                    <a:lumMod val="65000"/>
-                  </a:schemeClr>
-                </a:solidFill>
-              </a:rPr>
-              <a:t>Water Recovery Model</a:t>
-            </a:r>
-            <a:endParaRPr lang="en-US" dirty="0">
-              <a:solidFill>
-                <a:schemeClr val="bg1">
-                  <a:lumMod val="75000"/>
-                </a:schemeClr>
-              </a:solidFill>
-            </a:endParaRPr>
-          </a:p>
-          <a:p>
-            <a:r>
-              <a:rPr lang="en-US" dirty="0">
-                <a:solidFill>
-                  <a:schemeClr val="bg1">
-                    <a:lumMod val="65000"/>
-                  </a:schemeClr>
-                </a:solidFill>
-              </a:rPr>
               <a:t>Propulsion Model</a:t>
             </a:r>
-          </a:p>
-          <a:p>
-            <a:r>
-              <a:rPr lang="en-US" dirty="0">
-                <a:solidFill>
-                  <a:schemeClr val="bg1">
-                    <a:lumMod val="65000"/>
-                  </a:schemeClr>
-                </a:solidFill>
-              </a:rPr>
-              <a:t>Optimization Problem</a:t>
-            </a:r>
-          </a:p>
-          <a:p>
-            <a:r>
-              <a:rPr lang="en-US" dirty="0">
-                <a:solidFill>
-                  <a:schemeClr val="bg1">
-                    <a:lumMod val="65000"/>
-                  </a:schemeClr>
-                </a:solidFill>
-              </a:rPr>
-              <a:t>Results</a:t>
-            </a:r>
-          </a:p>
-          <a:p>
-            <a:r>
-              <a:rPr lang="en-US" dirty="0">
-                <a:solidFill>
-                  <a:schemeClr val="bg1">
-                    <a:lumMod val="65000"/>
-                  </a:schemeClr>
-                </a:solidFill>
-              </a:rPr>
-              <a:t>Condenser Design Space Sweep</a:t>
-            </a:r>
-          </a:p>
-          <a:p>
-            <a:r>
-              <a:rPr lang="en-US" dirty="0">
-                <a:solidFill>
-                  <a:schemeClr val="bg1">
-                    <a:lumMod val="65000"/>
-                  </a:schemeClr>
-                </a:solidFill>
-              </a:rPr>
-              <a:t>Summary</a:t>
-            </a:r>
-          </a:p>
-          <a:p>
-            <a:pPr marL="0" indent="0">
-              <a:buNone/>
-            </a:pPr>
-            <a:endParaRPr lang="en-US" dirty="0"/>
           </a:p>
         </p:txBody>
       </p:sp>
     </p:spTree>
     <p:extLst>
       <p:ext uri="{BB962C8B-B14F-4D97-AF65-F5344CB8AC3E}">
-        <p14:creationId xmlns:p14="http://schemas.microsoft.com/office/powerpoint/2010/main" val="3513182019"/>
+        <p14:creationId xmlns:p14="http://schemas.microsoft.com/office/powerpoint/2010/main" val="2171477513"/>
       </p:ext>
     </p:extLst>
   </p:cSld>
@@ -6063,7 +6501,7 @@
           <p:cNvPr id="2" name="Title 1">
             <a:extLst>
               <a:ext uri="{FF2B5EF4-FFF2-40B4-BE49-F238E27FC236}">
-                <a16:creationId xmlns:a16="http://schemas.microsoft.com/office/drawing/2014/main" id="{41F7A03C-8DB7-28BC-B626-34829A22A586}"/>
+                <a16:creationId xmlns:a16="http://schemas.microsoft.com/office/drawing/2014/main" id="{7422FE3E-20BE-41BF-466A-8AC3BF3FE228}"/>
               </a:ext>
             </a:extLst>
           </p:cNvPr>
@@ -6081,7 +6519,7 @@
           <a:p>
             <a:r>
               <a:rPr lang="en-US" dirty="0"/>
-              <a:t>Optimization Problem</a:t>
+              <a:t>Computational Tools</a:t>
             </a:r>
           </a:p>
         </p:txBody>
@@ -6091,7 +6529,7 @@
           <p:cNvPr id="3" name="Content Placeholder 2">
             <a:extLst>
               <a:ext uri="{FF2B5EF4-FFF2-40B4-BE49-F238E27FC236}">
-                <a16:creationId xmlns:a16="http://schemas.microsoft.com/office/drawing/2014/main" id="{330DAAFE-B17D-76AA-D153-E070EB098AE6}"/>
+                <a16:creationId xmlns:a16="http://schemas.microsoft.com/office/drawing/2014/main" id="{5C9D6E72-BB4A-D2B1-9811-E991FFC038F5}"/>
               </a:ext>
             </a:extLst>
           </p:cNvPr>
@@ -6107,14 +6545,102 @@
           <a:bodyPr/>
           <a:lstStyle/>
           <a:p>
-            <a:endParaRPr lang="en-US"/>
+            <a:r>
+              <a:rPr lang="en-US" dirty="0">
+                <a:solidFill>
+                  <a:schemeClr val="bg1">
+                    <a:lumMod val="65000"/>
+                  </a:schemeClr>
+                </a:solidFill>
+              </a:rPr>
+              <a:t>Computational Tools</a:t>
+            </a:r>
+          </a:p>
+          <a:p>
+            <a:r>
+              <a:rPr lang="en-US" dirty="0">
+                <a:solidFill>
+                  <a:schemeClr val="bg1">
+                    <a:lumMod val="65000"/>
+                  </a:schemeClr>
+                </a:solidFill>
+              </a:rPr>
+              <a:t>Water Recovery Model</a:t>
+            </a:r>
+            <a:endParaRPr lang="en-US" dirty="0">
+              <a:solidFill>
+                <a:schemeClr val="bg1">
+                  <a:lumMod val="75000"/>
+                </a:schemeClr>
+              </a:solidFill>
+            </a:endParaRPr>
+          </a:p>
+          <a:p>
+            <a:r>
+              <a:rPr lang="en-US" dirty="0">
+                <a:solidFill>
+                  <a:schemeClr val="bg1">
+                    <a:lumMod val="65000"/>
+                  </a:schemeClr>
+                </a:solidFill>
+              </a:rPr>
+              <a:t>Propulsion Model</a:t>
+            </a:r>
+          </a:p>
+          <a:p>
+            <a:r>
+              <a:rPr lang="en-US" dirty="0"/>
+              <a:t>Optimization Problem</a:t>
+            </a:r>
+          </a:p>
+          <a:p>
+            <a:r>
+              <a:rPr lang="en-US" dirty="0">
+                <a:solidFill>
+                  <a:schemeClr val="bg1">
+                    <a:lumMod val="65000"/>
+                  </a:schemeClr>
+                </a:solidFill>
+              </a:rPr>
+              <a:t>Results</a:t>
+            </a:r>
+          </a:p>
+          <a:p>
+            <a:r>
+              <a:rPr lang="en-US" dirty="0">
+                <a:solidFill>
+                  <a:schemeClr val="bg1">
+                    <a:lumMod val="65000"/>
+                  </a:schemeClr>
+                </a:solidFill>
+              </a:rPr>
+              <a:t>Condenser Design Space Sweep</a:t>
+            </a:r>
+          </a:p>
+          <a:p>
+            <a:r>
+              <a:rPr lang="en-US" dirty="0">
+                <a:solidFill>
+                  <a:schemeClr val="bg1">
+                    <a:lumMod val="65000"/>
+                  </a:schemeClr>
+                </a:solidFill>
+              </a:rPr>
+              <a:t>Summary</a:t>
+            </a:r>
+          </a:p>
+          <a:p>
+            <a:pPr marL="0" indent="0">
+              <a:buNone/>
+            </a:pPr>
+            <a:endParaRPr lang="en-US" dirty="0"/>
           </a:p>
         </p:txBody>
       </p:sp>
     </p:spTree>
     <p:extLst>
       <p:ext uri="{BB962C8B-B14F-4D97-AF65-F5344CB8AC3E}">
-        <p14:creationId xmlns:p14="http://schemas.microsoft.com/office/powerpoint/2010/main" val="1807508705"/>
+        <p14:creationId xmlns:p14="http://schemas.microsoft.com/office/powerpoint/2010/main" val="3513182019"/>
       </p:ext>
     </p:extLst>
   </p:cSld>
@@ -6146,7 +6672,7 @@
           <p:cNvPr id="2" name="Title 1">
             <a:extLst>
               <a:ext uri="{FF2B5EF4-FFF2-40B4-BE49-F238E27FC236}">
-                <a16:creationId xmlns:a16="http://schemas.microsoft.com/office/drawing/2014/main" id="{7422FE3E-20BE-41BF-466A-8AC3BF3FE228}"/>
+                <a16:creationId xmlns:a16="http://schemas.microsoft.com/office/drawing/2014/main" id="{41F7A03C-8DB7-28BC-B626-34829A22A586}"/>
               </a:ext>
             </a:extLst>
           </p:cNvPr>
@@ -6164,17 +6690,203 @@
           <a:p>
             <a:r>
               <a:rPr lang="en-US" dirty="0"/>
-              <a:t>Computational Tools</a:t>
+              <a:t>Optimization Problem</a:t>
             </a:r>
           </a:p>
         </p:txBody>
       </p:sp>
       <p:sp>
         <p:nvSpPr>
-          <p:cNvPr id="3" name="Content Placeholder 2">
+          <p:cNvPr id="10" name="Slide Number Placeholder 3">
             <a:extLst>
               <a:ext uri="{FF2B5EF4-FFF2-40B4-BE49-F238E27FC236}">
-                <a16:creationId xmlns:a16="http://schemas.microsoft.com/office/drawing/2014/main" id="{5C9D6E72-BB4A-D2B1-9811-E991FFC038F5}"/>
+                <a16:creationId xmlns:a16="http://schemas.microsoft.com/office/drawing/2014/main" id="{A437382B-12FB-2907-378D-4E2A53FFFEEE}"/>
+              </a:ext>
+            </a:extLst>
+          </p:cNvPr>
+          <p:cNvSpPr>
+            <a:spLocks noGrp="1"/>
+          </p:cNvSpPr>
+          <p:nvPr>
+            <p:ph type="sldNum" sz="quarter" idx="12"/>
+          </p:nvPr>
+        </p:nvSpPr>
+        <p:spPr>
+          <a:xfrm>
+            <a:off x="228600" y="4629150"/>
+            <a:ext cx="914400" cy="171450"/>
+          </a:xfrm>
+        </p:spPr>
+        <p:txBody>
+          <a:bodyPr/>
+          <a:lstStyle/>
+          <a:p>
+            <a:pPr>
+              <a:spcAft>
+                <a:spcPts val="600"/>
+              </a:spcAft>
+              <a:defRPr/>
+            </a:pPr>
+            <a:fld id="{B586D440-F702-449A-AAC2-9ACFF17038B8}" type="slidenum">
+              <a:rPr lang="en-US" smtClean="0"/>
+              <a:pPr>
+                <a:spcAft>
+                  <a:spcPts val="600"/>
+                </a:spcAft>
+                <a:defRPr/>
+              </a:pPr>
+              <a:t>19</a:t>
+            </a:fld>
+            <a:endParaRPr lang="en-US" dirty="0"/>
+          </a:p>
+        </p:txBody>
+      </p:sp>
+      <p:sp>
+        <p:nvSpPr>
+          <p:cNvPr id="13" name="Rectangle 12">
+            <a:extLst>
+              <a:ext uri="{FF2B5EF4-FFF2-40B4-BE49-F238E27FC236}">
+                <a16:creationId xmlns:a16="http://schemas.microsoft.com/office/drawing/2014/main" id="{BD6F52DA-FC7E-2E1A-C5DB-6938B088D5BD}"/>
+              </a:ext>
+            </a:extLst>
+          </p:cNvPr>
+          <p:cNvSpPr/>
+          <p:nvPr/>
+        </p:nvSpPr>
+        <p:spPr bwMode="auto">
+          <a:xfrm>
+            <a:off x="6896036" y="2841119"/>
+            <a:ext cx="731100" cy="217284"/>
+          </a:xfrm>
+          <a:prstGeom prst="rect">
+            <a:avLst/>
+          </a:prstGeom>
+          <a:solidFill>
+            <a:schemeClr val="bg1"/>
+          </a:solidFill>
+          <a:ln w="9525" cap="flat" cmpd="sng" algn="ctr">
+            <a:noFill/>
+            <a:prstDash val="solid"/>
+            <a:round/>
+            <a:headEnd type="none" w="med" len="med"/>
+            <a:tailEnd type="none" w="med" len="med"/>
+          </a:ln>
+          <a:effectLst/>
+        </p:spPr>
+        <p:txBody>
+          <a:bodyPr vert="horz" wrap="square" lIns="91440" tIns="45720" rIns="91440" bIns="45720" numCol="1" rtlCol="0" anchor="t" anchorCtr="0" compatLnSpc="1">
+            <a:prstTxWarp prst="textNoShape">
+              <a:avLst/>
+            </a:prstTxWarp>
+          </a:bodyPr>
+          <a:lstStyle/>
+          <a:p>
+            <a:pPr marL="0" marR="0" indent="0" algn="l" defTabSz="914400" rtl="0" eaLnBrk="0" fontAlgn="base" latinLnBrk="0" hangingPunct="0">
+              <a:lnSpc>
+                <a:spcPct val="100000"/>
+              </a:lnSpc>
+              <a:spcBef>
+                <a:spcPct val="0"/>
+              </a:spcBef>
+              <a:spcAft>
+                <a:spcPct val="0"/>
+              </a:spcAft>
+              <a:buClrTx/>
+              <a:buSzTx/>
+              <a:buFontTx/>
+              <a:buNone/>
+              <a:tabLst/>
+            </a:pPr>
+            <a:endParaRPr kumimoji="0" lang="en-US" sz="2400" b="0" i="0" u="none" strike="noStrike" cap="none" normalizeH="0" baseline="0">
+              <a:ln>
+                <a:noFill/>
+              </a:ln>
+              <a:solidFill>
+                <a:schemeClr val="tx1"/>
+              </a:solidFill>
+              <a:effectLst/>
+              <a:latin typeface="Arial" charset="0"/>
+              <a:ea typeface="ＭＳ Ｐゴシック" pitchFamily="80" charset="-128"/>
+            </a:endParaRPr>
+          </a:p>
+        </p:txBody>
+      </p:sp>
+      <p:sp>
+        <p:nvSpPr>
+          <p:cNvPr id="14" name="Rectangle 13">
+            <a:extLst>
+              <a:ext uri="{FF2B5EF4-FFF2-40B4-BE49-F238E27FC236}">
+                <a16:creationId xmlns:a16="http://schemas.microsoft.com/office/drawing/2014/main" id="{05A4CEE7-FAD3-E647-521D-96CD3498B597}"/>
+              </a:ext>
+            </a:extLst>
+          </p:cNvPr>
+          <p:cNvSpPr/>
+          <p:nvPr/>
+        </p:nvSpPr>
+        <p:spPr bwMode="auto">
+          <a:xfrm>
+            <a:off x="7396460" y="2959286"/>
+            <a:ext cx="731100" cy="217284"/>
+          </a:xfrm>
+          <a:prstGeom prst="rect">
+            <a:avLst/>
+          </a:prstGeom>
+          <a:solidFill>
+            <a:schemeClr val="bg1"/>
+          </a:solidFill>
+          <a:ln w="9525" cap="flat" cmpd="sng" algn="ctr">
+            <a:noFill/>
+            <a:prstDash val="solid"/>
+            <a:round/>
+            <a:headEnd type="none" w="med" len="med"/>
+            <a:tailEnd type="none" w="med" len="med"/>
+          </a:ln>
+          <a:effectLst/>
+        </p:spPr>
+        <p:txBody>
+          <a:bodyPr vert="horz" wrap="square" lIns="91440" tIns="45720" rIns="91440" bIns="45720" numCol="1" rtlCol="0" anchor="t" anchorCtr="0" compatLnSpc="1">
+            <a:prstTxWarp prst="textNoShape">
+              <a:avLst/>
+            </a:prstTxWarp>
+          </a:bodyPr>
+          <a:lstStyle/>
+          <a:p>
+            <a:pPr marL="0" marR="0" indent="0" algn="l" defTabSz="914400" rtl="0" eaLnBrk="0" fontAlgn="base" latinLnBrk="0" hangingPunct="0">
+              <a:lnSpc>
+                <a:spcPct val="100000"/>
+              </a:lnSpc>
+              <a:spcBef>
+                <a:spcPct val="0"/>
+              </a:spcBef>
+              <a:spcAft>
+                <a:spcPct val="0"/>
+              </a:spcAft>
+              <a:buClrTx/>
+              <a:buSzTx/>
+              <a:buFontTx/>
+              <a:buNone/>
+              <a:tabLst/>
+            </a:pPr>
+            <a:endParaRPr kumimoji="0" lang="en-US" sz="2400" b="0" i="0" u="none" strike="noStrike" cap="none" normalizeH="0" baseline="0">
+              <a:ln>
+                <a:noFill/>
+              </a:ln>
+              <a:solidFill>
+                <a:schemeClr val="tx1"/>
+              </a:solidFill>
+              <a:effectLst/>
+              <a:latin typeface="Arial" charset="0"/>
+              <a:ea typeface="ＭＳ Ｐゴシック" pitchFamily="80" charset="-128"/>
+            </a:endParaRPr>
+          </a:p>
+        </p:txBody>
+      </p:sp>
+      <p:sp>
+        <p:nvSpPr>
+          <p:cNvPr id="16" name="Content Placeholder 15">
+            <a:extLst>
+              <a:ext uri="{FF2B5EF4-FFF2-40B4-BE49-F238E27FC236}">
+                <a16:creationId xmlns:a16="http://schemas.microsoft.com/office/drawing/2014/main" id="{255B9590-213C-CC8B-9763-24DB1D572A51}"/>
               </a:ext>
             </a:extLst>
           </p:cNvPr>
@@ -6191,107 +6903,65 @@
           <a:lstStyle/>
           <a:p>
             <a:r>
-              <a:rPr lang="en-US" dirty="0">
-                <a:solidFill>
-                  <a:schemeClr val="bg1">
-                    <a:lumMod val="65000"/>
-                  </a:schemeClr>
-                </a:solidFill>
-              </a:rPr>
-              <a:t>Computational Tools</a:t>
-            </a:r>
-          </a:p>
-          <a:p>
-            <a:r>
-              <a:rPr lang="en-US" dirty="0">
-                <a:solidFill>
-                  <a:schemeClr val="bg1">
-                    <a:lumMod val="65000"/>
-                  </a:schemeClr>
-                </a:solidFill>
-              </a:rPr>
-              <a:t>Water Recovery Model</a:t>
-            </a:r>
-            <a:endParaRPr lang="en-US" dirty="0">
-              <a:solidFill>
-                <a:schemeClr val="bg1">
-                  <a:lumMod val="75000"/>
-                </a:schemeClr>
-              </a:solidFill>
-            </a:endParaRPr>
-          </a:p>
-          <a:p>
-            <a:r>
-              <a:rPr lang="en-US" dirty="0">
-                <a:solidFill>
-                  <a:schemeClr val="bg1">
-                    <a:lumMod val="65000"/>
-                  </a:schemeClr>
-                </a:solidFill>
-              </a:rPr>
-              <a:t>Propulsion Model</a:t>
-            </a:r>
-          </a:p>
-          <a:p>
-            <a:r>
-              <a:rPr lang="en-US" dirty="0">
-                <a:solidFill>
-                  <a:schemeClr val="bg1">
-                    <a:lumMod val="65000"/>
-                  </a:schemeClr>
-                </a:solidFill>
-              </a:rPr>
-              <a:t>Optimization Problem</a:t>
-            </a:r>
-          </a:p>
-          <a:p>
-            <a:r>
-              <a:rPr lang="en-US" dirty="0">
-                <a:solidFill>
-                  <a:schemeClr val="bg1">
-                    <a:lumMod val="65000"/>
-                  </a:schemeClr>
-                </a:solidFill>
-              </a:rPr>
-              <a:t>Results</a:t>
-            </a:r>
-          </a:p>
-          <a:p>
-            <a:r>
-              <a:rPr lang="en-US" dirty="0">
-                <a:solidFill>
-                  <a:schemeClr val="bg1">
-                    <a:lumMod val="65000"/>
-                  </a:schemeClr>
-                </a:solidFill>
-              </a:rPr>
-              <a:t>Condenser Design Space Sweep</a:t>
-            </a:r>
-          </a:p>
-          <a:p>
-            <a:r>
-              <a:rPr lang="en-US" dirty="0">
-                <a:solidFill>
-                  <a:schemeClr val="bg1">
-                    <a:lumMod val="65000"/>
-                  </a:schemeClr>
-                </a:solidFill>
-              </a:rPr>
-              <a:t>Summary</a:t>
-            </a:r>
-          </a:p>
-          <a:p>
-            <a:pPr marL="0" indent="0">
-              <a:buNone/>
-            </a:pPr>
-            <a:endParaRPr lang="en-US" dirty="0"/>
+              <a:rPr lang="en-US" dirty="0"/>
+              <a:t>The optimization problem was set up to converge the MDA group at each optimization iteration</a:t>
+            </a:r>
+          </a:p>
+          <a:p>
+            <a:r>
+              <a:rPr lang="en-US" dirty="0"/>
+              <a:t>The design point was TOC and the objective function was fuel burn at CRZ</a:t>
+            </a:r>
           </a:p>
         </p:txBody>
       </p:sp>
+      <p:pic>
+        <p:nvPicPr>
+          <p:cNvPr id="17" name="Content Placeholder 4">
+            <a:extLst>
+              <a:ext uri="{FF2B5EF4-FFF2-40B4-BE49-F238E27FC236}">
+                <a16:creationId xmlns:a16="http://schemas.microsoft.com/office/drawing/2014/main" id="{E1E43C9D-76A2-6A75-9C76-575A427AB0C8}"/>
+              </a:ext>
+            </a:extLst>
+          </p:cNvPr>
+          <p:cNvPicPr>
+            <a:picLocks noChangeAspect="1"/>
+          </p:cNvPicPr>
+          <p:nvPr/>
+        </p:nvPicPr>
+        <p:blipFill>
+          <a:blip r:embed="rId2">
+            <a:extLst>
+              <a:ext uri="{28A0092B-C50C-407E-A947-70E740481C1C}">
+                <a14:useLocalDpi xmlns:a14="http://schemas.microsoft.com/office/drawing/2010/main" val="0"/>
+              </a:ext>
+            </a:extLst>
+          </a:blip>
+          <a:stretch>
+            <a:fillRect/>
+          </a:stretch>
+        </p:blipFill>
+        <p:spPr bwMode="auto">
+          <a:xfrm>
+            <a:off x="2187468" y="2949761"/>
+            <a:ext cx="4769063" cy="1910588"/>
+          </a:xfrm>
+          <a:prstGeom prst="rect">
+            <a:avLst/>
+          </a:prstGeom>
+          <a:noFill/>
+          <a:ln w="9525">
+            <a:noFill/>
+            <a:miter lim="800000"/>
+            <a:headEnd/>
+            <a:tailEnd/>
+          </a:ln>
+        </p:spPr>
+      </p:pic>
     </p:spTree>
     <p:extLst>
       <p:ext uri="{BB962C8B-B14F-4D97-AF65-F5344CB8AC3E}">
-        <p14:creationId xmlns:p14="http://schemas.microsoft.com/office/powerpoint/2010/main" val="664115731"/>
+        <p14:creationId xmlns:p14="http://schemas.microsoft.com/office/powerpoint/2010/main" val="1807508705"/>
       </p:ext>
     </p:extLst>
   </p:cSld>
@@ -6375,11 +7045,58 @@
           <a:p>
             <a:r>
               <a:rPr lang="en-US" dirty="0"/>
-              <a:t>Hydrogen presents itself as the most viable alternative to kerosene-based fuels</a:t>
+              <a:t>Hydrogen presents itself as the most viable alternative to kerosene-based fuels for long-haul flights</a:t>
             </a:r>
           </a:p>
         </p:txBody>
       </p:sp>
+      <p:pic>
+        <p:nvPicPr>
+          <p:cNvPr id="1026" name="Picture 2" descr="airline">
+            <a:extLst>
+              <a:ext uri="{FF2B5EF4-FFF2-40B4-BE49-F238E27FC236}">
+                <a16:creationId xmlns:a16="http://schemas.microsoft.com/office/drawing/2014/main" id="{D80CD72B-931A-8D20-FB5A-FDA6165FBBB6}"/>
+              </a:ext>
+            </a:extLst>
+          </p:cNvPr>
+          <p:cNvPicPr>
+            <a:picLocks noChangeAspect="1" noChangeArrowheads="1"/>
+          </p:cNvPicPr>
+          <p:nvPr/>
+        </p:nvPicPr>
+        <p:blipFill>
+          <a:blip r:embed="rId3">
+            <a:extLst>
+              <a:ext uri="{28A0092B-C50C-407E-A947-70E740481C1C}">
+                <a14:useLocalDpi xmlns:a14="http://schemas.microsoft.com/office/drawing/2010/main" val="0"/>
+              </a:ext>
+            </a:extLst>
+          </a:blip>
+          <a:srcRect/>
+          <a:stretch>
+            <a:fillRect/>
+          </a:stretch>
+        </p:blipFill>
+        <p:spPr bwMode="auto">
+          <a:xfrm>
+            <a:off x="2800095" y="2799758"/>
+            <a:ext cx="3543809" cy="1993392"/>
+          </a:xfrm>
+          <a:prstGeom prst="rect">
+            <a:avLst/>
+          </a:prstGeom>
+          <a:noFill/>
+          <a:extLst>
+            <a:ext uri="{909E8E84-426E-40DD-AFC4-6F175D3DCCD1}">
+              <a14:hiddenFill xmlns:a14="http://schemas.microsoft.com/office/drawing/2010/main">
+                <a:solidFill>
+                  <a:srgbClr val="FFFFFF"/>
+                </a:solidFill>
+              </a14:hiddenFill>
+            </a:ext>
+          </a:extLst>
+        </p:spPr>
+      </p:pic>
     </p:spTree>
     <p:extLst>
       <p:ext uri="{BB962C8B-B14F-4D97-AF65-F5344CB8AC3E}">
@@ -6433,17 +7150,246 @@
           <a:p>
             <a:r>
               <a:rPr lang="en-US" dirty="0"/>
-              <a:t>Results</a:t>
+              <a:t>Optimization Problem</a:t>
             </a:r>
           </a:p>
         </p:txBody>
       </p:sp>
       <p:sp>
         <p:nvSpPr>
-          <p:cNvPr id="3" name="Content Placeholder 2">
+          <p:cNvPr id="10" name="Slide Number Placeholder 3">
             <a:extLst>
               <a:ext uri="{FF2B5EF4-FFF2-40B4-BE49-F238E27FC236}">
-                <a16:creationId xmlns:a16="http://schemas.microsoft.com/office/drawing/2014/main" id="{330DAAFE-B17D-76AA-D153-E070EB098AE6}"/>
+                <a16:creationId xmlns:a16="http://schemas.microsoft.com/office/drawing/2014/main" id="{A437382B-12FB-2907-378D-4E2A53FFFEEE}"/>
+              </a:ext>
+            </a:extLst>
+          </p:cNvPr>
+          <p:cNvSpPr>
+            <a:spLocks noGrp="1"/>
+          </p:cNvSpPr>
+          <p:nvPr>
+            <p:ph type="sldNum" sz="quarter" idx="12"/>
+          </p:nvPr>
+        </p:nvSpPr>
+        <p:spPr>
+          <a:xfrm>
+            <a:off x="228600" y="4629150"/>
+            <a:ext cx="914400" cy="171450"/>
+          </a:xfrm>
+        </p:spPr>
+        <p:txBody>
+          <a:bodyPr/>
+          <a:lstStyle/>
+          <a:p>
+            <a:pPr>
+              <a:spcAft>
+                <a:spcPts val="600"/>
+              </a:spcAft>
+              <a:defRPr/>
+            </a:pPr>
+            <a:fld id="{B586D440-F702-449A-AAC2-9ACFF17038B8}" type="slidenum">
+              <a:rPr lang="en-US" smtClean="0"/>
+              <a:pPr>
+                <a:spcAft>
+                  <a:spcPts val="600"/>
+                </a:spcAft>
+                <a:defRPr/>
+              </a:pPr>
+              <a:t>20</a:t>
+            </a:fld>
+            <a:endParaRPr lang="en-US" dirty="0"/>
+          </a:p>
+        </p:txBody>
+      </p:sp>
+      <p:pic>
+        <p:nvPicPr>
+          <p:cNvPr id="11" name="Content Placeholder 6">
+            <a:extLst>
+              <a:ext uri="{FF2B5EF4-FFF2-40B4-BE49-F238E27FC236}">
+                <a16:creationId xmlns:a16="http://schemas.microsoft.com/office/drawing/2014/main" id="{FEBE8E8E-B417-3C2E-2983-4905943D971D}"/>
+              </a:ext>
+            </a:extLst>
+          </p:cNvPr>
+          <p:cNvPicPr>
+            <a:picLocks noChangeAspect="1"/>
+          </p:cNvPicPr>
+          <p:nvPr/>
+        </p:nvPicPr>
+        <p:blipFill>
+          <a:blip r:embed="rId2">
+            <a:extLst>
+              <a:ext uri="{28A0092B-C50C-407E-A947-70E740481C1C}">
+                <a14:useLocalDpi xmlns:a14="http://schemas.microsoft.com/office/drawing/2010/main" val="0"/>
+              </a:ext>
+            </a:extLst>
+          </a:blip>
+          <a:stretch>
+            <a:fillRect/>
+          </a:stretch>
+        </p:blipFill>
+        <p:spPr bwMode="auto">
+          <a:xfrm>
+            <a:off x="1781664" y="1973435"/>
+            <a:ext cx="5580672" cy="2655715"/>
+          </a:xfrm>
+          <a:prstGeom prst="rect">
+            <a:avLst/>
+          </a:prstGeom>
+          <a:noFill/>
+          <a:ln w="9525">
+            <a:noFill/>
+            <a:miter lim="800000"/>
+            <a:headEnd/>
+            <a:tailEnd/>
+          </a:ln>
+        </p:spPr>
+      </p:pic>
+      <p:sp>
+        <p:nvSpPr>
+          <p:cNvPr id="13" name="Rectangle 12">
+            <a:extLst>
+              <a:ext uri="{FF2B5EF4-FFF2-40B4-BE49-F238E27FC236}">
+                <a16:creationId xmlns:a16="http://schemas.microsoft.com/office/drawing/2014/main" id="{BD6F52DA-FC7E-2E1A-C5DB-6938B088D5BD}"/>
+              </a:ext>
+            </a:extLst>
+          </p:cNvPr>
+          <p:cNvSpPr/>
+          <p:nvPr/>
+        </p:nvSpPr>
+        <p:spPr bwMode="auto">
+          <a:xfrm>
+            <a:off x="5074019" y="3331821"/>
+            <a:ext cx="731100" cy="217284"/>
+          </a:xfrm>
+          <a:prstGeom prst="rect">
+            <a:avLst/>
+          </a:prstGeom>
+          <a:solidFill>
+            <a:schemeClr val="bg1"/>
+          </a:solidFill>
+          <a:ln w="9525" cap="flat" cmpd="sng" algn="ctr">
+            <a:noFill/>
+            <a:prstDash val="solid"/>
+            <a:round/>
+            <a:headEnd type="none" w="med" len="med"/>
+            <a:tailEnd type="none" w="med" len="med"/>
+          </a:ln>
+          <a:effectLst/>
+        </p:spPr>
+        <p:txBody>
+          <a:bodyPr vert="horz" wrap="square" lIns="91440" tIns="45720" rIns="91440" bIns="45720" numCol="1" rtlCol="0" anchor="t" anchorCtr="0" compatLnSpc="1">
+            <a:prstTxWarp prst="textNoShape">
+              <a:avLst/>
+            </a:prstTxWarp>
+          </a:bodyPr>
+          <a:lstStyle/>
+          <a:p>
+            <a:pPr marL="0" marR="0" indent="0" algn="l" defTabSz="914400" rtl="0" eaLnBrk="0" fontAlgn="base" latinLnBrk="0" hangingPunct="0">
+              <a:lnSpc>
+                <a:spcPct val="100000"/>
+              </a:lnSpc>
+              <a:spcBef>
+                <a:spcPct val="0"/>
+              </a:spcBef>
+              <a:spcAft>
+                <a:spcPct val="0"/>
+              </a:spcAft>
+              <a:buClrTx/>
+              <a:buSzTx/>
+              <a:buFontTx/>
+              <a:buNone/>
+              <a:tabLst/>
+            </a:pPr>
+            <a:endParaRPr kumimoji="0" lang="en-US" sz="2400" b="0" i="0" u="none" strike="noStrike" cap="none" normalizeH="0" baseline="0">
+              <a:ln>
+                <a:noFill/>
+              </a:ln>
+              <a:solidFill>
+                <a:schemeClr val="tx1"/>
+              </a:solidFill>
+              <a:effectLst/>
+              <a:latin typeface="Arial" charset="0"/>
+              <a:ea typeface="ＭＳ Ｐゴシック" pitchFamily="80" charset="-128"/>
+            </a:endParaRPr>
+          </a:p>
+        </p:txBody>
+      </p:sp>
+      <p:sp>
+        <p:nvSpPr>
+          <p:cNvPr id="14" name="Rectangle 13">
+            <a:extLst>
+              <a:ext uri="{FF2B5EF4-FFF2-40B4-BE49-F238E27FC236}">
+                <a16:creationId xmlns:a16="http://schemas.microsoft.com/office/drawing/2014/main" id="{05A4CEE7-FAD3-E647-521D-96CD3498B597}"/>
+              </a:ext>
+            </a:extLst>
+          </p:cNvPr>
+          <p:cNvSpPr/>
+          <p:nvPr/>
+        </p:nvSpPr>
+        <p:spPr bwMode="auto">
+          <a:xfrm>
+            <a:off x="5645603" y="3485567"/>
+            <a:ext cx="731100" cy="217284"/>
+          </a:xfrm>
+          <a:prstGeom prst="rect">
+            <a:avLst/>
+          </a:prstGeom>
+          <a:solidFill>
+            <a:schemeClr val="bg1"/>
+          </a:solidFill>
+          <a:ln w="9525" cap="flat" cmpd="sng" algn="ctr">
+            <a:noFill/>
+            <a:prstDash val="solid"/>
+            <a:round/>
+            <a:headEnd type="none" w="med" len="med"/>
+            <a:tailEnd type="none" w="med" len="med"/>
+          </a:ln>
+          <a:effectLst/>
+        </p:spPr>
+        <p:txBody>
+          <a:bodyPr vert="horz" wrap="square" lIns="91440" tIns="45720" rIns="91440" bIns="45720" numCol="1" rtlCol="0" anchor="t" anchorCtr="0" compatLnSpc="1">
+            <a:prstTxWarp prst="textNoShape">
+              <a:avLst/>
+            </a:prstTxWarp>
+          </a:bodyPr>
+          <a:lstStyle/>
+          <a:p>
+            <a:pPr marL="0" marR="0" indent="0" algn="l" defTabSz="914400" rtl="0" eaLnBrk="0" fontAlgn="base" latinLnBrk="0" hangingPunct="0">
+              <a:lnSpc>
+                <a:spcPct val="100000"/>
+              </a:lnSpc>
+              <a:spcBef>
+                <a:spcPct val="0"/>
+              </a:spcBef>
+              <a:spcAft>
+                <a:spcPct val="0"/>
+              </a:spcAft>
+              <a:buClrTx/>
+              <a:buSzTx/>
+              <a:buFontTx/>
+              <a:buNone/>
+              <a:tabLst/>
+            </a:pPr>
+            <a:endParaRPr kumimoji="0" lang="en-US" sz="2400" b="0" i="0" u="none" strike="noStrike" cap="none" normalizeH="0" baseline="0">
+              <a:ln>
+                <a:noFill/>
+              </a:ln>
+              <a:solidFill>
+                <a:schemeClr val="tx1"/>
+              </a:solidFill>
+              <a:effectLst/>
+              <a:latin typeface="Arial" charset="0"/>
+              <a:ea typeface="ＭＳ Ｐゴシック" pitchFamily="80" charset="-128"/>
+            </a:endParaRPr>
+          </a:p>
+        </p:txBody>
+      </p:sp>
+      <p:sp>
+        <p:nvSpPr>
+          <p:cNvPr id="16" name="Content Placeholder 15">
+            <a:extLst>
+              <a:ext uri="{FF2B5EF4-FFF2-40B4-BE49-F238E27FC236}">
+                <a16:creationId xmlns:a16="http://schemas.microsoft.com/office/drawing/2014/main" id="{255B9590-213C-CC8B-9763-24DB1D572A51}"/>
               </a:ext>
             </a:extLst>
           </p:cNvPr>
@@ -6459,14 +7405,26 @@
           <a:bodyPr/>
           <a:lstStyle/>
           <a:p>
-            <a:endParaRPr lang="en-US"/>
+            <a:r>
+              <a:rPr lang="en-US" dirty="0"/>
+              <a:t>The optimization was run for both Jet-A and H2 fuels</a:t>
+            </a:r>
+          </a:p>
+          <a:p>
+            <a:r>
+              <a:rPr lang="en-US" dirty="0"/>
+              <a:t>Each fuel was run with and without water recovery</a:t>
+            </a:r>
+          </a:p>
+          <a:p>
+            <a:endParaRPr lang="en-US" dirty="0"/>
           </a:p>
         </p:txBody>
       </p:sp>
     </p:spTree>
     <p:extLst>
       <p:ext uri="{BB962C8B-B14F-4D97-AF65-F5344CB8AC3E}">
-        <p14:creationId xmlns:p14="http://schemas.microsoft.com/office/powerpoint/2010/main" val="3362800081"/>
+        <p14:creationId xmlns:p14="http://schemas.microsoft.com/office/powerpoint/2010/main" val="1178058040"/>
       </p:ext>
     </p:extLst>
   </p:cSld>
@@ -6598,13 +7556,7 @@
           </a:p>
           <a:p>
             <a:r>
-              <a:rPr lang="en-US" dirty="0">
-                <a:solidFill>
-                  <a:schemeClr val="bg1">
-                    <a:lumMod val="65000"/>
-                  </a:schemeClr>
-                </a:solidFill>
-              </a:rPr>
+              <a:rPr lang="en-US" dirty="0"/>
               <a:t>Results</a:t>
             </a:r>
           </a:p>
@@ -6643,7 +7595,7 @@
     </p:spTree>
     <p:extLst>
       <p:ext uri="{BB962C8B-B14F-4D97-AF65-F5344CB8AC3E}">
-        <p14:creationId xmlns:p14="http://schemas.microsoft.com/office/powerpoint/2010/main" val="134533933"/>
+        <p14:creationId xmlns:p14="http://schemas.microsoft.com/office/powerpoint/2010/main" val="664115731"/>
       </p:ext>
     </p:extLst>
   </p:cSld>
@@ -6672,6 +7624,135 @@
       </p:grpSpPr>
       <p:sp>
         <p:nvSpPr>
+          <p:cNvPr id="18" name="Content Placeholder 1">
+            <a:extLst>
+              <a:ext uri="{FF2B5EF4-FFF2-40B4-BE49-F238E27FC236}">
+                <a16:creationId xmlns:a16="http://schemas.microsoft.com/office/drawing/2014/main" id="{E2CF1E0F-63F2-3A6F-BA6F-C64A360BE761}"/>
+              </a:ext>
+            </a:extLst>
+          </p:cNvPr>
+          <p:cNvSpPr>
+            <a:spLocks noGrp="1"/>
+          </p:cNvSpPr>
+          <p:nvPr>
+            <p:ph sz="half" idx="1"/>
+          </p:nvPr>
+        </p:nvSpPr>
+        <p:spPr>
+          <a:xfrm>
+            <a:off x="228600" y="1123950"/>
+            <a:ext cx="3962400" cy="3371850"/>
+          </a:xfrm>
+        </p:spPr>
+        <p:txBody>
+          <a:bodyPr/>
+          <a:lstStyle/>
+          <a:p>
+            <a:r>
+              <a:rPr lang="en-US" dirty="0"/>
+              <a:t>The optimization converged for all four permutations</a:t>
+            </a:r>
+          </a:p>
+          <a:p>
+            <a:r>
+              <a:rPr lang="en-US" dirty="0"/>
+              <a:t>The optimizations took between 36-48 minutes and 20-30 major SNOPT iterations on a laptop</a:t>
+            </a:r>
+          </a:p>
+        </p:txBody>
+      </p:sp>
+      <p:pic>
+        <p:nvPicPr>
+          <p:cNvPr id="13" name="Content Placeholder 12">
+            <a:extLst>
+              <a:ext uri="{FF2B5EF4-FFF2-40B4-BE49-F238E27FC236}">
+                <a16:creationId xmlns:a16="http://schemas.microsoft.com/office/drawing/2014/main" id="{337DB4E9-B91B-5476-3A01-7B4841654492}"/>
+              </a:ext>
+            </a:extLst>
+          </p:cNvPr>
+          <p:cNvPicPr>
+            <a:picLocks noGrp="1" noChangeAspect="1"/>
+          </p:cNvPicPr>
+          <p:nvPr>
+            <p:ph sz="half" idx="2"/>
+          </p:nvPr>
+        </p:nvPicPr>
+        <p:blipFill>
+          <a:blip r:embed="rId2">
+            <a:extLst>
+              <a:ext uri="{28A0092B-C50C-407E-A947-70E740481C1C}">
+                <a14:useLocalDpi xmlns:a14="http://schemas.microsoft.com/office/drawing/2010/main" val="0"/>
+              </a:ext>
+            </a:extLst>
+          </a:blip>
+          <a:stretch>
+            <a:fillRect/>
+          </a:stretch>
+        </p:blipFill>
+        <p:spPr>
+          <a:xfrm>
+            <a:off x="4191000" y="1123950"/>
+            <a:ext cx="4906798" cy="2453399"/>
+          </a:xfrm>
+          <a:noFill/>
+        </p:spPr>
+      </p:pic>
+      <p:sp>
+        <p:nvSpPr>
+          <p:cNvPr id="8" name="Slide Number Placeholder 3">
+            <a:extLst>
+              <a:ext uri="{FF2B5EF4-FFF2-40B4-BE49-F238E27FC236}">
+                <a16:creationId xmlns:a16="http://schemas.microsoft.com/office/drawing/2014/main" id="{2748FC11-A312-8DC0-5B39-AAB933E67704}"/>
+              </a:ext>
+            </a:extLst>
+          </p:cNvPr>
+          <p:cNvSpPr>
+            <a:spLocks noGrp="1"/>
+          </p:cNvSpPr>
+          <p:nvPr>
+            <p:ph type="sldNum" sz="quarter" idx="12"/>
+          </p:nvPr>
+        </p:nvSpPr>
+        <p:spPr>
+          <a:xfrm>
+            <a:off x="228600" y="4629150"/>
+            <a:ext cx="914400" cy="171450"/>
+          </a:xfrm>
+        </p:spPr>
+        <p:txBody>
+          <a:bodyPr>
+            <a:normAutofit/>
+          </a:bodyPr>
+          <a:lstStyle/>
+          <a:p>
+            <a:pPr>
+              <a:lnSpc>
+                <a:spcPct val="90000"/>
+              </a:lnSpc>
+              <a:spcAft>
+                <a:spcPts val="600"/>
+              </a:spcAft>
+              <a:defRPr/>
+            </a:pPr>
+            <a:fld id="{B586D440-F702-449A-AAC2-9ACFF17038B8}" type="slidenum">
+              <a:rPr lang="en-US" sz="500" smtClean="0"/>
+              <a:pPr>
+                <a:lnSpc>
+                  <a:spcPct val="90000"/>
+                </a:lnSpc>
+                <a:spcAft>
+                  <a:spcPts val="600"/>
+                </a:spcAft>
+                <a:defRPr/>
+              </a:pPr>
+              <a:t>22</a:t>
+            </a:fld>
+            <a:endParaRPr lang="en-US" sz="500" dirty="0"/>
+          </a:p>
+        </p:txBody>
+      </p:sp>
+      <p:sp>
+        <p:nvSpPr>
           <p:cNvPr id="2" name="Title 1">
             <a:extLst>
               <a:ext uri="{FF2B5EF4-FFF2-40B4-BE49-F238E27FC236}">
@@ -6686,47 +7767,34 @@
             <p:ph type="title"/>
           </p:nvPr>
         </p:nvSpPr>
-        <p:spPr/>
+        <p:spPr>
+          <a:xfrm>
+            <a:off x="228600" y="144198"/>
+            <a:ext cx="8686800" cy="514350"/>
+          </a:xfrm>
+        </p:spPr>
         <p:txBody>
-          <a:bodyPr/>
+          <a:bodyPr wrap="square" anchor="ctr">
+            <a:normAutofit/>
+          </a:bodyPr>
           <a:lstStyle/>
           <a:p>
+            <a:pPr>
+              <a:lnSpc>
+                <a:spcPct val="90000"/>
+              </a:lnSpc>
+            </a:pPr>
             <a:r>
               <a:rPr lang="en-US" dirty="0"/>
-              <a:t>Condenser Design Space Sweep</a:t>
-            </a:r>
-          </a:p>
-        </p:txBody>
-      </p:sp>
-      <p:sp>
-        <p:nvSpPr>
-          <p:cNvPr id="3" name="Content Placeholder 2">
-            <a:extLst>
-              <a:ext uri="{FF2B5EF4-FFF2-40B4-BE49-F238E27FC236}">
-                <a16:creationId xmlns:a16="http://schemas.microsoft.com/office/drawing/2014/main" id="{330DAAFE-B17D-76AA-D153-E070EB098AE6}"/>
-              </a:ext>
-            </a:extLst>
-          </p:cNvPr>
-          <p:cNvSpPr>
-            <a:spLocks noGrp="1"/>
-          </p:cNvSpPr>
-          <p:nvPr>
-            <p:ph idx="1"/>
-          </p:nvPr>
-        </p:nvSpPr>
-        <p:spPr/>
-        <p:txBody>
-          <a:bodyPr/>
-          <a:lstStyle/>
-          <a:p>
-            <a:endParaRPr lang="en-US"/>
+              <a:t>Results</a:t>
+            </a:r>
           </a:p>
         </p:txBody>
       </p:sp>
     </p:spTree>
     <p:extLst>
       <p:ext uri="{BB962C8B-B14F-4D97-AF65-F5344CB8AC3E}">
-        <p14:creationId xmlns:p14="http://schemas.microsoft.com/office/powerpoint/2010/main" val="653559669"/>
+        <p14:creationId xmlns:p14="http://schemas.microsoft.com/office/powerpoint/2010/main" val="3196755710"/>
       </p:ext>
     </p:extLst>
   </p:cSld>
@@ -6769,24 +7837,37 @@
             <p:ph type="title"/>
           </p:nvPr>
         </p:nvSpPr>
-        <p:spPr/>
+        <p:spPr>
+          <a:xfrm>
+            <a:off x="228600" y="144198"/>
+            <a:ext cx="8686800" cy="514350"/>
+          </a:xfrm>
+        </p:spPr>
         <p:txBody>
-          <a:bodyPr/>
+          <a:bodyPr wrap="square" anchor="ctr">
+            <a:normAutofit/>
+          </a:bodyPr>
           <a:lstStyle/>
           <a:p>
+            <a:pPr>
+              <a:lnSpc>
+                <a:spcPct val="90000"/>
+              </a:lnSpc>
+            </a:pPr>
             <a:r>
               <a:rPr lang="en-US" dirty="0"/>
-              <a:t>Summary</a:t>
-            </a:r>
+              <a:t>Results</a:t>
+            </a:r>
+            <a:endParaRPr lang="en-US"/>
           </a:p>
         </p:txBody>
       </p:sp>
       <p:sp>
         <p:nvSpPr>
-          <p:cNvPr id="3" name="Content Placeholder 2">
+          <p:cNvPr id="10" name="Slide Number Placeholder 3">
             <a:extLst>
               <a:ext uri="{FF2B5EF4-FFF2-40B4-BE49-F238E27FC236}">
-                <a16:creationId xmlns:a16="http://schemas.microsoft.com/office/drawing/2014/main" id="{330DAAFE-B17D-76AA-D153-E070EB098AE6}"/>
+                <a16:creationId xmlns:a16="http://schemas.microsoft.com/office/drawing/2014/main" id="{984FF0FA-BF41-AFEF-1D96-6180F269E3C2}"/>
               </a:ext>
             </a:extLst>
           </p:cNvPr>
@@ -6794,22 +7875,200 @@
             <a:spLocks noGrp="1"/>
           </p:cNvSpPr>
           <p:nvPr>
-            <p:ph idx="1"/>
+            <p:ph type="sldNum" sz="quarter" idx="12"/>
           </p:nvPr>
         </p:nvSpPr>
-        <p:spPr/>
+        <p:spPr>
+          <a:xfrm>
+            <a:off x="228600" y="4629150"/>
+            <a:ext cx="914400" cy="171450"/>
+          </a:xfrm>
+        </p:spPr>
         <p:txBody>
           <a:bodyPr/>
           <a:lstStyle/>
           <a:p>
+            <a:pPr>
+              <a:spcAft>
+                <a:spcPts val="600"/>
+              </a:spcAft>
+              <a:defRPr/>
+            </a:pPr>
+            <a:fld id="{B586D440-F702-449A-AAC2-9ACFF17038B8}" type="slidenum">
+              <a:rPr lang="en-US" smtClean="0"/>
+              <a:pPr>
+                <a:spcAft>
+                  <a:spcPts val="600"/>
+                </a:spcAft>
+                <a:defRPr/>
+              </a:pPr>
+              <a:t>23</a:t>
+            </a:fld>
             <a:endParaRPr lang="en-US"/>
           </a:p>
         </p:txBody>
       </p:sp>
+      <mc:AlternateContent xmlns:mc="http://schemas.openxmlformats.org/markup-compatibility/2006">
+        <mc:Choice xmlns:a14="http://schemas.microsoft.com/office/drawing/2010/main" Requires="a14">
+          <p:sp>
+            <p:nvSpPr>
+              <p:cNvPr id="7" name="Content Placeholder 6">
+                <a:extLst>
+                  <a:ext uri="{FF2B5EF4-FFF2-40B4-BE49-F238E27FC236}">
+                    <a16:creationId xmlns:a16="http://schemas.microsoft.com/office/drawing/2014/main" id="{1DEFE8A0-4D1E-552F-CB70-E731BD01A910}"/>
+                  </a:ext>
+                </a:extLst>
+              </p:cNvPr>
+              <p:cNvSpPr>
+                <a:spLocks noGrp="1"/>
+              </p:cNvSpPr>
+              <p:nvPr>
+                <p:ph idx="1"/>
+              </p:nvPr>
+            </p:nvSpPr>
+            <p:spPr/>
+            <p:txBody>
+              <a:bodyPr/>
+              <a:lstStyle/>
+              <a:p>
+                <a:r>
+                  <a:rPr lang="en-US" dirty="0"/>
+                  <a:t>The water recovery fraction and </a:t>
+                </a:r>
+                <a14:m>
+                  <m:oMath xmlns:m="http://schemas.openxmlformats.org/officeDocument/2006/math">
+                    <m:sSub>
+                      <m:sSubPr>
+                        <m:ctrlPr>
+                          <a:rPr lang="en-US" b="0" i="1" smtClean="0">
+                            <a:latin typeface="Cambria Math" panose="02040503050406030204" pitchFamily="18" charset="0"/>
+                          </a:rPr>
+                        </m:ctrlPr>
+                      </m:sSubPr>
+                      <m:e>
+                        <m:r>
+                          <a:rPr lang="en-US" b="0" i="1" smtClean="0">
+                            <a:latin typeface="Cambria Math" panose="02040503050406030204" pitchFamily="18" charset="0"/>
+                          </a:rPr>
+                          <m:t>𝑇</m:t>
+                        </m:r>
+                      </m:e>
+                      <m:sub>
+                        <m:r>
+                          <a:rPr lang="en-US" b="0" i="1" smtClean="0">
+                            <a:latin typeface="Cambria Math" panose="02040503050406030204" pitchFamily="18" charset="0"/>
+                          </a:rPr>
+                          <m:t>4,</m:t>
+                        </m:r>
+                        <m:r>
+                          <a:rPr lang="en-US" b="0" i="1" smtClean="0">
+                            <a:latin typeface="Cambria Math" panose="02040503050406030204" pitchFamily="18" charset="0"/>
+                          </a:rPr>
+                          <m:t>𝑅𝑇𝑂</m:t>
+                        </m:r>
+                      </m:sub>
+                    </m:sSub>
+                  </m:oMath>
+                </a14:m>
+                <a:r>
+                  <a:rPr lang="en-US" dirty="0"/>
+                  <a:t> had opposite effects on the fuel burn</a:t>
+                </a:r>
+              </a:p>
+              <a:p>
+                <a14:m>
+                  <m:oMath xmlns:m="http://schemas.openxmlformats.org/officeDocument/2006/math">
+                    <m:sSub>
+                      <m:sSubPr>
+                        <m:ctrlPr>
+                          <a:rPr lang="en-US" b="0" i="1" smtClean="0">
+                            <a:latin typeface="Cambria Math" panose="02040503050406030204" pitchFamily="18" charset="0"/>
+                          </a:rPr>
+                        </m:ctrlPr>
+                      </m:sSubPr>
+                      <m:e>
+                        <m:r>
+                          <a:rPr lang="en-US" b="0" i="1" smtClean="0">
+                            <a:latin typeface="Cambria Math" panose="02040503050406030204" pitchFamily="18" charset="0"/>
+                          </a:rPr>
+                          <m:t>𝑇</m:t>
+                        </m:r>
+                      </m:e>
+                      <m:sub>
+                        <m:r>
+                          <a:rPr lang="en-US" b="0" i="1" smtClean="0">
+                            <a:latin typeface="Cambria Math" panose="02040503050406030204" pitchFamily="18" charset="0"/>
+                          </a:rPr>
+                          <m:t>4,</m:t>
+                        </m:r>
+                        <m:r>
+                          <a:rPr lang="en-US" b="0" i="1" smtClean="0">
+                            <a:latin typeface="Cambria Math" panose="02040503050406030204" pitchFamily="18" charset="0"/>
+                          </a:rPr>
+                          <m:t>𝑅𝑇𝑂</m:t>
+                        </m:r>
+                      </m:sub>
+                    </m:sSub>
+                  </m:oMath>
+                </a14:m>
+                <a:r>
+                  <a:rPr lang="en-US" dirty="0"/>
+                  <a:t> was held constant for the optimizations with water recovery</a:t>
+                </a:r>
+              </a:p>
+              <a:p>
+                <a:r>
+                  <a:rPr lang="en-US" dirty="0"/>
+                  <a:t>Water recovery was allowed to vary until the CEA model broke</a:t>
+                </a:r>
+              </a:p>
+            </p:txBody>
+          </p:sp>
+        </mc:Choice>
+        <mc:Fallback>
+          <p:sp>
+            <p:nvSpPr>
+              <p:cNvPr id="7" name="Content Placeholder 6">
+                <a:extLst>
+                  <a:ext uri="{FF2B5EF4-FFF2-40B4-BE49-F238E27FC236}">
+                    <a16:creationId xmlns:a16="http://schemas.microsoft.com/office/drawing/2014/main" id="{1DEFE8A0-4D1E-552F-CB70-E731BD01A910}"/>
+                  </a:ext>
+                </a:extLst>
+              </p:cNvPr>
+              <p:cNvSpPr>
+                <a:spLocks noGrp="1" noRot="1" noChangeAspect="1" noMove="1" noResize="1" noEditPoints="1" noAdjustHandles="1" noChangeArrowheads="1" noChangeShapeType="1" noTextEdit="1"/>
+              </p:cNvSpPr>
+              <p:nvPr>
+                <p:ph idx="1"/>
+              </p:nvPr>
+            </p:nvSpPr>
+            <p:spPr>
+              <a:blipFill>
+                <a:blip r:embed="rId2"/>
+                <a:stretch>
+                  <a:fillRect l="-1022" t="-1128"/>
+                </a:stretch>
+              </a:blipFill>
+            </p:spPr>
+            <p:txBody>
+              <a:bodyPr/>
+              <a:lstStyle/>
+              <a:p>
+                <a:r>
+                  <a:rPr lang="en-US">
+                    <a:noFill/>
+                  </a:rPr>
+                  <a:t> </a:t>
+                </a:r>
+              </a:p>
+            </p:txBody>
+          </p:sp>
+        </mc:Fallback>
+      </mc:AlternateContent>
     </p:spTree>
     <p:extLst>
       <p:ext uri="{BB962C8B-B14F-4D97-AF65-F5344CB8AC3E}">
-        <p14:creationId xmlns:p14="http://schemas.microsoft.com/office/powerpoint/2010/main" val="2380709232"/>
+        <p14:creationId xmlns:p14="http://schemas.microsoft.com/office/powerpoint/2010/main" val="1958854389"/>
       </p:ext>
     </p:extLst>
   </p:cSld>
@@ -6852,24 +8111,83 @@
             <p:ph type="title"/>
           </p:nvPr>
         </p:nvSpPr>
-        <p:spPr/>
+        <p:spPr>
+          <a:xfrm>
+            <a:off x="228600" y="144198"/>
+            <a:ext cx="8686800" cy="514350"/>
+          </a:xfrm>
+        </p:spPr>
+        <p:txBody>
+          <a:bodyPr wrap="square" anchor="ctr">
+            <a:normAutofit/>
+          </a:bodyPr>
+          <a:lstStyle/>
+          <a:p>
+            <a:pPr>
+              <a:lnSpc>
+                <a:spcPct val="90000"/>
+              </a:lnSpc>
+            </a:pPr>
+            <a:r>
+              <a:rPr lang="en-US" dirty="0"/>
+              <a:t>Results</a:t>
+            </a:r>
+            <a:endParaRPr lang="en-US"/>
+          </a:p>
+        </p:txBody>
+      </p:sp>
+      <p:sp>
+        <p:nvSpPr>
+          <p:cNvPr id="10" name="Slide Number Placeholder 3">
+            <a:extLst>
+              <a:ext uri="{FF2B5EF4-FFF2-40B4-BE49-F238E27FC236}">
+                <a16:creationId xmlns:a16="http://schemas.microsoft.com/office/drawing/2014/main" id="{984FF0FA-BF41-AFEF-1D96-6180F269E3C2}"/>
+              </a:ext>
+            </a:extLst>
+          </p:cNvPr>
+          <p:cNvSpPr>
+            <a:spLocks noGrp="1"/>
+          </p:cNvSpPr>
+          <p:nvPr>
+            <p:ph type="sldNum" sz="quarter" idx="12"/>
+          </p:nvPr>
+        </p:nvSpPr>
+        <p:spPr>
+          <a:xfrm>
+            <a:off x="228600" y="4629150"/>
+            <a:ext cx="914400" cy="171450"/>
+          </a:xfrm>
+        </p:spPr>
         <p:txBody>
           <a:bodyPr/>
           <a:lstStyle/>
           <a:p>
-            <a:r>
-              <a:rPr lang="en-US" dirty="0"/>
-              <a:t>Backup</a:t>
-            </a:r>
+            <a:pPr>
+              <a:spcAft>
+                <a:spcPts val="600"/>
+              </a:spcAft>
+              <a:defRPr/>
+            </a:pPr>
+            <a:fld id="{B586D440-F702-449A-AAC2-9ACFF17038B8}" type="slidenum">
+              <a:rPr lang="en-US" smtClean="0"/>
+              <a:pPr>
+                <a:spcAft>
+                  <a:spcPts val="600"/>
+                </a:spcAft>
+                <a:defRPr/>
+              </a:pPr>
+              <a:t>24</a:t>
+            </a:fld>
+            <a:endParaRPr lang="en-US" dirty="0"/>
           </a:p>
         </p:txBody>
       </p:sp>
       <p:sp>
         <p:nvSpPr>
-          <p:cNvPr id="3" name="Content Placeholder 2">
+          <p:cNvPr id="7" name="Content Placeholder 6">
             <a:extLst>
               <a:ext uri="{FF2B5EF4-FFF2-40B4-BE49-F238E27FC236}">
-                <a16:creationId xmlns:a16="http://schemas.microsoft.com/office/drawing/2014/main" id="{330DAAFE-B17D-76AA-D153-E070EB098AE6}"/>
+                <a16:creationId xmlns:a16="http://schemas.microsoft.com/office/drawing/2014/main" id="{1DEFE8A0-4D1E-552F-CB70-E731BD01A910}"/>
               </a:ext>
             </a:extLst>
           </p:cNvPr>
@@ -6885,14 +8203,60 @@
           <a:bodyPr/>
           <a:lstStyle/>
           <a:p>
-            <a:endParaRPr lang="en-US"/>
+            <a:r>
+              <a:rPr lang="en-US" dirty="0"/>
+              <a:t>Optimized Values</a:t>
+            </a:r>
           </a:p>
         </p:txBody>
       </p:sp>
+      <p:pic>
+        <p:nvPicPr>
+          <p:cNvPr id="8" name="Content Placeholder 4">
+            <a:extLst>
+              <a:ext uri="{FF2B5EF4-FFF2-40B4-BE49-F238E27FC236}">
+                <a16:creationId xmlns:a16="http://schemas.microsoft.com/office/drawing/2014/main" id="{1D9A94CD-4641-75F5-281B-240C65167404}"/>
+              </a:ext>
+            </a:extLst>
+          </p:cNvPr>
+          <p:cNvPicPr>
+            <a:picLocks noChangeAspect="1"/>
+          </p:cNvPicPr>
+          <p:nvPr/>
+        </p:nvPicPr>
+        <p:blipFill>
+          <a:blip r:embed="rId2">
+            <a:extLst>
+              <a:ext uri="{28A0092B-C50C-407E-A947-70E740481C1C}">
+                <a14:useLocalDpi xmlns:a14="http://schemas.microsoft.com/office/drawing/2010/main" val="0"/>
+              </a:ext>
+            </a:extLst>
+          </a:blip>
+          <a:stretch>
+            <a:fillRect/>
+          </a:stretch>
+        </p:blipFill>
+        <p:spPr bwMode="auto">
+          <a:xfrm>
+            <a:off x="1636471" y="1498130"/>
+            <a:ext cx="5871057" cy="3302470"/>
+          </a:xfrm>
+          <a:prstGeom prst="rect">
+            <a:avLst/>
+          </a:prstGeom>
+          <a:noFill/>
+          <a:ln w="9525">
+            <a:noFill/>
+            <a:miter lim="800000"/>
+            <a:headEnd/>
+            <a:tailEnd/>
+          </a:ln>
+        </p:spPr>
+      </p:pic>
     </p:spTree>
     <p:extLst>
       <p:ext uri="{BB962C8B-B14F-4D97-AF65-F5344CB8AC3E}">
-        <p14:creationId xmlns:p14="http://schemas.microsoft.com/office/powerpoint/2010/main" val="742115949"/>
+        <p14:creationId xmlns:p14="http://schemas.microsoft.com/office/powerpoint/2010/main" val="3362800081"/>
       </p:ext>
     </p:extLst>
   </p:cSld>
@@ -6921,6 +8285,1283 @@
       </p:grpSpPr>
       <p:sp>
         <p:nvSpPr>
+          <p:cNvPr id="2" name="Title 1">
+            <a:extLst>
+              <a:ext uri="{FF2B5EF4-FFF2-40B4-BE49-F238E27FC236}">
+                <a16:creationId xmlns:a16="http://schemas.microsoft.com/office/drawing/2014/main" id="{41F7A03C-8DB7-28BC-B626-34829A22A586}"/>
+              </a:ext>
+            </a:extLst>
+          </p:cNvPr>
+          <p:cNvSpPr>
+            <a:spLocks noGrp="1"/>
+          </p:cNvSpPr>
+          <p:nvPr>
+            <p:ph type="title"/>
+          </p:nvPr>
+        </p:nvSpPr>
+        <p:spPr>
+          <a:xfrm>
+            <a:off x="228600" y="144198"/>
+            <a:ext cx="8686800" cy="514350"/>
+          </a:xfrm>
+        </p:spPr>
+        <p:txBody>
+          <a:bodyPr wrap="square" anchor="ctr">
+            <a:normAutofit/>
+          </a:bodyPr>
+          <a:lstStyle/>
+          <a:p>
+            <a:pPr>
+              <a:lnSpc>
+                <a:spcPct val="90000"/>
+              </a:lnSpc>
+            </a:pPr>
+            <a:r>
+              <a:rPr lang="en-US" dirty="0"/>
+              <a:t>Results</a:t>
+            </a:r>
+            <a:endParaRPr lang="en-US"/>
+          </a:p>
+        </p:txBody>
+      </p:sp>
+      <p:sp>
+        <p:nvSpPr>
+          <p:cNvPr id="10" name="Slide Number Placeholder 3">
+            <a:extLst>
+              <a:ext uri="{FF2B5EF4-FFF2-40B4-BE49-F238E27FC236}">
+                <a16:creationId xmlns:a16="http://schemas.microsoft.com/office/drawing/2014/main" id="{984FF0FA-BF41-AFEF-1D96-6180F269E3C2}"/>
+              </a:ext>
+            </a:extLst>
+          </p:cNvPr>
+          <p:cNvSpPr>
+            <a:spLocks noGrp="1"/>
+          </p:cNvSpPr>
+          <p:nvPr>
+            <p:ph type="sldNum" sz="quarter" idx="12"/>
+          </p:nvPr>
+        </p:nvSpPr>
+        <p:spPr>
+          <a:xfrm>
+            <a:off x="228600" y="4629150"/>
+            <a:ext cx="914400" cy="171450"/>
+          </a:xfrm>
+        </p:spPr>
+        <p:txBody>
+          <a:bodyPr/>
+          <a:lstStyle/>
+          <a:p>
+            <a:pPr>
+              <a:spcAft>
+                <a:spcPts val="600"/>
+              </a:spcAft>
+              <a:defRPr/>
+            </a:pPr>
+            <a:fld id="{B586D440-F702-449A-AAC2-9ACFF17038B8}" type="slidenum">
+              <a:rPr lang="en-US" smtClean="0"/>
+              <a:pPr>
+                <a:spcAft>
+                  <a:spcPts val="600"/>
+                </a:spcAft>
+                <a:defRPr/>
+              </a:pPr>
+              <a:t>25</a:t>
+            </a:fld>
+            <a:endParaRPr lang="en-US" dirty="0"/>
+          </a:p>
+        </p:txBody>
+      </p:sp>
+      <mc:AlternateContent xmlns:mc="http://schemas.openxmlformats.org/markup-compatibility/2006">
+        <mc:Choice xmlns:a14="http://schemas.microsoft.com/office/drawing/2010/main" Requires="a14">
+          <p:sp>
+            <p:nvSpPr>
+              <p:cNvPr id="7" name="Content Placeholder 6">
+                <a:extLst>
+                  <a:ext uri="{FF2B5EF4-FFF2-40B4-BE49-F238E27FC236}">
+                    <a16:creationId xmlns:a16="http://schemas.microsoft.com/office/drawing/2014/main" id="{1DEFE8A0-4D1E-552F-CB70-E731BD01A910}"/>
+                  </a:ext>
+                </a:extLst>
+              </p:cNvPr>
+              <p:cNvSpPr>
+                <a:spLocks noGrp="1"/>
+              </p:cNvSpPr>
+              <p:nvPr>
+                <p:ph idx="1"/>
+              </p:nvPr>
+            </p:nvSpPr>
+            <p:spPr/>
+            <p:txBody>
+              <a:bodyPr/>
+              <a:lstStyle/>
+              <a:p>
+                <a:r>
+                  <a:rPr lang="en-US" dirty="0"/>
+                  <a:t>We see that the designs are all similar</a:t>
+                </a:r>
+              </a:p>
+              <a:p>
+                <a:r>
+                  <a:rPr lang="en-US" dirty="0"/>
+                  <a:t>Using hydrogen decreases </a:t>
+                </a:r>
+                <a14:m>
+                  <m:oMath xmlns:m="http://schemas.openxmlformats.org/officeDocument/2006/math">
+                    <m:sSub>
+                      <m:sSubPr>
+                        <m:ctrlPr>
+                          <a:rPr lang="en-US" b="0" i="1" smtClean="0">
+                            <a:latin typeface="Cambria Math" panose="02040503050406030204" pitchFamily="18" charset="0"/>
+                          </a:rPr>
+                        </m:ctrlPr>
+                      </m:sSubPr>
+                      <m:e>
+                        <m:r>
+                          <a:rPr lang="en-US" b="0" i="1" smtClean="0">
+                            <a:latin typeface="Cambria Math" panose="02040503050406030204" pitchFamily="18" charset="0"/>
+                          </a:rPr>
+                          <m:t>𝑇</m:t>
+                        </m:r>
+                      </m:e>
+                      <m:sub>
+                        <m:r>
+                          <a:rPr lang="en-US" b="0" i="1" smtClean="0">
+                            <a:latin typeface="Cambria Math" panose="02040503050406030204" pitchFamily="18" charset="0"/>
+                          </a:rPr>
+                          <m:t>4,</m:t>
+                        </m:r>
+                        <m:r>
+                          <a:rPr lang="en-US" b="0" i="1" smtClean="0">
+                            <a:latin typeface="Cambria Math" panose="02040503050406030204" pitchFamily="18" charset="0"/>
+                          </a:rPr>
+                          <m:t>𝑅𝑇𝑂</m:t>
+                        </m:r>
+                      </m:sub>
+                    </m:sSub>
+                  </m:oMath>
+                </a14:m>
+                <a:endParaRPr lang="en-US" dirty="0"/>
+              </a:p>
+              <a:p>
+                <a:r>
+                  <a:rPr lang="en-US" dirty="0"/>
+                  <a:t>Fan PR increases with hydrogen and water recovery</a:t>
+                </a:r>
+              </a:p>
+              <a:p>
+                <a:r>
+                  <a:rPr lang="en-US" dirty="0"/>
+                  <a:t>OPR increases due to higher FAR in core</a:t>
+                </a:r>
+              </a:p>
+              <a:p>
+                <a14:m>
+                  <m:oMath xmlns:m="http://schemas.openxmlformats.org/officeDocument/2006/math">
+                    <m:sSub>
+                      <m:sSubPr>
+                        <m:ctrlPr>
+                          <a:rPr lang="en-US" b="0" i="1" smtClean="0">
+                            <a:latin typeface="Cambria Math" panose="02040503050406030204" pitchFamily="18" charset="0"/>
+                          </a:rPr>
+                        </m:ctrlPr>
+                      </m:sSubPr>
+                      <m:e>
+                        <m:r>
+                          <a:rPr lang="en-US" b="0" i="1" smtClean="0">
+                            <a:latin typeface="Cambria Math" panose="02040503050406030204" pitchFamily="18" charset="0"/>
+                          </a:rPr>
+                          <m:t>𝑇</m:t>
+                        </m:r>
+                      </m:e>
+                      <m:sub>
+                        <m:r>
+                          <a:rPr lang="en-US" b="0" i="1" smtClean="0">
+                            <a:latin typeface="Cambria Math" panose="02040503050406030204" pitchFamily="18" charset="0"/>
+                          </a:rPr>
+                          <m:t>4,</m:t>
+                        </m:r>
+                        <m:r>
+                          <a:rPr lang="en-US" b="0" i="1" smtClean="0">
+                            <a:latin typeface="Cambria Math" panose="02040503050406030204" pitchFamily="18" charset="0"/>
+                          </a:rPr>
+                          <m:t>𝑟𝑎𝑡𝑖𝑜</m:t>
+                        </m:r>
+                      </m:sub>
+                    </m:sSub>
+                  </m:oMath>
+                </a14:m>
+                <a:r>
+                  <a:rPr lang="en-US" dirty="0"/>
+                  <a:t> decreases with water recovery</a:t>
+                </a:r>
+              </a:p>
+              <a:p>
+                <a:pPr marL="0" indent="0">
+                  <a:buNone/>
+                </a:pPr>
+                <a:endParaRPr lang="en-US" dirty="0"/>
+              </a:p>
+            </p:txBody>
+          </p:sp>
+        </mc:Choice>
+        <mc:Fallback>
+          <p:sp>
+            <p:nvSpPr>
+              <p:cNvPr id="7" name="Content Placeholder 6">
+                <a:extLst>
+                  <a:ext uri="{FF2B5EF4-FFF2-40B4-BE49-F238E27FC236}">
+                    <a16:creationId xmlns:a16="http://schemas.microsoft.com/office/drawing/2014/main" id="{1DEFE8A0-4D1E-552F-CB70-E731BD01A910}"/>
+                  </a:ext>
+                </a:extLst>
+              </p:cNvPr>
+              <p:cNvSpPr>
+                <a:spLocks noGrp="1" noRot="1" noChangeAspect="1" noMove="1" noResize="1" noEditPoints="1" noAdjustHandles="1" noChangeArrowheads="1" noChangeShapeType="1" noTextEdit="1"/>
+              </p:cNvSpPr>
+              <p:nvPr>
+                <p:ph idx="1"/>
+              </p:nvPr>
+            </p:nvSpPr>
+            <p:spPr>
+              <a:blipFill>
+                <a:blip r:embed="rId2"/>
+                <a:stretch>
+                  <a:fillRect l="-1022" t="-1504"/>
+                </a:stretch>
+              </a:blipFill>
+            </p:spPr>
+            <p:txBody>
+              <a:bodyPr/>
+              <a:lstStyle/>
+              <a:p>
+                <a:r>
+                  <a:rPr lang="en-US">
+                    <a:noFill/>
+                  </a:rPr>
+                  <a:t> </a:t>
+                </a:r>
+              </a:p>
+            </p:txBody>
+          </p:sp>
+        </mc:Fallback>
+      </mc:AlternateContent>
+    </p:spTree>
+    <p:extLst>
+      <p:ext uri="{BB962C8B-B14F-4D97-AF65-F5344CB8AC3E}">
+        <p14:creationId xmlns:p14="http://schemas.microsoft.com/office/powerpoint/2010/main" val="2057326603"/>
+      </p:ext>
+    </p:extLst>
+  </p:cSld>
+  <p:clrMapOvr>
+    <a:masterClrMapping/>
+  </p:clrMapOvr>
+</p:sld>
+</file>
+
+<file path=ppt/slides/slide26.xml><?xml version="1.0" encoding="utf-8"?>
+<p:sld xmlns:a="http://schemas.openxmlformats.org/drawingml/2006/main" xmlns:r="http://schemas.openxmlformats.org/officeDocument/2006/relationships" xmlns:p="http://schemas.openxmlformats.org/presentationml/2006/main">
+  <p:cSld>
+    <p:spTree>
+      <p:nvGrpSpPr>
+        <p:cNvPr id="1" name=""/>
+        <p:cNvGrpSpPr/>
+        <p:nvPr/>
+      </p:nvGrpSpPr>
+      <p:grpSpPr>
+        <a:xfrm>
+          <a:off x="0" y="0"/>
+          <a:ext cx="0" cy="0"/>
+          <a:chOff x="0" y="0"/>
+          <a:chExt cx="0" cy="0"/>
+        </a:xfrm>
+      </p:grpSpPr>
+      <p:sp>
+        <p:nvSpPr>
+          <p:cNvPr id="2" name="Title 1">
+            <a:extLst>
+              <a:ext uri="{FF2B5EF4-FFF2-40B4-BE49-F238E27FC236}">
+                <a16:creationId xmlns:a16="http://schemas.microsoft.com/office/drawing/2014/main" id="{41F7A03C-8DB7-28BC-B626-34829A22A586}"/>
+              </a:ext>
+            </a:extLst>
+          </p:cNvPr>
+          <p:cNvSpPr>
+            <a:spLocks noGrp="1"/>
+          </p:cNvSpPr>
+          <p:nvPr>
+            <p:ph type="title"/>
+          </p:nvPr>
+        </p:nvSpPr>
+        <p:spPr>
+          <a:xfrm>
+            <a:off x="228600" y="144198"/>
+            <a:ext cx="8686800" cy="514350"/>
+          </a:xfrm>
+        </p:spPr>
+        <p:txBody>
+          <a:bodyPr wrap="square" anchor="ctr">
+            <a:normAutofit/>
+          </a:bodyPr>
+          <a:lstStyle/>
+          <a:p>
+            <a:pPr>
+              <a:lnSpc>
+                <a:spcPct val="90000"/>
+              </a:lnSpc>
+            </a:pPr>
+            <a:r>
+              <a:rPr lang="en-US" dirty="0"/>
+              <a:t>Results</a:t>
+            </a:r>
+            <a:endParaRPr lang="en-US"/>
+          </a:p>
+        </p:txBody>
+      </p:sp>
+      <p:sp>
+        <p:nvSpPr>
+          <p:cNvPr id="10" name="Slide Number Placeholder 3">
+            <a:extLst>
+              <a:ext uri="{FF2B5EF4-FFF2-40B4-BE49-F238E27FC236}">
+                <a16:creationId xmlns:a16="http://schemas.microsoft.com/office/drawing/2014/main" id="{984FF0FA-BF41-AFEF-1D96-6180F269E3C2}"/>
+              </a:ext>
+            </a:extLst>
+          </p:cNvPr>
+          <p:cNvSpPr>
+            <a:spLocks noGrp="1"/>
+          </p:cNvSpPr>
+          <p:nvPr>
+            <p:ph type="sldNum" sz="quarter" idx="12"/>
+          </p:nvPr>
+        </p:nvSpPr>
+        <p:spPr>
+          <a:xfrm>
+            <a:off x="228600" y="4629150"/>
+            <a:ext cx="914400" cy="171450"/>
+          </a:xfrm>
+        </p:spPr>
+        <p:txBody>
+          <a:bodyPr/>
+          <a:lstStyle/>
+          <a:p>
+            <a:pPr>
+              <a:spcAft>
+                <a:spcPts val="600"/>
+              </a:spcAft>
+              <a:defRPr/>
+            </a:pPr>
+            <a:fld id="{B586D440-F702-449A-AAC2-9ACFF17038B8}" type="slidenum">
+              <a:rPr lang="en-US" smtClean="0"/>
+              <a:pPr>
+                <a:spcAft>
+                  <a:spcPts val="600"/>
+                </a:spcAft>
+                <a:defRPr/>
+              </a:pPr>
+              <a:t>26</a:t>
+            </a:fld>
+            <a:endParaRPr lang="en-US" dirty="0"/>
+          </a:p>
+        </p:txBody>
+      </p:sp>
+      <p:sp>
+        <p:nvSpPr>
+          <p:cNvPr id="7" name="Content Placeholder 6">
+            <a:extLst>
+              <a:ext uri="{FF2B5EF4-FFF2-40B4-BE49-F238E27FC236}">
+                <a16:creationId xmlns:a16="http://schemas.microsoft.com/office/drawing/2014/main" id="{1DEFE8A0-4D1E-552F-CB70-E731BD01A910}"/>
+              </a:ext>
+            </a:extLst>
+          </p:cNvPr>
+          <p:cNvSpPr>
+            <a:spLocks noGrp="1"/>
+          </p:cNvSpPr>
+          <p:nvPr>
+            <p:ph idx="1"/>
+          </p:nvPr>
+        </p:nvSpPr>
+        <p:spPr/>
+        <p:txBody>
+          <a:bodyPr/>
+          <a:lstStyle/>
+          <a:p>
+            <a:r>
+              <a:rPr lang="en-US" dirty="0"/>
+              <a:t>Water recovery is pushed to the upper limit that the model can resolve (30% for Jet-A and 17% for H2)</a:t>
+            </a:r>
+          </a:p>
+          <a:p>
+            <a:r>
+              <a:rPr lang="en-US" dirty="0"/>
+              <a:t>Water recovery results in significant efficiency improvements</a:t>
+            </a:r>
+          </a:p>
+          <a:p>
+            <a:pPr marL="0" indent="0">
+              <a:buNone/>
+            </a:pPr>
+            <a:endParaRPr lang="en-US" dirty="0"/>
+          </a:p>
+        </p:txBody>
+      </p:sp>
+      <p:pic>
+        <p:nvPicPr>
+          <p:cNvPr id="4" name="Picture 3">
+            <a:extLst>
+              <a:ext uri="{FF2B5EF4-FFF2-40B4-BE49-F238E27FC236}">
+                <a16:creationId xmlns:a16="http://schemas.microsoft.com/office/drawing/2014/main" id="{30CAE94E-F307-3D12-8BEB-85C3870BF0AD}"/>
+              </a:ext>
+            </a:extLst>
+          </p:cNvPr>
+          <p:cNvPicPr>
+            <a:picLocks noChangeAspect="1"/>
+          </p:cNvPicPr>
+          <p:nvPr/>
+        </p:nvPicPr>
+        <p:blipFill>
+          <a:blip r:embed="rId2">
+            <a:extLst>
+              <a:ext uri="{28A0092B-C50C-407E-A947-70E740481C1C}">
+                <a14:useLocalDpi xmlns:a14="http://schemas.microsoft.com/office/drawing/2010/main" val="0"/>
+              </a:ext>
+            </a:extLst>
+          </a:blip>
+          <a:stretch>
+            <a:fillRect/>
+          </a:stretch>
+        </p:blipFill>
+        <p:spPr>
+          <a:xfrm>
+            <a:off x="3781887" y="2704941"/>
+            <a:ext cx="5131227" cy="1924210"/>
+          </a:xfrm>
+          <a:prstGeom prst="rect">
+            <a:avLst/>
+          </a:prstGeom>
+        </p:spPr>
+      </p:pic>
+    </p:spTree>
+    <p:extLst>
+      <p:ext uri="{BB962C8B-B14F-4D97-AF65-F5344CB8AC3E}">
+        <p14:creationId xmlns:p14="http://schemas.microsoft.com/office/powerpoint/2010/main" val="1278663531"/>
+      </p:ext>
+    </p:extLst>
+  </p:cSld>
+  <p:clrMapOvr>
+    <a:masterClrMapping/>
+  </p:clrMapOvr>
+</p:sld>
+</file>
+
+<file path=ppt/slides/slide27.xml><?xml version="1.0" encoding="utf-8"?>
+<p:sld xmlns:a="http://schemas.openxmlformats.org/drawingml/2006/main" xmlns:r="http://schemas.openxmlformats.org/officeDocument/2006/relationships" xmlns:p="http://schemas.openxmlformats.org/presentationml/2006/main">
+  <p:cSld>
+    <p:spTree>
+      <p:nvGrpSpPr>
+        <p:cNvPr id="1" name=""/>
+        <p:cNvGrpSpPr/>
+        <p:nvPr/>
+      </p:nvGrpSpPr>
+      <p:grpSpPr>
+        <a:xfrm>
+          <a:off x="0" y="0"/>
+          <a:ext cx="0" cy="0"/>
+          <a:chOff x="0" y="0"/>
+          <a:chExt cx="0" cy="0"/>
+        </a:xfrm>
+      </p:grpSpPr>
+      <p:sp>
+        <p:nvSpPr>
+          <p:cNvPr id="2" name="Title 1">
+            <a:extLst>
+              <a:ext uri="{FF2B5EF4-FFF2-40B4-BE49-F238E27FC236}">
+                <a16:creationId xmlns:a16="http://schemas.microsoft.com/office/drawing/2014/main" id="{7422FE3E-20BE-41BF-466A-8AC3BF3FE228}"/>
+              </a:ext>
+            </a:extLst>
+          </p:cNvPr>
+          <p:cNvSpPr>
+            <a:spLocks noGrp="1"/>
+          </p:cNvSpPr>
+          <p:nvPr>
+            <p:ph type="title"/>
+          </p:nvPr>
+        </p:nvSpPr>
+        <p:spPr/>
+        <p:txBody>
+          <a:bodyPr/>
+          <a:lstStyle/>
+          <a:p>
+            <a:r>
+              <a:rPr lang="en-US" dirty="0"/>
+              <a:t>Computational Tools</a:t>
+            </a:r>
+          </a:p>
+        </p:txBody>
+      </p:sp>
+      <p:sp>
+        <p:nvSpPr>
+          <p:cNvPr id="3" name="Content Placeholder 2">
+            <a:extLst>
+              <a:ext uri="{FF2B5EF4-FFF2-40B4-BE49-F238E27FC236}">
+                <a16:creationId xmlns:a16="http://schemas.microsoft.com/office/drawing/2014/main" id="{5C9D6E72-BB4A-D2B1-9811-E991FFC038F5}"/>
+              </a:ext>
+            </a:extLst>
+          </p:cNvPr>
+          <p:cNvSpPr>
+            <a:spLocks noGrp="1"/>
+          </p:cNvSpPr>
+          <p:nvPr>
+            <p:ph idx="1"/>
+          </p:nvPr>
+        </p:nvSpPr>
+        <p:spPr/>
+        <p:txBody>
+          <a:bodyPr/>
+          <a:lstStyle/>
+          <a:p>
+            <a:r>
+              <a:rPr lang="en-US" dirty="0">
+                <a:solidFill>
+                  <a:schemeClr val="bg1">
+                    <a:lumMod val="65000"/>
+                  </a:schemeClr>
+                </a:solidFill>
+              </a:rPr>
+              <a:t>Computational Tools</a:t>
+            </a:r>
+          </a:p>
+          <a:p>
+            <a:r>
+              <a:rPr lang="en-US" dirty="0">
+                <a:solidFill>
+                  <a:schemeClr val="bg1">
+                    <a:lumMod val="65000"/>
+                  </a:schemeClr>
+                </a:solidFill>
+              </a:rPr>
+              <a:t>Water Recovery Model</a:t>
+            </a:r>
+            <a:endParaRPr lang="en-US" dirty="0">
+              <a:solidFill>
+                <a:schemeClr val="bg1">
+                  <a:lumMod val="75000"/>
+                </a:schemeClr>
+              </a:solidFill>
+            </a:endParaRPr>
+          </a:p>
+          <a:p>
+            <a:r>
+              <a:rPr lang="en-US" dirty="0">
+                <a:solidFill>
+                  <a:schemeClr val="bg1">
+                    <a:lumMod val="65000"/>
+                  </a:schemeClr>
+                </a:solidFill>
+              </a:rPr>
+              <a:t>Propulsion Model</a:t>
+            </a:r>
+          </a:p>
+          <a:p>
+            <a:r>
+              <a:rPr lang="en-US" dirty="0">
+                <a:solidFill>
+                  <a:schemeClr val="bg1">
+                    <a:lumMod val="65000"/>
+                  </a:schemeClr>
+                </a:solidFill>
+              </a:rPr>
+              <a:t>Optimization Problem</a:t>
+            </a:r>
+          </a:p>
+          <a:p>
+            <a:r>
+              <a:rPr lang="en-US" dirty="0">
+                <a:solidFill>
+                  <a:schemeClr val="bg1">
+                    <a:lumMod val="65000"/>
+                  </a:schemeClr>
+                </a:solidFill>
+              </a:rPr>
+              <a:t>Results</a:t>
+            </a:r>
+          </a:p>
+          <a:p>
+            <a:r>
+              <a:rPr lang="en-US" dirty="0"/>
+              <a:t>Condenser Design Space Sweep</a:t>
+            </a:r>
+          </a:p>
+          <a:p>
+            <a:r>
+              <a:rPr lang="en-US" dirty="0">
+                <a:solidFill>
+                  <a:schemeClr val="bg1">
+                    <a:lumMod val="65000"/>
+                  </a:schemeClr>
+                </a:solidFill>
+              </a:rPr>
+              <a:t>Summary</a:t>
+            </a:r>
+          </a:p>
+          <a:p>
+            <a:pPr marL="0" indent="0">
+              <a:buNone/>
+            </a:pPr>
+            <a:endParaRPr lang="en-US" dirty="0"/>
+          </a:p>
+        </p:txBody>
+      </p:sp>
+    </p:spTree>
+    <p:extLst>
+      <p:ext uri="{BB962C8B-B14F-4D97-AF65-F5344CB8AC3E}">
+        <p14:creationId xmlns:p14="http://schemas.microsoft.com/office/powerpoint/2010/main" val="134533933"/>
+      </p:ext>
+    </p:extLst>
+  </p:cSld>
+  <p:clrMapOvr>
+    <a:masterClrMapping/>
+  </p:clrMapOvr>
+</p:sld>
+</file>
+
+<file path=ppt/slides/slide28.xml><?xml version="1.0" encoding="utf-8"?>
+<p:sld xmlns:a="http://schemas.openxmlformats.org/drawingml/2006/main" xmlns:r="http://schemas.openxmlformats.org/officeDocument/2006/relationships" xmlns:p="http://schemas.openxmlformats.org/presentationml/2006/main">
+  <p:cSld>
+    <p:spTree>
+      <p:nvGrpSpPr>
+        <p:cNvPr id="1" name=""/>
+        <p:cNvGrpSpPr/>
+        <p:nvPr/>
+      </p:nvGrpSpPr>
+      <p:grpSpPr>
+        <a:xfrm>
+          <a:off x="0" y="0"/>
+          <a:ext cx="0" cy="0"/>
+          <a:chOff x="0" y="0"/>
+          <a:chExt cx="0" cy="0"/>
+        </a:xfrm>
+      </p:grpSpPr>
+      <p:sp>
+        <p:nvSpPr>
+          <p:cNvPr id="9" name="Content Placeholder 8">
+            <a:extLst>
+              <a:ext uri="{FF2B5EF4-FFF2-40B4-BE49-F238E27FC236}">
+                <a16:creationId xmlns:a16="http://schemas.microsoft.com/office/drawing/2014/main" id="{DC8CF2AE-A3E1-3987-F501-C8AFD59BF3B7}"/>
+              </a:ext>
+            </a:extLst>
+          </p:cNvPr>
+          <p:cNvSpPr>
+            <a:spLocks noGrp="1"/>
+          </p:cNvSpPr>
+          <p:nvPr>
+            <p:ph idx="1"/>
+          </p:nvPr>
+        </p:nvSpPr>
+        <p:spPr>
+          <a:xfrm>
+            <a:off x="230885" y="1123950"/>
+            <a:ext cx="6322450" cy="3363648"/>
+          </a:xfrm>
+        </p:spPr>
+        <p:txBody>
+          <a:bodyPr/>
+          <a:lstStyle/>
+          <a:p>
+            <a:r>
+              <a:rPr lang="en-US" dirty="0"/>
+              <a:t>The model assumes no pressure loss during vapor recovery</a:t>
+            </a:r>
+          </a:p>
+          <a:p>
+            <a:r>
+              <a:rPr lang="en-US" dirty="0"/>
+              <a:t>We performed a study to explore the design space of an exhaust water condenser</a:t>
+            </a:r>
+          </a:p>
+        </p:txBody>
+      </p:sp>
+      <p:sp>
+        <p:nvSpPr>
+          <p:cNvPr id="2" name="Title 1">
+            <a:extLst>
+              <a:ext uri="{FF2B5EF4-FFF2-40B4-BE49-F238E27FC236}">
+                <a16:creationId xmlns:a16="http://schemas.microsoft.com/office/drawing/2014/main" id="{41F7A03C-8DB7-28BC-B626-34829A22A586}"/>
+              </a:ext>
+            </a:extLst>
+          </p:cNvPr>
+          <p:cNvSpPr>
+            <a:spLocks noGrp="1"/>
+          </p:cNvSpPr>
+          <p:nvPr>
+            <p:ph type="title"/>
+          </p:nvPr>
+        </p:nvSpPr>
+        <p:spPr/>
+        <p:txBody>
+          <a:bodyPr/>
+          <a:lstStyle/>
+          <a:p>
+            <a:r>
+              <a:rPr lang="en-US" dirty="0"/>
+              <a:t>Condenser Design Space Sweep</a:t>
+            </a:r>
+          </a:p>
+        </p:txBody>
+      </p:sp>
+      <p:pic>
+        <p:nvPicPr>
+          <p:cNvPr id="10" name="Content Placeholder 5">
+            <a:extLst>
+              <a:ext uri="{FF2B5EF4-FFF2-40B4-BE49-F238E27FC236}">
+                <a16:creationId xmlns:a16="http://schemas.microsoft.com/office/drawing/2014/main" id="{3F64404C-B211-539B-84AC-4C03AA45C167}"/>
+              </a:ext>
+            </a:extLst>
+          </p:cNvPr>
+          <p:cNvPicPr>
+            <a:picLocks noChangeAspect="1"/>
+          </p:cNvPicPr>
+          <p:nvPr/>
+        </p:nvPicPr>
+        <p:blipFill rotWithShape="1">
+          <a:blip r:embed="rId2">
+            <a:extLst>
+              <a:ext uri="{28A0092B-C50C-407E-A947-70E740481C1C}">
+                <a14:useLocalDpi xmlns:a14="http://schemas.microsoft.com/office/drawing/2010/main" val="0"/>
+              </a:ext>
+            </a:extLst>
+          </a:blip>
+          <a:srcRect l="61048"/>
+          <a:stretch/>
+        </p:blipFill>
+        <p:spPr>
+          <a:xfrm>
+            <a:off x="6171595" y="787545"/>
+            <a:ext cx="2590665" cy="3700053"/>
+          </a:xfrm>
+          <a:prstGeom prst="rect">
+            <a:avLst/>
+          </a:prstGeom>
+          <a:noFill/>
+        </p:spPr>
+      </p:pic>
+    </p:spTree>
+    <p:extLst>
+      <p:ext uri="{BB962C8B-B14F-4D97-AF65-F5344CB8AC3E}">
+        <p14:creationId xmlns:p14="http://schemas.microsoft.com/office/powerpoint/2010/main" val="653559669"/>
+      </p:ext>
+    </p:extLst>
+  </p:cSld>
+  <p:clrMapOvr>
+    <a:masterClrMapping/>
+  </p:clrMapOvr>
+</p:sld>
+</file>
+
+<file path=ppt/slides/slide29.xml><?xml version="1.0" encoding="utf-8"?>
+<p:sld xmlns:a="http://schemas.openxmlformats.org/drawingml/2006/main" xmlns:r="http://schemas.openxmlformats.org/officeDocument/2006/relationships" xmlns:p="http://schemas.openxmlformats.org/presentationml/2006/main">
+  <p:cSld>
+    <p:spTree>
+      <p:nvGrpSpPr>
+        <p:cNvPr id="1" name=""/>
+        <p:cNvGrpSpPr/>
+        <p:nvPr/>
+      </p:nvGrpSpPr>
+      <p:grpSpPr>
+        <a:xfrm>
+          <a:off x="0" y="0"/>
+          <a:ext cx="0" cy="0"/>
+          <a:chOff x="0" y="0"/>
+          <a:chExt cx="0" cy="0"/>
+        </a:xfrm>
+      </p:grpSpPr>
+      <p:pic>
+        <p:nvPicPr>
+          <p:cNvPr id="6" name="Content Placeholder 4">
+            <a:extLst>
+              <a:ext uri="{FF2B5EF4-FFF2-40B4-BE49-F238E27FC236}">
+                <a16:creationId xmlns:a16="http://schemas.microsoft.com/office/drawing/2014/main" id="{A573E3BA-C683-766E-AC6C-B356D1E8F1A1}"/>
+              </a:ext>
+            </a:extLst>
+          </p:cNvPr>
+          <p:cNvPicPr>
+            <a:picLocks noChangeAspect="1"/>
+          </p:cNvPicPr>
+          <p:nvPr/>
+        </p:nvPicPr>
+        <p:blipFill>
+          <a:blip r:embed="rId2">
+            <a:extLst>
+              <a:ext uri="{28A0092B-C50C-407E-A947-70E740481C1C}">
+                <a14:useLocalDpi xmlns:a14="http://schemas.microsoft.com/office/drawing/2010/main" val="0"/>
+              </a:ext>
+            </a:extLst>
+          </a:blip>
+          <a:stretch>
+            <a:fillRect/>
+          </a:stretch>
+        </p:blipFill>
+        <p:spPr bwMode="auto">
+          <a:xfrm>
+            <a:off x="452761" y="1793290"/>
+            <a:ext cx="4119239" cy="2746159"/>
+          </a:xfrm>
+          <a:prstGeom prst="rect">
+            <a:avLst/>
+          </a:prstGeom>
+          <a:noFill/>
+          <a:ln w="9525">
+            <a:noFill/>
+            <a:miter lim="800000"/>
+            <a:headEnd/>
+            <a:tailEnd/>
+          </a:ln>
+        </p:spPr>
+      </p:pic>
+      <p:sp>
+        <p:nvSpPr>
+          <p:cNvPr id="2" name="Title 1">
+            <a:extLst>
+              <a:ext uri="{FF2B5EF4-FFF2-40B4-BE49-F238E27FC236}">
+                <a16:creationId xmlns:a16="http://schemas.microsoft.com/office/drawing/2014/main" id="{41F7A03C-8DB7-28BC-B626-34829A22A586}"/>
+              </a:ext>
+            </a:extLst>
+          </p:cNvPr>
+          <p:cNvSpPr>
+            <a:spLocks noGrp="1"/>
+          </p:cNvSpPr>
+          <p:nvPr>
+            <p:ph type="title"/>
+          </p:nvPr>
+        </p:nvSpPr>
+        <p:spPr/>
+        <p:txBody>
+          <a:bodyPr/>
+          <a:lstStyle/>
+          <a:p>
+            <a:r>
+              <a:rPr lang="en-US" dirty="0"/>
+              <a:t>Condenser Design Space Sweep</a:t>
+            </a:r>
+          </a:p>
+        </p:txBody>
+      </p:sp>
+      <p:pic>
+        <p:nvPicPr>
+          <p:cNvPr id="7" name="Picture 6">
+            <a:extLst>
+              <a:ext uri="{FF2B5EF4-FFF2-40B4-BE49-F238E27FC236}">
+                <a16:creationId xmlns:a16="http://schemas.microsoft.com/office/drawing/2014/main" id="{6759C00C-1F67-DBF6-419A-ACE1C33EC041}"/>
+              </a:ext>
+            </a:extLst>
+          </p:cNvPr>
+          <p:cNvPicPr>
+            <a:picLocks noChangeAspect="1"/>
+          </p:cNvPicPr>
+          <p:nvPr/>
+        </p:nvPicPr>
+        <p:blipFill>
+          <a:blip r:embed="rId3">
+            <a:extLst>
+              <a:ext uri="{28A0092B-C50C-407E-A947-70E740481C1C}">
+                <a14:useLocalDpi xmlns:a14="http://schemas.microsoft.com/office/drawing/2010/main" val="0"/>
+              </a:ext>
+            </a:extLst>
+          </a:blip>
+          <a:stretch>
+            <a:fillRect/>
+          </a:stretch>
+        </p:blipFill>
+        <p:spPr>
+          <a:xfrm>
+            <a:off x="4572000" y="1793289"/>
+            <a:ext cx="4119239" cy="2746159"/>
+          </a:xfrm>
+          <a:prstGeom prst="rect">
+            <a:avLst/>
+          </a:prstGeom>
+        </p:spPr>
+      </p:pic>
+      <p:sp>
+        <p:nvSpPr>
+          <p:cNvPr id="4" name="Content Placeholder 3">
+            <a:extLst>
+              <a:ext uri="{FF2B5EF4-FFF2-40B4-BE49-F238E27FC236}">
+                <a16:creationId xmlns:a16="http://schemas.microsoft.com/office/drawing/2014/main" id="{390EC533-690F-2663-9038-3B7C50958137}"/>
+              </a:ext>
+            </a:extLst>
+          </p:cNvPr>
+          <p:cNvSpPr>
+            <a:spLocks noGrp="1"/>
+          </p:cNvSpPr>
+          <p:nvPr>
+            <p:ph idx="1"/>
+          </p:nvPr>
+        </p:nvSpPr>
+        <p:spPr/>
+        <p:txBody>
+          <a:bodyPr/>
+          <a:lstStyle/>
+          <a:p>
+            <a:r>
+              <a:rPr lang="en-US" dirty="0"/>
+              <a:t>The relative pressure drop in the exhaust stream was varied</a:t>
+            </a:r>
+          </a:p>
+          <a:p>
+            <a:r>
+              <a:rPr lang="en-US" dirty="0"/>
+              <a:t>Max performance benefits up to ~16% pressure drop</a:t>
+            </a:r>
+          </a:p>
+        </p:txBody>
+      </p:sp>
+    </p:spTree>
+    <p:extLst>
+      <p:ext uri="{BB962C8B-B14F-4D97-AF65-F5344CB8AC3E}">
+        <p14:creationId xmlns:p14="http://schemas.microsoft.com/office/powerpoint/2010/main" val="1327325499"/>
+      </p:ext>
+    </p:extLst>
+  </p:cSld>
+  <p:clrMapOvr>
+    <a:masterClrMapping/>
+  </p:clrMapOvr>
+</p:sld>
+</file>
+
+<file path=ppt/slides/slide3.xml><?xml version="1.0" encoding="utf-8"?>
+<p:sld xmlns:a="http://schemas.openxmlformats.org/drawingml/2006/main" xmlns:r="http://schemas.openxmlformats.org/officeDocument/2006/relationships" xmlns:p="http://schemas.openxmlformats.org/presentationml/2006/main">
+  <p:cSld>
+    <p:spTree>
+      <p:nvGrpSpPr>
+        <p:cNvPr id="1" name=""/>
+        <p:cNvGrpSpPr/>
+        <p:nvPr/>
+      </p:nvGrpSpPr>
+      <p:grpSpPr>
+        <a:xfrm>
+          <a:off x="0" y="0"/>
+          <a:ext cx="0" cy="0"/>
+          <a:chOff x="0" y="0"/>
+          <a:chExt cx="0" cy="0"/>
+        </a:xfrm>
+      </p:grpSpPr>
+      <p:sp>
+        <p:nvSpPr>
+          <p:cNvPr id="2" name="Title 1">
+            <a:extLst>
+              <a:ext uri="{FF2B5EF4-FFF2-40B4-BE49-F238E27FC236}">
+                <a16:creationId xmlns:a16="http://schemas.microsoft.com/office/drawing/2014/main" id="{41F7A03C-8DB7-28BC-B626-34829A22A586}"/>
+              </a:ext>
+            </a:extLst>
+          </p:cNvPr>
+          <p:cNvSpPr>
+            <a:spLocks noGrp="1"/>
+          </p:cNvSpPr>
+          <p:nvPr>
+            <p:ph type="title"/>
+          </p:nvPr>
+        </p:nvSpPr>
+        <p:spPr/>
+        <p:txBody>
+          <a:bodyPr/>
+          <a:lstStyle/>
+          <a:p>
+            <a:r>
+              <a:rPr lang="en-US" dirty="0"/>
+              <a:t>Motivation</a:t>
+            </a:r>
+          </a:p>
+        </p:txBody>
+      </p:sp>
+      <p:sp>
+        <p:nvSpPr>
+          <p:cNvPr id="3" name="Content Placeholder 2">
+            <a:extLst>
+              <a:ext uri="{FF2B5EF4-FFF2-40B4-BE49-F238E27FC236}">
+                <a16:creationId xmlns:a16="http://schemas.microsoft.com/office/drawing/2014/main" id="{330DAAFE-B17D-76AA-D153-E070EB098AE6}"/>
+              </a:ext>
+            </a:extLst>
+          </p:cNvPr>
+          <p:cNvSpPr>
+            <a:spLocks noGrp="1"/>
+          </p:cNvSpPr>
+          <p:nvPr>
+            <p:ph idx="1"/>
+          </p:nvPr>
+        </p:nvSpPr>
+        <p:spPr/>
+        <p:txBody>
+          <a:bodyPr/>
+          <a:lstStyle/>
+          <a:p>
+            <a:r>
+              <a:rPr lang="en-US" dirty="0"/>
+              <a:t>Modern turbofan engines can run off hydrogen with limited modifications</a:t>
+            </a:r>
+          </a:p>
+          <a:p>
+            <a:r>
+              <a:rPr lang="en-US" dirty="0"/>
+              <a:t>Hydrogen eliminates carbon emissions with water being the main by-product of combustion</a:t>
+            </a:r>
+          </a:p>
+        </p:txBody>
+      </p:sp>
+      <p:pic>
+        <p:nvPicPr>
+          <p:cNvPr id="2050" name="Picture 2" descr="Will green aviation be powered by hydrogen?">
+            <a:extLst>
+              <a:ext uri="{FF2B5EF4-FFF2-40B4-BE49-F238E27FC236}">
+                <a16:creationId xmlns:a16="http://schemas.microsoft.com/office/drawing/2014/main" id="{D86932CE-C8D7-1698-F6C4-26A85D0C938F}"/>
+              </a:ext>
+            </a:extLst>
+          </p:cNvPr>
+          <p:cNvPicPr>
+            <a:picLocks noChangeAspect="1" noChangeArrowheads="1"/>
+          </p:cNvPicPr>
+          <p:nvPr/>
+        </p:nvPicPr>
+        <p:blipFill>
+          <a:blip r:embed="rId3">
+            <a:extLst>
+              <a:ext uri="{28A0092B-C50C-407E-A947-70E740481C1C}">
+                <a14:useLocalDpi xmlns:a14="http://schemas.microsoft.com/office/drawing/2010/main" val="0"/>
+              </a:ext>
+            </a:extLst>
+          </a:blip>
+          <a:srcRect/>
+          <a:stretch>
+            <a:fillRect/>
+          </a:stretch>
+        </p:blipFill>
+        <p:spPr bwMode="auto">
+          <a:xfrm>
+            <a:off x="5060205" y="2565157"/>
+            <a:ext cx="3852909" cy="1922441"/>
+          </a:xfrm>
+          <a:prstGeom prst="rect">
+            <a:avLst/>
+          </a:prstGeom>
+          <a:noFill/>
+          <a:extLst>
+            <a:ext uri="{909E8E84-426E-40DD-AFC4-6F175D3DCCD1}">
+              <a14:hiddenFill xmlns:a14="http://schemas.microsoft.com/office/drawing/2010/main">
+                <a:solidFill>
+                  <a:srgbClr val="FFFFFF"/>
+                </a:solidFill>
+              </a14:hiddenFill>
+            </a:ext>
+          </a:extLst>
+        </p:spPr>
+      </p:pic>
+    </p:spTree>
+    <p:extLst>
+      <p:ext uri="{BB962C8B-B14F-4D97-AF65-F5344CB8AC3E}">
+        <p14:creationId xmlns:p14="http://schemas.microsoft.com/office/powerpoint/2010/main" val="3702104982"/>
+      </p:ext>
+    </p:extLst>
+  </p:cSld>
+  <p:clrMapOvr>
+    <a:masterClrMapping/>
+  </p:clrMapOvr>
+</p:sld>
+</file>
+
+<file path=ppt/slides/slide30.xml><?xml version="1.0" encoding="utf-8"?>
+<p:sld xmlns:a="http://schemas.openxmlformats.org/drawingml/2006/main" xmlns:r="http://schemas.openxmlformats.org/officeDocument/2006/relationships" xmlns:p="http://schemas.openxmlformats.org/presentationml/2006/main">
+  <p:cSld>
+    <p:spTree>
+      <p:nvGrpSpPr>
+        <p:cNvPr id="1" name=""/>
+        <p:cNvGrpSpPr/>
+        <p:nvPr/>
+      </p:nvGrpSpPr>
+      <p:grpSpPr>
+        <a:xfrm>
+          <a:off x="0" y="0"/>
+          <a:ext cx="0" cy="0"/>
+          <a:chOff x="0" y="0"/>
+          <a:chExt cx="0" cy="0"/>
+        </a:xfrm>
+      </p:grpSpPr>
+      <p:sp>
+        <p:nvSpPr>
+          <p:cNvPr id="2" name="Title 1">
+            <a:extLst>
+              <a:ext uri="{FF2B5EF4-FFF2-40B4-BE49-F238E27FC236}">
+                <a16:creationId xmlns:a16="http://schemas.microsoft.com/office/drawing/2014/main" id="{41F7A03C-8DB7-28BC-B626-34829A22A586}"/>
+              </a:ext>
+            </a:extLst>
+          </p:cNvPr>
+          <p:cNvSpPr>
+            <a:spLocks noGrp="1"/>
+          </p:cNvSpPr>
+          <p:nvPr>
+            <p:ph type="title"/>
+          </p:nvPr>
+        </p:nvSpPr>
+        <p:spPr/>
+        <p:txBody>
+          <a:bodyPr/>
+          <a:lstStyle/>
+          <a:p>
+            <a:r>
+              <a:rPr lang="en-US" dirty="0"/>
+              <a:t>Summary</a:t>
+            </a:r>
+          </a:p>
+        </p:txBody>
+      </p:sp>
+      <p:sp>
+        <p:nvSpPr>
+          <p:cNvPr id="3" name="Content Placeholder 2">
+            <a:extLst>
+              <a:ext uri="{FF2B5EF4-FFF2-40B4-BE49-F238E27FC236}">
+                <a16:creationId xmlns:a16="http://schemas.microsoft.com/office/drawing/2014/main" id="{330DAAFE-B17D-76AA-D153-E070EB098AE6}"/>
+              </a:ext>
+            </a:extLst>
+          </p:cNvPr>
+          <p:cNvSpPr>
+            <a:spLocks noGrp="1"/>
+          </p:cNvSpPr>
+          <p:nvPr>
+            <p:ph idx="1"/>
+          </p:nvPr>
+        </p:nvSpPr>
+        <p:spPr/>
+        <p:txBody>
+          <a:bodyPr/>
+          <a:lstStyle/>
+          <a:p>
+            <a:r>
+              <a:rPr lang="en-US" dirty="0"/>
+              <a:t>A novel closed-loop water recovery system was created and implemented in a turbofan engine</a:t>
+            </a:r>
+          </a:p>
+          <a:p>
+            <a:r>
+              <a:rPr lang="en-US" dirty="0"/>
+              <a:t>Jet-A and hydrogen engine performance was compared with water recovery</a:t>
+            </a:r>
+          </a:p>
+          <a:p>
+            <a:r>
+              <a:rPr lang="en-US" dirty="0"/>
+              <a:t>If a condenser can be designed in the design space presented, water recovery improves efficiency significantly</a:t>
+            </a:r>
+          </a:p>
+        </p:txBody>
+      </p:sp>
+    </p:spTree>
+    <p:extLst>
+      <p:ext uri="{BB962C8B-B14F-4D97-AF65-F5344CB8AC3E}">
+        <p14:creationId xmlns:p14="http://schemas.microsoft.com/office/powerpoint/2010/main" val="2380709232"/>
+      </p:ext>
+    </p:extLst>
+  </p:cSld>
+  <p:clrMapOvr>
+    <a:masterClrMapping/>
+  </p:clrMapOvr>
+</p:sld>
+</file>
+
+<file path=ppt/slides/slide31.xml><?xml version="1.0" encoding="utf-8"?>
+<p:sld xmlns:a="http://schemas.openxmlformats.org/drawingml/2006/main" xmlns:r="http://schemas.openxmlformats.org/officeDocument/2006/relationships" xmlns:p="http://schemas.openxmlformats.org/presentationml/2006/main">
+  <p:cSld>
+    <p:spTree>
+      <p:nvGrpSpPr>
+        <p:cNvPr id="1" name=""/>
+        <p:cNvGrpSpPr/>
+        <p:nvPr/>
+      </p:nvGrpSpPr>
+      <p:grpSpPr>
+        <a:xfrm>
+          <a:off x="0" y="0"/>
+          <a:ext cx="0" cy="0"/>
+          <a:chOff x="0" y="0"/>
+          <a:chExt cx="0" cy="0"/>
+        </a:xfrm>
+      </p:grpSpPr>
+      <p:sp>
+        <p:nvSpPr>
+          <p:cNvPr id="2" name="Title 1">
+            <a:extLst>
+              <a:ext uri="{FF2B5EF4-FFF2-40B4-BE49-F238E27FC236}">
+                <a16:creationId xmlns:a16="http://schemas.microsoft.com/office/drawing/2014/main" id="{41F7A03C-8DB7-28BC-B626-34829A22A586}"/>
+              </a:ext>
+            </a:extLst>
+          </p:cNvPr>
+          <p:cNvSpPr>
+            <a:spLocks noGrp="1"/>
+          </p:cNvSpPr>
+          <p:nvPr>
+            <p:ph type="title"/>
+          </p:nvPr>
+        </p:nvSpPr>
+        <p:spPr/>
+        <p:txBody>
+          <a:bodyPr/>
+          <a:lstStyle/>
+          <a:p>
+            <a:r>
+              <a:rPr lang="en-US" dirty="0"/>
+              <a:t>Backup</a:t>
+            </a:r>
+          </a:p>
+        </p:txBody>
+      </p:sp>
+      <p:sp>
+        <p:nvSpPr>
+          <p:cNvPr id="3" name="Content Placeholder 2">
+            <a:extLst>
+              <a:ext uri="{FF2B5EF4-FFF2-40B4-BE49-F238E27FC236}">
+                <a16:creationId xmlns:a16="http://schemas.microsoft.com/office/drawing/2014/main" id="{330DAAFE-B17D-76AA-D153-E070EB098AE6}"/>
+              </a:ext>
+            </a:extLst>
+          </p:cNvPr>
+          <p:cNvSpPr>
+            <a:spLocks noGrp="1"/>
+          </p:cNvSpPr>
+          <p:nvPr>
+            <p:ph idx="1"/>
+          </p:nvPr>
+        </p:nvSpPr>
+        <p:spPr/>
+        <p:txBody>
+          <a:bodyPr/>
+          <a:lstStyle/>
+          <a:p>
+            <a:endParaRPr lang="en-US"/>
+          </a:p>
+        </p:txBody>
+      </p:sp>
+    </p:spTree>
+    <p:extLst>
+      <p:ext uri="{BB962C8B-B14F-4D97-AF65-F5344CB8AC3E}">
+        <p14:creationId xmlns:p14="http://schemas.microsoft.com/office/powerpoint/2010/main" val="742115949"/>
+      </p:ext>
+    </p:extLst>
+  </p:cSld>
+  <p:clrMapOvr>
+    <a:masterClrMapping/>
+  </p:clrMapOvr>
+</p:sld>
+</file>
+
+<file path=ppt/slides/slide32.xml><?xml version="1.0" encoding="utf-8"?>
+<p:sld xmlns:a="http://schemas.openxmlformats.org/drawingml/2006/main" xmlns:r="http://schemas.openxmlformats.org/officeDocument/2006/relationships" xmlns:p="http://schemas.openxmlformats.org/presentationml/2006/main">
+  <p:cSld>
+    <p:spTree>
+      <p:nvGrpSpPr>
+        <p:cNvPr id="1" name=""/>
+        <p:cNvGrpSpPr/>
+        <p:nvPr/>
+      </p:nvGrpSpPr>
+      <p:grpSpPr>
+        <a:xfrm>
+          <a:off x="0" y="0"/>
+          <a:ext cx="0" cy="0"/>
+          <a:chOff x="0" y="0"/>
+          <a:chExt cx="0" cy="0"/>
+        </a:xfrm>
+      </p:grpSpPr>
+      <p:sp>
+        <p:nvSpPr>
           <p:cNvPr id="3" name="Content Placeholder 2"/>
           <p:cNvSpPr>
             <a:spLocks noGrp="1"/>
@@ -7099,7 +9740,7 @@
               <a:pPr>
                 <a:defRPr/>
               </a:pPr>
-              <a:t>25</a:t>
+              <a:t>32</a:t>
             </a:fld>
             <a:endParaRPr lang="en-US"/>
           </a:p>
@@ -7363,7 +10004,7 @@
 </p:sld>
 </file>
 
-<file path=ppt/slides/slide26.xml><?xml version="1.0" encoding="utf-8"?>
+<file path=ppt/slides/slide33.xml><?xml version="1.0" encoding="utf-8"?>
 <p:sld xmlns:a="http://schemas.openxmlformats.org/drawingml/2006/main" xmlns:r="http://schemas.openxmlformats.org/officeDocument/2006/relationships" xmlns:p="http://schemas.openxmlformats.org/presentationml/2006/main">
   <p:cSld>
     <p:spTree>
@@ -7384,98 +10025,6 @@
     <p:extLst>
       <p:ext uri="{BB962C8B-B14F-4D97-AF65-F5344CB8AC3E}">
         <p14:creationId xmlns:p14="http://schemas.microsoft.com/office/powerpoint/2010/main" val="1256622331"/>
-      </p:ext>
-    </p:extLst>
-  </p:cSld>
-  <p:clrMapOvr>
-    <a:masterClrMapping/>
-  </p:clrMapOvr>
-</p:sld>
-</file>
-
-<file path=ppt/slides/slide3.xml><?xml version="1.0" encoding="utf-8"?>
-<p:sld xmlns:a="http://schemas.openxmlformats.org/drawingml/2006/main" xmlns:r="http://schemas.openxmlformats.org/officeDocument/2006/relationships" xmlns:p="http://schemas.openxmlformats.org/presentationml/2006/main">
-  <p:cSld>
-    <p:spTree>
-      <p:nvGrpSpPr>
-        <p:cNvPr id="1" name=""/>
-        <p:cNvGrpSpPr/>
-        <p:nvPr/>
-      </p:nvGrpSpPr>
-      <p:grpSpPr>
-        <a:xfrm>
-          <a:off x="0" y="0"/>
-          <a:ext cx="0" cy="0"/>
-          <a:chOff x="0" y="0"/>
-          <a:chExt cx="0" cy="0"/>
-        </a:xfrm>
-      </p:grpSpPr>
-      <p:sp>
-        <p:nvSpPr>
-          <p:cNvPr id="2" name="Title 1">
-            <a:extLst>
-              <a:ext uri="{FF2B5EF4-FFF2-40B4-BE49-F238E27FC236}">
-                <a16:creationId xmlns:a16="http://schemas.microsoft.com/office/drawing/2014/main" id="{41F7A03C-8DB7-28BC-B626-34829A22A586}"/>
-              </a:ext>
-            </a:extLst>
-          </p:cNvPr>
-          <p:cNvSpPr>
-            <a:spLocks noGrp="1"/>
-          </p:cNvSpPr>
-          <p:nvPr>
-            <p:ph type="title"/>
-          </p:nvPr>
-        </p:nvSpPr>
-        <p:spPr/>
-        <p:txBody>
-          <a:bodyPr/>
-          <a:lstStyle/>
-          <a:p>
-            <a:r>
-              <a:rPr lang="en-US" dirty="0"/>
-              <a:t>Motivation</a:t>
-            </a:r>
-          </a:p>
-        </p:txBody>
-      </p:sp>
-      <p:sp>
-        <p:nvSpPr>
-          <p:cNvPr id="3" name="Content Placeholder 2">
-            <a:extLst>
-              <a:ext uri="{FF2B5EF4-FFF2-40B4-BE49-F238E27FC236}">
-                <a16:creationId xmlns:a16="http://schemas.microsoft.com/office/drawing/2014/main" id="{330DAAFE-B17D-76AA-D153-E070EB098AE6}"/>
-              </a:ext>
-            </a:extLst>
-          </p:cNvPr>
-          <p:cNvSpPr>
-            <a:spLocks noGrp="1"/>
-          </p:cNvSpPr>
-          <p:nvPr>
-            <p:ph idx="1"/>
-          </p:nvPr>
-        </p:nvSpPr>
-        <p:spPr/>
-        <p:txBody>
-          <a:bodyPr/>
-          <a:lstStyle/>
-          <a:p>
-            <a:r>
-              <a:rPr lang="en-US" dirty="0"/>
-              <a:t>Modern turbofan engines can run off hydrogen with limited modifications</a:t>
-            </a:r>
-          </a:p>
-          <a:p>
-            <a:r>
-              <a:rPr lang="en-US" dirty="0"/>
-              <a:t>Hydrogen eliminates carbon emissions with water being the main by-product of combustion</a:t>
-            </a:r>
-          </a:p>
-        </p:txBody>
-      </p:sp>
-    </p:spTree>
-    <p:extLst>
-      <p:ext uri="{BB962C8B-B14F-4D97-AF65-F5344CB8AC3E}">
-        <p14:creationId xmlns:p14="http://schemas.microsoft.com/office/powerpoint/2010/main" val="3702104982"/>
       </p:ext>
     </p:extLst>
   </p:cSld>
@@ -8123,7 +10672,7 @@
           <a:p>
             <a:r>
               <a:rPr lang="en-US" dirty="0"/>
-              <a:t>It uses modular components and chemical equilibrium analysis (CEA) solver to converge engine designs to determine performance</a:t>
+              <a:t>It uses modular components and a chemical equilibrium analysis (CEA) solver to converge engine designs to determine performance</a:t>
             </a:r>
           </a:p>
         </p:txBody>
@@ -9996,18 +12545,18 @@
 </file>
 
 <file path=customXml/item1.xml><?xml version="1.0" encoding="utf-8"?>
+<p:properties xmlns:p="http://schemas.microsoft.com/office/2006/metadata/properties" xmlns:xsi="http://www.w3.org/2001/XMLSchema-instance">
+  <documentManagement/>
+</p:properties>
+</file>
+
+<file path=customXml/item2.xml><?xml version="1.0" encoding="utf-8"?>
 <?mso-contentType ?>
 <FormTemplates xmlns="http://schemas.microsoft.com/sharepoint/v3/contenttype/forms">
   <Display>DocumentLibraryForm</Display>
   <Edit>DocumentLibraryForm</Edit>
   <New>DocumentLibraryForm</New>
 </FormTemplates>
-</file>
-
-<file path=customXml/item2.xml><?xml version="1.0" encoding="utf-8"?>
-<p:properties xmlns:p="http://schemas.microsoft.com/office/2006/metadata/properties" xmlns:xsi="http://www.w3.org/2001/XMLSchema-instance">
-  <documentManagement/>
-</p:properties>
 </file>
 
 <file path=customXml/item3.xml><?xml version="1.0" encoding="utf-8"?>
@@ -10202,14 +12751,6 @@
 </file>
 
 <file path=customXml/itemProps1.xml><?xml version="1.0" encoding="utf-8"?>
-<ds:datastoreItem xmlns:ds="http://schemas.openxmlformats.org/officeDocument/2006/customXml" ds:itemID="{53F3348E-F4F4-4BE8-8083-AA7D450E2FAD}">
-  <ds:schemaRefs>
-    <ds:schemaRef ds:uri="http://schemas.microsoft.com/sharepoint/v3/contenttype/forms"/>
-  </ds:schemaRefs>
-</ds:datastoreItem>
-</file>
-
-<file path=customXml/itemProps2.xml><?xml version="1.0" encoding="utf-8"?>
 <ds:datastoreItem xmlns:ds="http://schemas.openxmlformats.org/officeDocument/2006/customXml" ds:itemID="{A414BE1A-A2C4-4862-8AD0-8BDC37D6A979}">
   <ds:schemaRefs>
     <ds:schemaRef ds:uri="8840c030-5dde-41b3-9ddd-06e8e0ef51bc"/>
@@ -10222,6 +12763,14 @@
     <ds:schemaRef ds:uri="http://schemas.microsoft.com/office/infopath/2007/PartnerControls"/>
     <ds:schemaRef ds:uri="http://schemas.openxmlformats.org/package/2006/metadata/core-properties"/>
     <ds:schemaRef ds:uri="http://www.w3.org/XML/1998/namespace"/>
+  </ds:schemaRefs>
+</ds:datastoreItem>
+</file>
+
+<file path=customXml/itemProps2.xml><?xml version="1.0" encoding="utf-8"?>
+<ds:datastoreItem xmlns:ds="http://schemas.openxmlformats.org/officeDocument/2006/customXml" ds:itemID="{53F3348E-F4F4-4BE8-8083-AA7D450E2FAD}">
+  <ds:schemaRefs>
+    <ds:schemaRef ds:uri="http://schemas.microsoft.com/sharepoint/v3/contenttype/forms"/>
   </ds:schemaRefs>
 </ds:datastoreItem>
 </file>

</xml_diff>

<commit_message>
uploading some changes to merge
</commit_message>
<xml_diff>
--- a/conference-slides/presentation.pptx
+++ b/conference-slides/presentation.pptx
@@ -5141,6 +5141,52 @@
           </a:p>
         </p:txBody>
       </p:sp>
+      <p:sp>
+        <p:nvSpPr>
+          <p:cNvPr id="4" name="Slide Number Placeholder 3">
+            <a:extLst>
+              <a:ext uri="{FF2B5EF4-FFF2-40B4-BE49-F238E27FC236}">
+                <a16:creationId xmlns:a16="http://schemas.microsoft.com/office/drawing/2014/main" id="{0AF8599A-2EF6-8A36-D186-CC3A45DB2D45}"/>
+              </a:ext>
+            </a:extLst>
+          </p:cNvPr>
+          <p:cNvSpPr>
+            <a:spLocks noGrp="1"/>
+          </p:cNvSpPr>
+          <p:nvPr>
+            <p:ph type="sldNum" sz="quarter" idx="12"/>
+          </p:nvPr>
+        </p:nvSpPr>
+        <p:spPr>
+          <a:xfrm>
+            <a:off x="228600" y="4629150"/>
+            <a:ext cx="914400" cy="171450"/>
+          </a:xfrm>
+        </p:spPr>
+        <p:txBody>
+          <a:bodyPr/>
+          <a:lstStyle/>
+          <a:p>
+            <a:pPr>
+              <a:spcAft>
+                <a:spcPts val="600"/>
+              </a:spcAft>
+              <a:defRPr/>
+            </a:pPr>
+            <a:fld id="{B586D440-F702-449A-AAC2-9ACFF17038B8}" type="slidenum">
+              <a:rPr lang="en-US" smtClean="0"/>
+              <a:pPr>
+                <a:spcAft>
+                  <a:spcPts val="600"/>
+                </a:spcAft>
+                <a:defRPr/>
+              </a:pPr>
+              <a:t>10</a:t>
+            </a:fld>
+            <a:endParaRPr lang="en-US" dirty="0"/>
+          </a:p>
+        </p:txBody>
+      </p:sp>
     </p:spTree>
     <p:extLst>
       <p:ext uri="{BB962C8B-B14F-4D97-AF65-F5344CB8AC3E}">
@@ -5278,6 +5324,52 @@
           </a:prstGeom>
         </p:spPr>
       </p:pic>
+      <p:sp>
+        <p:nvSpPr>
+          <p:cNvPr id="3" name="Slide Number Placeholder 3">
+            <a:extLst>
+              <a:ext uri="{FF2B5EF4-FFF2-40B4-BE49-F238E27FC236}">
+                <a16:creationId xmlns:a16="http://schemas.microsoft.com/office/drawing/2014/main" id="{8B28F181-BF4F-BC70-91D5-C50040438987}"/>
+              </a:ext>
+            </a:extLst>
+          </p:cNvPr>
+          <p:cNvSpPr>
+            <a:spLocks noGrp="1"/>
+          </p:cNvSpPr>
+          <p:nvPr>
+            <p:ph type="sldNum" sz="quarter" idx="12"/>
+          </p:nvPr>
+        </p:nvSpPr>
+        <p:spPr>
+          <a:xfrm>
+            <a:off x="228600" y="4629150"/>
+            <a:ext cx="914400" cy="171450"/>
+          </a:xfrm>
+        </p:spPr>
+        <p:txBody>
+          <a:bodyPr/>
+          <a:lstStyle/>
+          <a:p>
+            <a:pPr>
+              <a:spcAft>
+                <a:spcPts val="600"/>
+              </a:spcAft>
+              <a:defRPr/>
+            </a:pPr>
+            <a:fld id="{B586D440-F702-449A-AAC2-9ACFF17038B8}" type="slidenum">
+              <a:rPr lang="en-US" smtClean="0"/>
+              <a:pPr>
+                <a:spcAft>
+                  <a:spcPts val="600"/>
+                </a:spcAft>
+                <a:defRPr/>
+              </a:pPr>
+              <a:t>11</a:t>
+            </a:fld>
+            <a:endParaRPr lang="en-US" dirty="0"/>
+          </a:p>
+        </p:txBody>
+      </p:sp>
     </p:spTree>
     <p:extLst>
       <p:ext uri="{BB962C8B-B14F-4D97-AF65-F5344CB8AC3E}">
@@ -5595,6 +5687,52 @@
           </a:p>
         </p:txBody>
       </p:sp>
+      <p:sp>
+        <p:nvSpPr>
+          <p:cNvPr id="4" name="Slide Number Placeholder 3">
+            <a:extLst>
+              <a:ext uri="{FF2B5EF4-FFF2-40B4-BE49-F238E27FC236}">
+                <a16:creationId xmlns:a16="http://schemas.microsoft.com/office/drawing/2014/main" id="{9C116589-DA6F-FF3F-96BF-F51A530379D9}"/>
+              </a:ext>
+            </a:extLst>
+          </p:cNvPr>
+          <p:cNvSpPr>
+            <a:spLocks noGrp="1"/>
+          </p:cNvSpPr>
+          <p:nvPr>
+            <p:ph type="sldNum" sz="quarter" idx="12"/>
+          </p:nvPr>
+        </p:nvSpPr>
+        <p:spPr>
+          <a:xfrm>
+            <a:off x="228600" y="4629150"/>
+            <a:ext cx="914400" cy="171450"/>
+          </a:xfrm>
+        </p:spPr>
+        <p:txBody>
+          <a:bodyPr/>
+          <a:lstStyle/>
+          <a:p>
+            <a:pPr>
+              <a:spcAft>
+                <a:spcPts val="600"/>
+              </a:spcAft>
+              <a:defRPr/>
+            </a:pPr>
+            <a:fld id="{B586D440-F702-449A-AAC2-9ACFF17038B8}" type="slidenum">
+              <a:rPr lang="en-US" smtClean="0"/>
+              <a:pPr>
+                <a:spcAft>
+                  <a:spcPts val="600"/>
+                </a:spcAft>
+                <a:defRPr/>
+              </a:pPr>
+              <a:t>12</a:t>
+            </a:fld>
+            <a:endParaRPr lang="en-US" dirty="0"/>
+          </a:p>
+        </p:txBody>
+      </p:sp>
     </p:spTree>
     <p:extLst>
       <p:ext uri="{BB962C8B-B14F-4D97-AF65-F5344CB8AC3E}">
@@ -5724,6 +5862,52 @@
           </a:ln>
         </p:spPr>
       </p:pic>
+      <p:sp>
+        <p:nvSpPr>
+          <p:cNvPr id="3" name="Slide Number Placeholder 3">
+            <a:extLst>
+              <a:ext uri="{FF2B5EF4-FFF2-40B4-BE49-F238E27FC236}">
+                <a16:creationId xmlns:a16="http://schemas.microsoft.com/office/drawing/2014/main" id="{476AA50A-E674-8581-4633-90178FE3CB80}"/>
+              </a:ext>
+            </a:extLst>
+          </p:cNvPr>
+          <p:cNvSpPr>
+            <a:spLocks noGrp="1"/>
+          </p:cNvSpPr>
+          <p:nvPr>
+            <p:ph type="sldNum" sz="quarter" idx="12"/>
+          </p:nvPr>
+        </p:nvSpPr>
+        <p:spPr>
+          <a:xfrm>
+            <a:off x="228600" y="4629150"/>
+            <a:ext cx="914400" cy="171450"/>
+          </a:xfrm>
+        </p:spPr>
+        <p:txBody>
+          <a:bodyPr/>
+          <a:lstStyle/>
+          <a:p>
+            <a:pPr>
+              <a:spcAft>
+                <a:spcPts val="600"/>
+              </a:spcAft>
+              <a:defRPr/>
+            </a:pPr>
+            <a:fld id="{B586D440-F702-449A-AAC2-9ACFF17038B8}" type="slidenum">
+              <a:rPr lang="en-US" smtClean="0"/>
+              <a:pPr>
+                <a:spcAft>
+                  <a:spcPts val="600"/>
+                </a:spcAft>
+                <a:defRPr/>
+              </a:pPr>
+              <a:t>13</a:t>
+            </a:fld>
+            <a:endParaRPr lang="en-US" dirty="0"/>
+          </a:p>
+        </p:txBody>
+      </p:sp>
     </p:spTree>
     <p:extLst>
       <p:ext uri="{BB962C8B-B14F-4D97-AF65-F5344CB8AC3E}">
@@ -5888,6 +6072,52 @@
           </a:p>
         </p:txBody>
       </p:sp>
+      <p:sp>
+        <p:nvSpPr>
+          <p:cNvPr id="5" name="Slide Number Placeholder 3">
+            <a:extLst>
+              <a:ext uri="{FF2B5EF4-FFF2-40B4-BE49-F238E27FC236}">
+                <a16:creationId xmlns:a16="http://schemas.microsoft.com/office/drawing/2014/main" id="{68EAF3CF-32FA-DCFC-631E-0263155CC14A}"/>
+              </a:ext>
+            </a:extLst>
+          </p:cNvPr>
+          <p:cNvSpPr>
+            <a:spLocks noGrp="1"/>
+          </p:cNvSpPr>
+          <p:nvPr>
+            <p:ph type="sldNum" sz="quarter" idx="12"/>
+          </p:nvPr>
+        </p:nvSpPr>
+        <p:spPr>
+          <a:xfrm>
+            <a:off x="228600" y="4629150"/>
+            <a:ext cx="914400" cy="171450"/>
+          </a:xfrm>
+        </p:spPr>
+        <p:txBody>
+          <a:bodyPr/>
+          <a:lstStyle/>
+          <a:p>
+            <a:pPr>
+              <a:spcAft>
+                <a:spcPts val="600"/>
+              </a:spcAft>
+              <a:defRPr/>
+            </a:pPr>
+            <a:fld id="{B586D440-F702-449A-AAC2-9ACFF17038B8}" type="slidenum">
+              <a:rPr lang="en-US" smtClean="0"/>
+              <a:pPr>
+                <a:spcAft>
+                  <a:spcPts val="600"/>
+                </a:spcAft>
+                <a:defRPr/>
+              </a:pPr>
+              <a:t>14</a:t>
+            </a:fld>
+            <a:endParaRPr lang="en-US" dirty="0"/>
+          </a:p>
+        </p:txBody>
+      </p:sp>
     </p:spTree>
     <p:extLst>
       <p:ext uri="{BB962C8B-B14F-4D97-AF65-F5344CB8AC3E}">
@@ -5960,60 +6190,6 @@
       </p:sp>
       <p:sp>
         <p:nvSpPr>
-          <p:cNvPr id="12" name="Slide Number Placeholder 3">
-            <a:extLst>
-              <a:ext uri="{FF2B5EF4-FFF2-40B4-BE49-F238E27FC236}">
-                <a16:creationId xmlns:a16="http://schemas.microsoft.com/office/drawing/2014/main" id="{2B8C7E55-331D-68F7-86C8-CA9DA33C753D}"/>
-              </a:ext>
-            </a:extLst>
-          </p:cNvPr>
-          <p:cNvSpPr>
-            <a:spLocks noGrp="1"/>
-          </p:cNvSpPr>
-          <p:nvPr>
-            <p:ph type="sldNum" sz="quarter" idx="12"/>
-          </p:nvPr>
-        </p:nvSpPr>
-        <p:spPr>
-          <a:xfrm>
-            <a:off x="228600" y="4629150"/>
-            <a:ext cx="914400" cy="171450"/>
-          </a:xfrm>
-        </p:spPr>
-        <p:txBody>
-          <a:bodyPr>
-            <a:normAutofit/>
-          </a:bodyPr>
-          <a:lstStyle/>
-          <a:p>
-            <a:pPr>
-              <a:lnSpc>
-                <a:spcPct val="90000"/>
-              </a:lnSpc>
-              <a:spcAft>
-                <a:spcPts val="600"/>
-              </a:spcAft>
-              <a:defRPr/>
-            </a:pPr>
-            <a:fld id="{B586D440-F702-449A-AAC2-9ACFF17038B8}" type="slidenum">
-              <a:rPr lang="en-US" sz="500" smtClean="0"/>
-              <a:pPr>
-                <a:lnSpc>
-                  <a:spcPct val="90000"/>
-                </a:lnSpc>
-                <a:spcAft>
-                  <a:spcPts val="600"/>
-                </a:spcAft>
-                <a:defRPr/>
-              </a:pPr>
-              <a:t>15</a:t>
-            </a:fld>
-            <a:endParaRPr lang="en-US" sz="500"/>
-          </a:p>
-        </p:txBody>
-      </p:sp>
-      <p:sp>
-        <p:nvSpPr>
           <p:cNvPr id="14" name="Content Placeholder 13">
             <a:extLst>
               <a:ext uri="{FF2B5EF4-FFF2-40B4-BE49-F238E27FC236}">
@@ -6035,7 +6211,7 @@
           <a:p>
             <a:r>
               <a:rPr lang="en-US" dirty="0"/>
-              <a:t>We use the NASA advanced technology N+3 Ultra-High Bypass (UHB) Ratio engine that could be available in the 2030—2040 timeframe</a:t>
+              <a:t>We use the NASA advanced technology N+3 ultra-high bypass (UHB) ratio engine that could be available in the 2030—2040 timeframe</a:t>
             </a:r>
           </a:p>
         </p:txBody>
@@ -6077,6 +6253,52 @@
           <a:noFill/>
         </p:spPr>
       </p:pic>
+      <p:sp>
+        <p:nvSpPr>
+          <p:cNvPr id="18" name="Slide Number Placeholder 3">
+            <a:extLst>
+              <a:ext uri="{FF2B5EF4-FFF2-40B4-BE49-F238E27FC236}">
+                <a16:creationId xmlns:a16="http://schemas.microsoft.com/office/drawing/2014/main" id="{FD6FB050-94D8-C2A6-8375-8CBB0AF26E85}"/>
+              </a:ext>
+            </a:extLst>
+          </p:cNvPr>
+          <p:cNvSpPr>
+            <a:spLocks noGrp="1"/>
+          </p:cNvSpPr>
+          <p:nvPr>
+            <p:ph type="sldNum" sz="quarter" idx="12"/>
+          </p:nvPr>
+        </p:nvSpPr>
+        <p:spPr>
+          <a:xfrm>
+            <a:off x="228600" y="4629150"/>
+            <a:ext cx="914400" cy="171450"/>
+          </a:xfrm>
+        </p:spPr>
+        <p:txBody>
+          <a:bodyPr/>
+          <a:lstStyle/>
+          <a:p>
+            <a:pPr>
+              <a:spcAft>
+                <a:spcPts val="600"/>
+              </a:spcAft>
+              <a:defRPr/>
+            </a:pPr>
+            <a:fld id="{B586D440-F702-449A-AAC2-9ACFF17038B8}" type="slidenum">
+              <a:rPr lang="en-US" smtClean="0"/>
+              <a:pPr>
+                <a:spcAft>
+                  <a:spcPts val="600"/>
+                </a:spcAft>
+                <a:defRPr/>
+              </a:pPr>
+              <a:t>15</a:t>
+            </a:fld>
+            <a:endParaRPr lang="en-US" dirty="0"/>
+          </a:p>
+        </p:txBody>
+      </p:sp>
     </p:spTree>
     <p:extLst>
       <p:ext uri="{BB962C8B-B14F-4D97-AF65-F5344CB8AC3E}">
@@ -6144,60 +6366,6 @@
               <a:rPr lang="en-US" dirty="0"/>
               <a:t>Propulsion Model</a:t>
             </a:r>
-          </a:p>
-        </p:txBody>
-      </p:sp>
-      <p:sp>
-        <p:nvSpPr>
-          <p:cNvPr id="12" name="Slide Number Placeholder 3">
-            <a:extLst>
-              <a:ext uri="{FF2B5EF4-FFF2-40B4-BE49-F238E27FC236}">
-                <a16:creationId xmlns:a16="http://schemas.microsoft.com/office/drawing/2014/main" id="{2B8C7E55-331D-68F7-86C8-CA9DA33C753D}"/>
-              </a:ext>
-            </a:extLst>
-          </p:cNvPr>
-          <p:cNvSpPr>
-            <a:spLocks noGrp="1"/>
-          </p:cNvSpPr>
-          <p:nvPr>
-            <p:ph type="sldNum" sz="quarter" idx="12"/>
-          </p:nvPr>
-        </p:nvSpPr>
-        <p:spPr>
-          <a:xfrm>
-            <a:off x="228600" y="4629150"/>
-            <a:ext cx="914400" cy="171450"/>
-          </a:xfrm>
-        </p:spPr>
-        <p:txBody>
-          <a:bodyPr>
-            <a:normAutofit/>
-          </a:bodyPr>
-          <a:lstStyle/>
-          <a:p>
-            <a:pPr>
-              <a:lnSpc>
-                <a:spcPct val="90000"/>
-              </a:lnSpc>
-              <a:spcAft>
-                <a:spcPts val="600"/>
-              </a:spcAft>
-              <a:defRPr/>
-            </a:pPr>
-            <a:fld id="{B586D440-F702-449A-AAC2-9ACFF17038B8}" type="slidenum">
-              <a:rPr lang="en-US" sz="500" smtClean="0"/>
-              <a:pPr>
-                <a:lnSpc>
-                  <a:spcPct val="90000"/>
-                </a:lnSpc>
-                <a:spcAft>
-                  <a:spcPts val="600"/>
-                </a:spcAft>
-                <a:defRPr/>
-              </a:pPr>
-              <a:t>16</a:t>
-            </a:fld>
-            <a:endParaRPr lang="en-US" sz="500" dirty="0"/>
           </a:p>
         </p:txBody>
       </p:sp>
@@ -6281,6 +6449,52 @@
           </a:ln>
         </p:spPr>
       </p:pic>
+      <p:sp>
+        <p:nvSpPr>
+          <p:cNvPr id="3" name="Slide Number Placeholder 3">
+            <a:extLst>
+              <a:ext uri="{FF2B5EF4-FFF2-40B4-BE49-F238E27FC236}">
+                <a16:creationId xmlns:a16="http://schemas.microsoft.com/office/drawing/2014/main" id="{6B1CDBF7-3F81-AA40-CC5F-8676DC884C8E}"/>
+              </a:ext>
+            </a:extLst>
+          </p:cNvPr>
+          <p:cNvSpPr>
+            <a:spLocks noGrp="1"/>
+          </p:cNvSpPr>
+          <p:nvPr>
+            <p:ph type="sldNum" sz="quarter" idx="12"/>
+          </p:nvPr>
+        </p:nvSpPr>
+        <p:spPr>
+          <a:xfrm>
+            <a:off x="228600" y="4629150"/>
+            <a:ext cx="914400" cy="171450"/>
+          </a:xfrm>
+        </p:spPr>
+        <p:txBody>
+          <a:bodyPr/>
+          <a:lstStyle/>
+          <a:p>
+            <a:pPr>
+              <a:spcAft>
+                <a:spcPts val="600"/>
+              </a:spcAft>
+              <a:defRPr/>
+            </a:pPr>
+            <a:fld id="{B586D440-F702-449A-AAC2-9ACFF17038B8}" type="slidenum">
+              <a:rPr lang="en-US" smtClean="0"/>
+              <a:pPr>
+                <a:spcAft>
+                  <a:spcPts val="600"/>
+                </a:spcAft>
+                <a:defRPr/>
+              </a:pPr>
+              <a:t>16</a:t>
+            </a:fld>
+            <a:endParaRPr lang="en-US" dirty="0"/>
+          </a:p>
+        </p:txBody>
+      </p:sp>
     </p:spTree>
     <p:extLst>
       <p:ext uri="{BB962C8B-B14F-4D97-AF65-F5344CB8AC3E}">
@@ -6633,6 +6847,52 @@
             <a:pPr marL="0" indent="0">
               <a:buNone/>
             </a:pPr>
+            <a:endParaRPr lang="en-US" dirty="0"/>
+          </a:p>
+        </p:txBody>
+      </p:sp>
+      <p:sp>
+        <p:nvSpPr>
+          <p:cNvPr id="4" name="Slide Number Placeholder 3">
+            <a:extLst>
+              <a:ext uri="{FF2B5EF4-FFF2-40B4-BE49-F238E27FC236}">
+                <a16:creationId xmlns:a16="http://schemas.microsoft.com/office/drawing/2014/main" id="{472F8EA8-DDF2-F288-703A-CD31D6A530AF}"/>
+              </a:ext>
+            </a:extLst>
+          </p:cNvPr>
+          <p:cNvSpPr>
+            <a:spLocks noGrp="1"/>
+          </p:cNvSpPr>
+          <p:nvPr>
+            <p:ph type="sldNum" sz="quarter" idx="12"/>
+          </p:nvPr>
+        </p:nvSpPr>
+        <p:spPr>
+          <a:xfrm>
+            <a:off x="228600" y="4629150"/>
+            <a:ext cx="914400" cy="171450"/>
+          </a:xfrm>
+        </p:spPr>
+        <p:txBody>
+          <a:bodyPr/>
+          <a:lstStyle/>
+          <a:p>
+            <a:pPr>
+              <a:spcAft>
+                <a:spcPts val="600"/>
+              </a:spcAft>
+              <a:defRPr/>
+            </a:pPr>
+            <a:fld id="{B586D440-F702-449A-AAC2-9ACFF17038B8}" type="slidenum">
+              <a:rPr lang="en-US" smtClean="0"/>
+              <a:pPr>
+                <a:spcAft>
+                  <a:spcPts val="600"/>
+                </a:spcAft>
+                <a:defRPr/>
+              </a:pPr>
+              <a:t>18</a:t>
+            </a:fld>
             <a:endParaRPr lang="en-US" dirty="0"/>
           </a:p>
         </p:txBody>
@@ -7097,6 +7357,52 @@
           </a:extLst>
         </p:spPr>
       </p:pic>
+      <p:sp>
+        <p:nvSpPr>
+          <p:cNvPr id="4" name="Slide Number Placeholder 3">
+            <a:extLst>
+              <a:ext uri="{FF2B5EF4-FFF2-40B4-BE49-F238E27FC236}">
+                <a16:creationId xmlns:a16="http://schemas.microsoft.com/office/drawing/2014/main" id="{66C2C6BA-F6EF-1ABE-C947-E71EDC3B84BB}"/>
+              </a:ext>
+            </a:extLst>
+          </p:cNvPr>
+          <p:cNvSpPr>
+            <a:spLocks noGrp="1"/>
+          </p:cNvSpPr>
+          <p:nvPr>
+            <p:ph type="sldNum" sz="quarter" idx="12"/>
+          </p:nvPr>
+        </p:nvSpPr>
+        <p:spPr>
+          <a:xfrm>
+            <a:off x="228600" y="4629150"/>
+            <a:ext cx="914400" cy="171450"/>
+          </a:xfrm>
+        </p:spPr>
+        <p:txBody>
+          <a:bodyPr/>
+          <a:lstStyle/>
+          <a:p>
+            <a:pPr>
+              <a:spcAft>
+                <a:spcPts val="600"/>
+              </a:spcAft>
+              <a:defRPr/>
+            </a:pPr>
+            <a:fld id="{B586D440-F702-449A-AAC2-9ACFF17038B8}" type="slidenum">
+              <a:rPr lang="en-US" smtClean="0"/>
+              <a:pPr>
+                <a:spcAft>
+                  <a:spcPts val="600"/>
+                </a:spcAft>
+                <a:defRPr/>
+              </a:pPr>
+              <a:t>2</a:t>
+            </a:fld>
+            <a:endParaRPr lang="en-US" dirty="0"/>
+          </a:p>
+        </p:txBody>
+      </p:sp>
     </p:spTree>
     <p:extLst>
       <p:ext uri="{BB962C8B-B14F-4D97-AF65-F5344CB8AC3E}">
@@ -7592,6 +7898,52 @@
           </a:p>
         </p:txBody>
       </p:sp>
+      <p:sp>
+        <p:nvSpPr>
+          <p:cNvPr id="4" name="Slide Number Placeholder 3">
+            <a:extLst>
+              <a:ext uri="{FF2B5EF4-FFF2-40B4-BE49-F238E27FC236}">
+                <a16:creationId xmlns:a16="http://schemas.microsoft.com/office/drawing/2014/main" id="{60095082-9D25-A824-9223-27F8E2DF2412}"/>
+              </a:ext>
+            </a:extLst>
+          </p:cNvPr>
+          <p:cNvSpPr>
+            <a:spLocks noGrp="1"/>
+          </p:cNvSpPr>
+          <p:nvPr>
+            <p:ph type="sldNum" sz="quarter" idx="12"/>
+          </p:nvPr>
+        </p:nvSpPr>
+        <p:spPr>
+          <a:xfrm>
+            <a:off x="228600" y="4629150"/>
+            <a:ext cx="914400" cy="171450"/>
+          </a:xfrm>
+        </p:spPr>
+        <p:txBody>
+          <a:bodyPr/>
+          <a:lstStyle/>
+          <a:p>
+            <a:pPr>
+              <a:spcAft>
+                <a:spcPts val="600"/>
+              </a:spcAft>
+              <a:defRPr/>
+            </a:pPr>
+            <a:fld id="{B586D440-F702-449A-AAC2-9ACFF17038B8}" type="slidenum">
+              <a:rPr lang="en-US" smtClean="0"/>
+              <a:pPr>
+                <a:spcAft>
+                  <a:spcPts val="600"/>
+                </a:spcAft>
+                <a:defRPr/>
+              </a:pPr>
+              <a:t>21</a:t>
+            </a:fld>
+            <a:endParaRPr lang="en-US" dirty="0"/>
+          </a:p>
+        </p:txBody>
+      </p:sp>
     </p:spTree>
     <p:extLst>
       <p:ext uri="{BB962C8B-B14F-4D97-AF65-F5344CB8AC3E}">
@@ -7699,60 +8051,6 @@
       </p:pic>
       <p:sp>
         <p:nvSpPr>
-          <p:cNvPr id="8" name="Slide Number Placeholder 3">
-            <a:extLst>
-              <a:ext uri="{FF2B5EF4-FFF2-40B4-BE49-F238E27FC236}">
-                <a16:creationId xmlns:a16="http://schemas.microsoft.com/office/drawing/2014/main" id="{2748FC11-A312-8DC0-5B39-AAB933E67704}"/>
-              </a:ext>
-            </a:extLst>
-          </p:cNvPr>
-          <p:cNvSpPr>
-            <a:spLocks noGrp="1"/>
-          </p:cNvSpPr>
-          <p:nvPr>
-            <p:ph type="sldNum" sz="quarter" idx="12"/>
-          </p:nvPr>
-        </p:nvSpPr>
-        <p:spPr>
-          <a:xfrm>
-            <a:off x="228600" y="4629150"/>
-            <a:ext cx="914400" cy="171450"/>
-          </a:xfrm>
-        </p:spPr>
-        <p:txBody>
-          <a:bodyPr>
-            <a:normAutofit/>
-          </a:bodyPr>
-          <a:lstStyle/>
-          <a:p>
-            <a:pPr>
-              <a:lnSpc>
-                <a:spcPct val="90000"/>
-              </a:lnSpc>
-              <a:spcAft>
-                <a:spcPts val="600"/>
-              </a:spcAft>
-              <a:defRPr/>
-            </a:pPr>
-            <a:fld id="{B586D440-F702-449A-AAC2-9ACFF17038B8}" type="slidenum">
-              <a:rPr lang="en-US" sz="500" smtClean="0"/>
-              <a:pPr>
-                <a:lnSpc>
-                  <a:spcPct val="90000"/>
-                </a:lnSpc>
-                <a:spcAft>
-                  <a:spcPts val="600"/>
-                </a:spcAft>
-                <a:defRPr/>
-              </a:pPr>
-              <a:t>22</a:t>
-            </a:fld>
-            <a:endParaRPr lang="en-US" sz="500" dirty="0"/>
-          </a:p>
-        </p:txBody>
-      </p:sp>
-      <p:sp>
-        <p:nvSpPr>
           <p:cNvPr id="2" name="Title 1">
             <a:extLst>
               <a:ext uri="{FF2B5EF4-FFF2-40B4-BE49-F238E27FC236}">
@@ -7788,6 +8086,52 @@
               <a:rPr lang="en-US" dirty="0"/>
               <a:t>Results</a:t>
             </a:r>
+          </a:p>
+        </p:txBody>
+      </p:sp>
+      <p:sp>
+        <p:nvSpPr>
+          <p:cNvPr id="15" name="Slide Number Placeholder 3">
+            <a:extLst>
+              <a:ext uri="{FF2B5EF4-FFF2-40B4-BE49-F238E27FC236}">
+                <a16:creationId xmlns:a16="http://schemas.microsoft.com/office/drawing/2014/main" id="{A0F713AE-C3BA-B0AC-A12F-3D36E4E03832}"/>
+              </a:ext>
+            </a:extLst>
+          </p:cNvPr>
+          <p:cNvSpPr>
+            <a:spLocks noGrp="1"/>
+          </p:cNvSpPr>
+          <p:nvPr>
+            <p:ph type="sldNum" sz="quarter" idx="12"/>
+          </p:nvPr>
+        </p:nvSpPr>
+        <p:spPr>
+          <a:xfrm>
+            <a:off x="228600" y="4629150"/>
+            <a:ext cx="914400" cy="171450"/>
+          </a:xfrm>
+        </p:spPr>
+        <p:txBody>
+          <a:bodyPr/>
+          <a:lstStyle/>
+          <a:p>
+            <a:pPr>
+              <a:spcAft>
+                <a:spcPts val="600"/>
+              </a:spcAft>
+              <a:defRPr/>
+            </a:pPr>
+            <a:fld id="{B586D440-F702-449A-AAC2-9ACFF17038B8}" type="slidenum">
+              <a:rPr lang="en-US" smtClean="0"/>
+              <a:pPr>
+                <a:spcAft>
+                  <a:spcPts val="600"/>
+                </a:spcAft>
+                <a:defRPr/>
+              </a:pPr>
+              <a:t>22</a:t>
+            </a:fld>
+            <a:endParaRPr lang="en-US" dirty="0"/>
           </a:p>
         </p:txBody>
       </p:sp>
@@ -8906,6 +9250,52 @@
           </a:p>
         </p:txBody>
       </p:sp>
+      <p:sp>
+        <p:nvSpPr>
+          <p:cNvPr id="4" name="Slide Number Placeholder 3">
+            <a:extLst>
+              <a:ext uri="{FF2B5EF4-FFF2-40B4-BE49-F238E27FC236}">
+                <a16:creationId xmlns:a16="http://schemas.microsoft.com/office/drawing/2014/main" id="{C90EC6C0-7BD5-EBEB-3FA8-E8E7799ECEC5}"/>
+              </a:ext>
+            </a:extLst>
+          </p:cNvPr>
+          <p:cNvSpPr>
+            <a:spLocks noGrp="1"/>
+          </p:cNvSpPr>
+          <p:nvPr>
+            <p:ph type="sldNum" sz="quarter" idx="12"/>
+          </p:nvPr>
+        </p:nvSpPr>
+        <p:spPr>
+          <a:xfrm>
+            <a:off x="228600" y="4629150"/>
+            <a:ext cx="914400" cy="171450"/>
+          </a:xfrm>
+        </p:spPr>
+        <p:txBody>
+          <a:bodyPr/>
+          <a:lstStyle/>
+          <a:p>
+            <a:pPr>
+              <a:spcAft>
+                <a:spcPts val="600"/>
+              </a:spcAft>
+              <a:defRPr/>
+            </a:pPr>
+            <a:fld id="{B586D440-F702-449A-AAC2-9ACFF17038B8}" type="slidenum">
+              <a:rPr lang="en-US" smtClean="0"/>
+              <a:pPr>
+                <a:spcAft>
+                  <a:spcPts val="600"/>
+                </a:spcAft>
+                <a:defRPr/>
+              </a:pPr>
+              <a:t>27</a:t>
+            </a:fld>
+            <a:endParaRPr lang="en-US" dirty="0"/>
+          </a:p>
+        </p:txBody>
+      </p:sp>
     </p:spTree>
     <p:extLst>
       <p:ext uri="{BB962C8B-B14F-4D97-AF65-F5344CB8AC3E}">
@@ -9039,6 +9429,52 @@
           <a:noFill/>
         </p:spPr>
       </p:pic>
+      <p:sp>
+        <p:nvSpPr>
+          <p:cNvPr id="11" name="Slide Number Placeholder 3">
+            <a:extLst>
+              <a:ext uri="{FF2B5EF4-FFF2-40B4-BE49-F238E27FC236}">
+                <a16:creationId xmlns:a16="http://schemas.microsoft.com/office/drawing/2014/main" id="{87ABBC2D-83A3-F0A6-71EA-59154E3A6886}"/>
+              </a:ext>
+            </a:extLst>
+          </p:cNvPr>
+          <p:cNvSpPr>
+            <a:spLocks noGrp="1"/>
+          </p:cNvSpPr>
+          <p:nvPr>
+            <p:ph type="sldNum" sz="quarter" idx="12"/>
+          </p:nvPr>
+        </p:nvSpPr>
+        <p:spPr>
+          <a:xfrm>
+            <a:off x="228600" y="4629150"/>
+            <a:ext cx="914400" cy="171450"/>
+          </a:xfrm>
+        </p:spPr>
+        <p:txBody>
+          <a:bodyPr/>
+          <a:lstStyle/>
+          <a:p>
+            <a:pPr>
+              <a:spcAft>
+                <a:spcPts val="600"/>
+              </a:spcAft>
+              <a:defRPr/>
+            </a:pPr>
+            <a:fld id="{B586D440-F702-449A-AAC2-9ACFF17038B8}" type="slidenum">
+              <a:rPr lang="en-US" smtClean="0"/>
+              <a:pPr>
+                <a:spcAft>
+                  <a:spcPts val="600"/>
+                </a:spcAft>
+                <a:defRPr/>
+              </a:pPr>
+              <a:t>28</a:t>
+            </a:fld>
+            <a:endParaRPr lang="en-US" dirty="0"/>
+          </a:p>
+        </p:txBody>
+      </p:sp>
     </p:spTree>
     <p:extLst>
       <p:ext uri="{BB962C8B-B14F-4D97-AF65-F5344CB8AC3E}">
@@ -9210,6 +9646,52 @@
           </a:p>
         </p:txBody>
       </p:sp>
+      <p:sp>
+        <p:nvSpPr>
+          <p:cNvPr id="8" name="Slide Number Placeholder 3">
+            <a:extLst>
+              <a:ext uri="{FF2B5EF4-FFF2-40B4-BE49-F238E27FC236}">
+                <a16:creationId xmlns:a16="http://schemas.microsoft.com/office/drawing/2014/main" id="{F34295B2-098C-BB2F-6A66-C38379EDC75D}"/>
+              </a:ext>
+            </a:extLst>
+          </p:cNvPr>
+          <p:cNvSpPr>
+            <a:spLocks noGrp="1"/>
+          </p:cNvSpPr>
+          <p:nvPr>
+            <p:ph type="sldNum" sz="quarter" idx="12"/>
+          </p:nvPr>
+        </p:nvSpPr>
+        <p:spPr>
+          <a:xfrm>
+            <a:off x="228600" y="4629150"/>
+            <a:ext cx="914400" cy="171450"/>
+          </a:xfrm>
+        </p:spPr>
+        <p:txBody>
+          <a:bodyPr/>
+          <a:lstStyle/>
+          <a:p>
+            <a:pPr>
+              <a:spcAft>
+                <a:spcPts val="600"/>
+              </a:spcAft>
+              <a:defRPr/>
+            </a:pPr>
+            <a:fld id="{B586D440-F702-449A-AAC2-9ACFF17038B8}" type="slidenum">
+              <a:rPr lang="en-US" smtClean="0"/>
+              <a:pPr>
+                <a:spcAft>
+                  <a:spcPts val="600"/>
+                </a:spcAft>
+                <a:defRPr/>
+              </a:pPr>
+              <a:t>29</a:t>
+            </a:fld>
+            <a:endParaRPr lang="en-US" dirty="0"/>
+          </a:p>
+        </p:txBody>
+      </p:sp>
     </p:spTree>
     <p:extLst>
       <p:ext uri="{BB962C8B-B14F-4D97-AF65-F5344CB8AC3E}">
@@ -9349,6 +9831,52 @@
           </a:extLst>
         </p:spPr>
       </p:pic>
+      <p:sp>
+        <p:nvSpPr>
+          <p:cNvPr id="4" name="Slide Number Placeholder 3">
+            <a:extLst>
+              <a:ext uri="{FF2B5EF4-FFF2-40B4-BE49-F238E27FC236}">
+                <a16:creationId xmlns:a16="http://schemas.microsoft.com/office/drawing/2014/main" id="{698FAB4B-58C5-2CA3-9913-F7459CBE68AB}"/>
+              </a:ext>
+            </a:extLst>
+          </p:cNvPr>
+          <p:cNvSpPr>
+            <a:spLocks noGrp="1"/>
+          </p:cNvSpPr>
+          <p:nvPr>
+            <p:ph type="sldNum" sz="quarter" idx="12"/>
+          </p:nvPr>
+        </p:nvSpPr>
+        <p:spPr>
+          <a:xfrm>
+            <a:off x="228600" y="4629150"/>
+            <a:ext cx="914400" cy="171450"/>
+          </a:xfrm>
+        </p:spPr>
+        <p:txBody>
+          <a:bodyPr/>
+          <a:lstStyle/>
+          <a:p>
+            <a:pPr>
+              <a:spcAft>
+                <a:spcPts val="600"/>
+              </a:spcAft>
+              <a:defRPr/>
+            </a:pPr>
+            <a:fld id="{B586D440-F702-449A-AAC2-9ACFF17038B8}" type="slidenum">
+              <a:rPr lang="en-US" smtClean="0"/>
+              <a:pPr>
+                <a:spcAft>
+                  <a:spcPts val="600"/>
+                </a:spcAft>
+                <a:defRPr/>
+              </a:pPr>
+              <a:t>3</a:t>
+            </a:fld>
+            <a:endParaRPr lang="en-US" dirty="0"/>
+          </a:p>
+        </p:txBody>
+      </p:sp>
     </p:spTree>
     <p:extLst>
       <p:ext uri="{BB962C8B-B14F-4D97-AF65-F5344CB8AC3E}">
@@ -9447,6 +9975,52 @@
           </a:p>
         </p:txBody>
       </p:sp>
+      <p:sp>
+        <p:nvSpPr>
+          <p:cNvPr id="4" name="Slide Number Placeholder 3">
+            <a:extLst>
+              <a:ext uri="{FF2B5EF4-FFF2-40B4-BE49-F238E27FC236}">
+                <a16:creationId xmlns:a16="http://schemas.microsoft.com/office/drawing/2014/main" id="{80DE26D1-18BD-43E8-2F51-18A956C6CAFC}"/>
+              </a:ext>
+            </a:extLst>
+          </p:cNvPr>
+          <p:cNvSpPr>
+            <a:spLocks noGrp="1"/>
+          </p:cNvSpPr>
+          <p:nvPr>
+            <p:ph type="sldNum" sz="quarter" idx="12"/>
+          </p:nvPr>
+        </p:nvSpPr>
+        <p:spPr>
+          <a:xfrm>
+            <a:off x="228600" y="4629150"/>
+            <a:ext cx="914400" cy="171450"/>
+          </a:xfrm>
+        </p:spPr>
+        <p:txBody>
+          <a:bodyPr/>
+          <a:lstStyle/>
+          <a:p>
+            <a:pPr>
+              <a:spcAft>
+                <a:spcPts val="600"/>
+              </a:spcAft>
+              <a:defRPr/>
+            </a:pPr>
+            <a:fld id="{B586D440-F702-449A-AAC2-9ACFF17038B8}" type="slidenum">
+              <a:rPr lang="en-US" smtClean="0"/>
+              <a:pPr>
+                <a:spcAft>
+                  <a:spcPts val="600"/>
+                </a:spcAft>
+                <a:defRPr/>
+              </a:pPr>
+              <a:t>30</a:t>
+            </a:fld>
+            <a:endParaRPr lang="en-US" dirty="0"/>
+          </a:p>
+        </p:txBody>
+      </p:sp>
     </p:spTree>
     <p:extLst>
       <p:ext uri="{BB962C8B-B14F-4D97-AF65-F5344CB8AC3E}">
@@ -9526,7 +10100,53 @@
           <a:bodyPr/>
           <a:lstStyle/>
           <a:p>
-            <a:endParaRPr lang="en-US"/>
+            <a:endParaRPr lang="en-US" dirty="0"/>
+          </a:p>
+        </p:txBody>
+      </p:sp>
+      <p:sp>
+        <p:nvSpPr>
+          <p:cNvPr id="4" name="Slide Number Placeholder 3">
+            <a:extLst>
+              <a:ext uri="{FF2B5EF4-FFF2-40B4-BE49-F238E27FC236}">
+                <a16:creationId xmlns:a16="http://schemas.microsoft.com/office/drawing/2014/main" id="{C3918DAF-A955-0F4E-6CDC-8A1C858EA1AC}"/>
+              </a:ext>
+            </a:extLst>
+          </p:cNvPr>
+          <p:cNvSpPr>
+            <a:spLocks noGrp="1"/>
+          </p:cNvSpPr>
+          <p:nvPr>
+            <p:ph type="sldNum" sz="quarter" idx="12"/>
+          </p:nvPr>
+        </p:nvSpPr>
+        <p:spPr>
+          <a:xfrm>
+            <a:off x="228600" y="4629150"/>
+            <a:ext cx="914400" cy="171450"/>
+          </a:xfrm>
+        </p:spPr>
+        <p:txBody>
+          <a:bodyPr/>
+          <a:lstStyle/>
+          <a:p>
+            <a:pPr>
+              <a:spcAft>
+                <a:spcPts val="600"/>
+              </a:spcAft>
+              <a:defRPr/>
+            </a:pPr>
+            <a:fld id="{B586D440-F702-449A-AAC2-9ACFF17038B8}" type="slidenum">
+              <a:rPr lang="en-US" smtClean="0"/>
+              <a:pPr>
+                <a:spcAft>
+                  <a:spcPts val="600"/>
+                </a:spcAft>
+                <a:defRPr/>
+              </a:pPr>
+              <a:t>31</a:t>
+            </a:fld>
+            <a:endParaRPr lang="en-US" dirty="0"/>
           </a:p>
         </p:txBody>
       </p:sp>
@@ -10125,6 +10745,52 @@
           </a:p>
         </p:txBody>
       </p:sp>
+      <p:sp>
+        <p:nvSpPr>
+          <p:cNvPr id="4" name="Slide Number Placeholder 3">
+            <a:extLst>
+              <a:ext uri="{FF2B5EF4-FFF2-40B4-BE49-F238E27FC236}">
+                <a16:creationId xmlns:a16="http://schemas.microsoft.com/office/drawing/2014/main" id="{66395C9E-2B75-0A84-7212-5937D83330E4}"/>
+              </a:ext>
+            </a:extLst>
+          </p:cNvPr>
+          <p:cNvSpPr>
+            <a:spLocks noGrp="1"/>
+          </p:cNvSpPr>
+          <p:nvPr>
+            <p:ph type="sldNum" sz="quarter" idx="12"/>
+          </p:nvPr>
+        </p:nvSpPr>
+        <p:spPr>
+          <a:xfrm>
+            <a:off x="228600" y="4629150"/>
+            <a:ext cx="914400" cy="171450"/>
+          </a:xfrm>
+        </p:spPr>
+        <p:txBody>
+          <a:bodyPr/>
+          <a:lstStyle/>
+          <a:p>
+            <a:pPr>
+              <a:spcAft>
+                <a:spcPts val="600"/>
+              </a:spcAft>
+              <a:defRPr/>
+            </a:pPr>
+            <a:fld id="{B586D440-F702-449A-AAC2-9ACFF17038B8}" type="slidenum">
+              <a:rPr lang="en-US" smtClean="0"/>
+              <a:pPr>
+                <a:spcAft>
+                  <a:spcPts val="600"/>
+                </a:spcAft>
+                <a:defRPr/>
+              </a:pPr>
+              <a:t>4</a:t>
+            </a:fld>
+            <a:endParaRPr lang="en-US" dirty="0"/>
+          </a:p>
+        </p:txBody>
+      </p:sp>
     </p:spTree>
     <p:extLst>
       <p:ext uri="{BB962C8B-B14F-4D97-AF65-F5344CB8AC3E}">
@@ -10254,6 +10920,52 @@
           </a:p>
         </p:txBody>
       </p:sp>
+      <p:sp>
+        <p:nvSpPr>
+          <p:cNvPr id="4" name="Slide Number Placeholder 3">
+            <a:extLst>
+              <a:ext uri="{FF2B5EF4-FFF2-40B4-BE49-F238E27FC236}">
+                <a16:creationId xmlns:a16="http://schemas.microsoft.com/office/drawing/2014/main" id="{98CD7F0E-F56B-6091-FCCD-E638EA16EBE1}"/>
+              </a:ext>
+            </a:extLst>
+          </p:cNvPr>
+          <p:cNvSpPr>
+            <a:spLocks noGrp="1"/>
+          </p:cNvSpPr>
+          <p:nvPr>
+            <p:ph type="sldNum" sz="quarter" idx="12"/>
+          </p:nvPr>
+        </p:nvSpPr>
+        <p:spPr>
+          <a:xfrm>
+            <a:off x="228600" y="4629150"/>
+            <a:ext cx="914400" cy="171450"/>
+          </a:xfrm>
+        </p:spPr>
+        <p:txBody>
+          <a:bodyPr/>
+          <a:lstStyle/>
+          <a:p>
+            <a:pPr>
+              <a:spcAft>
+                <a:spcPts val="600"/>
+              </a:spcAft>
+              <a:defRPr/>
+            </a:pPr>
+            <a:fld id="{B586D440-F702-449A-AAC2-9ACFF17038B8}" type="slidenum">
+              <a:rPr lang="en-US" smtClean="0"/>
+              <a:pPr>
+                <a:spcAft>
+                  <a:spcPts val="600"/>
+                </a:spcAft>
+                <a:defRPr/>
+              </a:pPr>
+              <a:t>5</a:t>
+            </a:fld>
+            <a:endParaRPr lang="en-US" dirty="0"/>
+          </a:p>
+        </p:txBody>
+      </p:sp>
     </p:spTree>
     <p:extLst>
       <p:ext uri="{BB962C8B-B14F-4D97-AF65-F5344CB8AC3E}">
@@ -10421,6 +11133,52 @@
             <a:pPr marL="0" indent="0">
               <a:buNone/>
             </a:pPr>
+            <a:endParaRPr lang="en-US" dirty="0"/>
+          </a:p>
+        </p:txBody>
+      </p:sp>
+      <p:sp>
+        <p:nvSpPr>
+          <p:cNvPr id="4" name="Slide Number Placeholder 3">
+            <a:extLst>
+              <a:ext uri="{FF2B5EF4-FFF2-40B4-BE49-F238E27FC236}">
+                <a16:creationId xmlns:a16="http://schemas.microsoft.com/office/drawing/2014/main" id="{B36EA85A-A3A1-2772-E666-76ACAAA45E46}"/>
+              </a:ext>
+            </a:extLst>
+          </p:cNvPr>
+          <p:cNvSpPr>
+            <a:spLocks noGrp="1"/>
+          </p:cNvSpPr>
+          <p:nvPr>
+            <p:ph type="sldNum" sz="quarter" idx="12"/>
+          </p:nvPr>
+        </p:nvSpPr>
+        <p:spPr>
+          <a:xfrm>
+            <a:off x="228600" y="4629150"/>
+            <a:ext cx="914400" cy="171450"/>
+          </a:xfrm>
+        </p:spPr>
+        <p:txBody>
+          <a:bodyPr/>
+          <a:lstStyle/>
+          <a:p>
+            <a:pPr>
+              <a:spcAft>
+                <a:spcPts val="600"/>
+              </a:spcAft>
+              <a:defRPr/>
+            </a:pPr>
+            <a:fld id="{B586D440-F702-449A-AAC2-9ACFF17038B8}" type="slidenum">
+              <a:rPr lang="en-US" smtClean="0"/>
+              <a:pPr>
+                <a:spcAft>
+                  <a:spcPts val="600"/>
+                </a:spcAft>
+                <a:defRPr/>
+              </a:pPr>
+              <a:t>6</a:t>
+            </a:fld>
             <a:endParaRPr lang="en-US" dirty="0"/>
           </a:p>
         </p:txBody>
@@ -10572,6 +11330,52 @@
           </a:extLst>
         </p:spPr>
       </p:pic>
+      <p:sp>
+        <p:nvSpPr>
+          <p:cNvPr id="4" name="Slide Number Placeholder 3">
+            <a:extLst>
+              <a:ext uri="{FF2B5EF4-FFF2-40B4-BE49-F238E27FC236}">
+                <a16:creationId xmlns:a16="http://schemas.microsoft.com/office/drawing/2014/main" id="{7EBF3953-A1FE-E3F6-AE77-CFC48C581BE2}"/>
+              </a:ext>
+            </a:extLst>
+          </p:cNvPr>
+          <p:cNvSpPr>
+            <a:spLocks noGrp="1"/>
+          </p:cNvSpPr>
+          <p:nvPr>
+            <p:ph type="sldNum" sz="quarter" idx="12"/>
+          </p:nvPr>
+        </p:nvSpPr>
+        <p:spPr>
+          <a:xfrm>
+            <a:off x="228600" y="4629150"/>
+            <a:ext cx="914400" cy="171450"/>
+          </a:xfrm>
+        </p:spPr>
+        <p:txBody>
+          <a:bodyPr/>
+          <a:lstStyle/>
+          <a:p>
+            <a:pPr>
+              <a:spcAft>
+                <a:spcPts val="600"/>
+              </a:spcAft>
+              <a:defRPr/>
+            </a:pPr>
+            <a:fld id="{B586D440-F702-449A-AAC2-9ACFF17038B8}" type="slidenum">
+              <a:rPr lang="en-US" smtClean="0"/>
+              <a:pPr>
+                <a:spcAft>
+                  <a:spcPts val="600"/>
+                </a:spcAft>
+                <a:defRPr/>
+              </a:pPr>
+              <a:t>7</a:t>
+            </a:fld>
+            <a:endParaRPr lang="en-US" dirty="0"/>
+          </a:p>
+        </p:txBody>
+      </p:sp>
     </p:spTree>
     <p:extLst>
       <p:ext uri="{BB962C8B-B14F-4D97-AF65-F5344CB8AC3E}">
@@ -10713,6 +11517,52 @@
           </a:prstGeom>
         </p:spPr>
       </p:pic>
+      <p:sp>
+        <p:nvSpPr>
+          <p:cNvPr id="4" name="Slide Number Placeholder 3">
+            <a:extLst>
+              <a:ext uri="{FF2B5EF4-FFF2-40B4-BE49-F238E27FC236}">
+                <a16:creationId xmlns:a16="http://schemas.microsoft.com/office/drawing/2014/main" id="{251DFE20-2790-D7A3-8BCF-517BEE4A1546}"/>
+              </a:ext>
+            </a:extLst>
+          </p:cNvPr>
+          <p:cNvSpPr>
+            <a:spLocks noGrp="1"/>
+          </p:cNvSpPr>
+          <p:nvPr>
+            <p:ph type="sldNum" sz="quarter" idx="12"/>
+          </p:nvPr>
+        </p:nvSpPr>
+        <p:spPr>
+          <a:xfrm>
+            <a:off x="228600" y="4629150"/>
+            <a:ext cx="914400" cy="171450"/>
+          </a:xfrm>
+        </p:spPr>
+        <p:txBody>
+          <a:bodyPr/>
+          <a:lstStyle/>
+          <a:p>
+            <a:pPr>
+              <a:spcAft>
+                <a:spcPts val="600"/>
+              </a:spcAft>
+              <a:defRPr/>
+            </a:pPr>
+            <a:fld id="{B586D440-F702-449A-AAC2-9ACFF17038B8}" type="slidenum">
+              <a:rPr lang="en-US" smtClean="0"/>
+              <a:pPr>
+                <a:spcAft>
+                  <a:spcPts val="600"/>
+                </a:spcAft>
+                <a:defRPr/>
+              </a:pPr>
+              <a:t>8</a:t>
+            </a:fld>
+            <a:endParaRPr lang="en-US" dirty="0"/>
+          </a:p>
+        </p:txBody>
+      </p:sp>
     </p:spTree>
     <p:extLst>
       <p:ext uri="{BB962C8B-B14F-4D97-AF65-F5344CB8AC3E}">
@@ -10859,6 +11709,52 @@
           </a:prstGeom>
         </p:spPr>
       </p:pic>
+      <p:sp>
+        <p:nvSpPr>
+          <p:cNvPr id="4" name="Slide Number Placeholder 3">
+            <a:extLst>
+              <a:ext uri="{FF2B5EF4-FFF2-40B4-BE49-F238E27FC236}">
+                <a16:creationId xmlns:a16="http://schemas.microsoft.com/office/drawing/2014/main" id="{6B6B95B0-BFA0-6004-9F9F-10D614CC4FC7}"/>
+              </a:ext>
+            </a:extLst>
+          </p:cNvPr>
+          <p:cNvSpPr>
+            <a:spLocks noGrp="1"/>
+          </p:cNvSpPr>
+          <p:nvPr>
+            <p:ph type="sldNum" sz="quarter" idx="12"/>
+          </p:nvPr>
+        </p:nvSpPr>
+        <p:spPr>
+          <a:xfrm>
+            <a:off x="228600" y="4629150"/>
+            <a:ext cx="914400" cy="171450"/>
+          </a:xfrm>
+        </p:spPr>
+        <p:txBody>
+          <a:bodyPr/>
+          <a:lstStyle/>
+          <a:p>
+            <a:pPr>
+              <a:spcAft>
+                <a:spcPts val="600"/>
+              </a:spcAft>
+              <a:defRPr/>
+            </a:pPr>
+            <a:fld id="{B586D440-F702-449A-AAC2-9ACFF17038B8}" type="slidenum">
+              <a:rPr lang="en-US" smtClean="0"/>
+              <a:pPr>
+                <a:spcAft>
+                  <a:spcPts val="600"/>
+                </a:spcAft>
+                <a:defRPr/>
+              </a:pPr>
+              <a:t>9</a:t>
+            </a:fld>
+            <a:endParaRPr lang="en-US" dirty="0"/>
+          </a:p>
+        </p:txBody>
+      </p:sp>
     </p:spTree>
     <p:extLst>
       <p:ext uri="{BB962C8B-B14F-4D97-AF65-F5344CB8AC3E}">

</xml_diff>